<commit_message>
committing assignment2 helm chart
</commit_message>
<xml_diff>
--- a/assignment1.pptx
+++ b/assignment1.pptx
@@ -124,1151 +124,15 @@
 <file path=ppt/revisionInfo.xml><?xml version="1.0" encoding="utf-8"?>
 <p1510:revInfo xmlns:a="http://schemas.openxmlformats.org/drawingml/2006/main" xmlns:r="http://schemas.openxmlformats.org/officeDocument/2006/relationships" xmlns:p1510="http://schemas.microsoft.com/office/powerpoint/2015/10/main">
   <p1510:revLst>
-    <p1510:client id="{9D5F3A72-DC95-4AD1-BEF4-8CF1AE0745BD}" v="233" dt="2022-07-20T11:09:17.993"/>
+    <p1510:client id="{9D5F3A72-DC95-4AD1-BEF4-8CF1AE0745BD}" v="250" dt="2022-07-21T03:45:00.977"/>
     <p1510:client id="{C70A119B-DA48-A843-074C-0B489585E0F1}" v="227" dt="2022-07-21T02:02:44.183"/>
-    <p1510:client id="{E628CB86-5D38-2445-442D-E25402BF8369}" v="61" dt="2022-07-21T02:11:31.002"/>
+    <p1510:client id="{E628CB86-5D38-2445-442D-E25402BF8369}" v="62" dt="2022-07-21T03:15:07.397"/>
   </p1510:revLst>
 </p1510:revInfo>
 </file>
 
 <file path=ppt/changesInfos/changesInfo1.xml><?xml version="1.0" encoding="utf-8"?>
 <pc:chgInfo xmlns:a="http://schemas.openxmlformats.org/drawingml/2006/main" xmlns:r="http://schemas.openxmlformats.org/officeDocument/2006/relationships" xmlns:ac="http://schemas.microsoft.com/office/drawing/2013/main/command" xmlns:pc="http://schemas.microsoft.com/office/powerpoint/2013/main/command">
-  <pc:docChgLst>
-    <pc:chgData name="Murthy, Rajeswari K." userId="e10ba283-73eb-4d51-9d76-4c1024dd953b" providerId="ADAL" clId="{9D5F3A72-DC95-4AD1-BEF4-8CF1AE0745BD}"/>
-    <pc:docChg chg="undo redo custSel addSld modSld sldOrd">
-      <pc:chgData name="Murthy, Rajeswari K." userId="e10ba283-73eb-4d51-9d76-4c1024dd953b" providerId="ADAL" clId="{9D5F3A72-DC95-4AD1-BEF4-8CF1AE0745BD}" dt="2022-07-20T11:14:03.239" v="2447" actId="20577"/>
-      <pc:docMkLst>
-        <pc:docMk/>
-      </pc:docMkLst>
-      <pc:sldChg chg="modSp mod">
-        <pc:chgData name="Murthy, Rajeswari K." userId="e10ba283-73eb-4d51-9d76-4c1024dd953b" providerId="ADAL" clId="{9D5F3A72-DC95-4AD1-BEF4-8CF1AE0745BD}" dt="2022-07-20T11:14:03.239" v="2447" actId="20577"/>
-        <pc:sldMkLst>
-          <pc:docMk/>
-          <pc:sldMk cId="929142591" sldId="256"/>
-        </pc:sldMkLst>
-        <pc:spChg chg="mod">
-          <ac:chgData name="Murthy, Rajeswari K." userId="e10ba283-73eb-4d51-9d76-4c1024dd953b" providerId="ADAL" clId="{9D5F3A72-DC95-4AD1-BEF4-8CF1AE0745BD}" dt="2022-07-20T11:14:03.239" v="2447" actId="20577"/>
-          <ac:spMkLst>
-            <pc:docMk/>
-            <pc:sldMk cId="929142591" sldId="256"/>
-            <ac:spMk id="2" creationId="{56762DA4-746C-73DD-4F25-0F5B9C84A31E}"/>
-          </ac:spMkLst>
-        </pc:spChg>
-      </pc:sldChg>
-      <pc:sldChg chg="modSp mod ord">
-        <pc:chgData name="Murthy, Rajeswari K." userId="e10ba283-73eb-4d51-9d76-4c1024dd953b" providerId="ADAL" clId="{9D5F3A72-DC95-4AD1-BEF4-8CF1AE0745BD}" dt="2022-07-20T11:05:53.280" v="2179"/>
-        <pc:sldMkLst>
-          <pc:docMk/>
-          <pc:sldMk cId="424861511" sldId="257"/>
-        </pc:sldMkLst>
-        <pc:spChg chg="mod">
-          <ac:chgData name="Murthy, Rajeswari K." userId="e10ba283-73eb-4d51-9d76-4c1024dd953b" providerId="ADAL" clId="{9D5F3A72-DC95-4AD1-BEF4-8CF1AE0745BD}" dt="2022-07-20T08:10:41.892" v="1348" actId="20577"/>
-          <ac:spMkLst>
-            <pc:docMk/>
-            <pc:sldMk cId="424861511" sldId="257"/>
-            <ac:spMk id="5" creationId="{D173FAE1-915F-5A3E-B311-B10D9C2D379E}"/>
-          </ac:spMkLst>
-        </pc:spChg>
-        <pc:picChg chg="mod">
-          <ac:chgData name="Murthy, Rajeswari K." userId="e10ba283-73eb-4d51-9d76-4c1024dd953b" providerId="ADAL" clId="{9D5F3A72-DC95-4AD1-BEF4-8CF1AE0745BD}" dt="2022-07-20T07:30:12.191" v="1325" actId="1076"/>
-          <ac:picMkLst>
-            <pc:docMk/>
-            <pc:sldMk cId="424861511" sldId="257"/>
-            <ac:picMk id="4" creationId="{E2E404F7-E941-3745-94A8-D925CEE63400}"/>
-          </ac:picMkLst>
-        </pc:picChg>
-      </pc:sldChg>
-      <pc:sldChg chg="addSp delSp modSp mod">
-        <pc:chgData name="Murthy, Rajeswari K." userId="e10ba283-73eb-4d51-9d76-4c1024dd953b" providerId="ADAL" clId="{9D5F3A72-DC95-4AD1-BEF4-8CF1AE0745BD}" dt="2022-07-20T11:13:42.121" v="2434" actId="1037"/>
-        <pc:sldMkLst>
-          <pc:docMk/>
-          <pc:sldMk cId="2505263407" sldId="259"/>
-        </pc:sldMkLst>
-        <pc:spChg chg="add mod">
-          <ac:chgData name="Murthy, Rajeswari K." userId="e10ba283-73eb-4d51-9d76-4c1024dd953b" providerId="ADAL" clId="{9D5F3A72-DC95-4AD1-BEF4-8CF1AE0745BD}" dt="2022-07-20T11:13:42.121" v="2434" actId="1037"/>
-          <ac:spMkLst>
-            <pc:docMk/>
-            <pc:sldMk cId="2505263407" sldId="259"/>
-            <ac:spMk id="2" creationId="{55DB9633-3E11-B43F-2C69-4990A131BB04}"/>
-          </ac:spMkLst>
-        </pc:spChg>
-        <pc:spChg chg="mod">
-          <ac:chgData name="Murthy, Rajeswari K." userId="e10ba283-73eb-4d51-9d76-4c1024dd953b" providerId="ADAL" clId="{9D5F3A72-DC95-4AD1-BEF4-8CF1AE0745BD}" dt="2022-07-20T11:08:09.661" v="2218" actId="27636"/>
-          <ac:spMkLst>
-            <pc:docMk/>
-            <pc:sldMk cId="2505263407" sldId="259"/>
-            <ac:spMk id="4" creationId="{CCDC6A90-2728-569D-FF9D-6941AB29F39E}"/>
-          </ac:spMkLst>
-        </pc:spChg>
-        <pc:spChg chg="mod">
-          <ac:chgData name="Murthy, Rajeswari K." userId="e10ba283-73eb-4d51-9d76-4c1024dd953b" providerId="ADAL" clId="{9D5F3A72-DC95-4AD1-BEF4-8CF1AE0745BD}" dt="2022-07-20T11:08:57.609" v="2230" actId="1076"/>
-          <ac:spMkLst>
-            <pc:docMk/>
-            <pc:sldMk cId="2505263407" sldId="259"/>
-            <ac:spMk id="5" creationId="{394958A4-79A1-5E5B-1B13-B9F475A72F94}"/>
-          </ac:spMkLst>
-        </pc:spChg>
-        <pc:spChg chg="mod">
-          <ac:chgData name="Murthy, Rajeswari K." userId="e10ba283-73eb-4d51-9d76-4c1024dd953b" providerId="ADAL" clId="{9D5F3A72-DC95-4AD1-BEF4-8CF1AE0745BD}" dt="2022-07-20T11:08:24.363" v="2225" actId="14100"/>
-          <ac:spMkLst>
-            <pc:docMk/>
-            <pc:sldMk cId="2505263407" sldId="259"/>
-            <ac:spMk id="6" creationId="{8EC62A8A-F325-DF9D-6A7B-569012387918}"/>
-          </ac:spMkLst>
-        </pc:spChg>
-        <pc:spChg chg="add del mod">
-          <ac:chgData name="Murthy, Rajeswari K." userId="e10ba283-73eb-4d51-9d76-4c1024dd953b" providerId="ADAL" clId="{9D5F3A72-DC95-4AD1-BEF4-8CF1AE0745BD}" dt="2022-07-20T11:09:07.157" v="2233"/>
-          <ac:spMkLst>
-            <pc:docMk/>
-            <pc:sldMk cId="2505263407" sldId="259"/>
-            <ac:spMk id="9" creationId="{21A7378F-7DD5-97D1-8515-CCF5A3355BEC}"/>
-          </ac:spMkLst>
-        </pc:spChg>
-        <pc:spChg chg="add del mod">
-          <ac:chgData name="Murthy, Rajeswari K." userId="e10ba283-73eb-4d51-9d76-4c1024dd953b" providerId="ADAL" clId="{9D5F3A72-DC95-4AD1-BEF4-8CF1AE0745BD}" dt="2022-07-20T11:09:17.993" v="2235"/>
-          <ac:spMkLst>
-            <pc:docMk/>
-            <pc:sldMk cId="2505263407" sldId="259"/>
-            <ac:spMk id="10" creationId="{40876C86-54DF-9D37-75C8-740766D4273E}"/>
-          </ac:spMkLst>
-        </pc:spChg>
-        <pc:graphicFrameChg chg="add mod modGraphic">
-          <ac:chgData name="Murthy, Rajeswari K." userId="e10ba283-73eb-4d51-9d76-4c1024dd953b" providerId="ADAL" clId="{9D5F3A72-DC95-4AD1-BEF4-8CF1AE0745BD}" dt="2022-07-20T11:13:32.355" v="2425" actId="1035"/>
-          <ac:graphicFrameMkLst>
-            <pc:docMk/>
-            <pc:sldMk cId="2505263407" sldId="259"/>
-            <ac:graphicFrameMk id="7" creationId="{C6FE2B07-3456-4513-BBF1-1791932ECD03}"/>
-          </ac:graphicFrameMkLst>
-        </pc:graphicFrameChg>
-      </pc:sldChg>
-      <pc:sldChg chg="modSp mod ord">
-        <pc:chgData name="Murthy, Rajeswari K." userId="e10ba283-73eb-4d51-9d76-4c1024dd953b" providerId="ADAL" clId="{9D5F3A72-DC95-4AD1-BEF4-8CF1AE0745BD}" dt="2022-07-20T08:50:50.137" v="1461" actId="20577"/>
-        <pc:sldMkLst>
-          <pc:docMk/>
-          <pc:sldMk cId="255919191" sldId="260"/>
-        </pc:sldMkLst>
-        <pc:spChg chg="mod">
-          <ac:chgData name="Murthy, Rajeswari K." userId="e10ba283-73eb-4d51-9d76-4c1024dd953b" providerId="ADAL" clId="{9D5F3A72-DC95-4AD1-BEF4-8CF1AE0745BD}" dt="2022-07-20T08:50:50.137" v="1461" actId="20577"/>
-          <ac:spMkLst>
-            <pc:docMk/>
-            <pc:sldMk cId="255919191" sldId="260"/>
-            <ac:spMk id="7" creationId="{F239EDE1-5517-540C-D677-C0440CCCA8DA}"/>
-          </ac:spMkLst>
-        </pc:spChg>
-        <pc:spChg chg="mod">
-          <ac:chgData name="Murthy, Rajeswari K." userId="e10ba283-73eb-4d51-9d76-4c1024dd953b" providerId="ADAL" clId="{9D5F3A72-DC95-4AD1-BEF4-8CF1AE0745BD}" dt="2022-07-20T03:56:38.243" v="1318" actId="20577"/>
-          <ac:spMkLst>
-            <pc:docMk/>
-            <pc:sldMk cId="255919191" sldId="260"/>
-            <ac:spMk id="8" creationId="{49E8753F-AB0F-CE5D-8DA3-8F721108F53C}"/>
-          </ac:spMkLst>
-        </pc:spChg>
-      </pc:sldChg>
-      <pc:sldChg chg="addSp delSp modSp new mod">
-        <pc:chgData name="Murthy, Rajeswari K." userId="e10ba283-73eb-4d51-9d76-4c1024dd953b" providerId="ADAL" clId="{9D5F3A72-DC95-4AD1-BEF4-8CF1AE0745BD}" dt="2022-07-20T08:59:26.939" v="1546" actId="1038"/>
-        <pc:sldMkLst>
-          <pc:docMk/>
-          <pc:sldMk cId="3398826638" sldId="261"/>
-        </pc:sldMkLst>
-        <pc:spChg chg="add mod">
-          <ac:chgData name="Murthy, Rajeswari K." userId="e10ba283-73eb-4d51-9d76-4c1024dd953b" providerId="ADAL" clId="{9D5F3A72-DC95-4AD1-BEF4-8CF1AE0745BD}" dt="2022-07-19T14:49:17.456" v="1012" actId="1076"/>
-          <ac:spMkLst>
-            <pc:docMk/>
-            <pc:sldMk cId="3398826638" sldId="261"/>
-            <ac:spMk id="2" creationId="{C01FE4DD-A334-98FC-83E2-BDFC3271F854}"/>
-          </ac:spMkLst>
-        </pc:spChg>
-        <pc:spChg chg="add mod">
-          <ac:chgData name="Murthy, Rajeswari K." userId="e10ba283-73eb-4d51-9d76-4c1024dd953b" providerId="ADAL" clId="{9D5F3A72-DC95-4AD1-BEF4-8CF1AE0745BD}" dt="2022-07-19T14:49:17.456" v="1012" actId="1076"/>
-          <ac:spMkLst>
-            <pc:docMk/>
-            <pc:sldMk cId="3398826638" sldId="261"/>
-            <ac:spMk id="5" creationId="{7E2E239E-F428-77E3-ED12-AD515A6D1A01}"/>
-          </ac:spMkLst>
-        </pc:spChg>
-        <pc:spChg chg="add mod">
-          <ac:chgData name="Murthy, Rajeswari K." userId="e10ba283-73eb-4d51-9d76-4c1024dd953b" providerId="ADAL" clId="{9D5F3A72-DC95-4AD1-BEF4-8CF1AE0745BD}" dt="2022-07-19T14:49:17.456" v="1012" actId="1076"/>
-          <ac:spMkLst>
-            <pc:docMk/>
-            <pc:sldMk cId="3398826638" sldId="261"/>
-            <ac:spMk id="6" creationId="{DB085202-E48D-32ED-81E3-5B8A14CC643D}"/>
-          </ac:spMkLst>
-        </pc:spChg>
-        <pc:spChg chg="add mod">
-          <ac:chgData name="Murthy, Rajeswari K." userId="e10ba283-73eb-4d51-9d76-4c1024dd953b" providerId="ADAL" clId="{9D5F3A72-DC95-4AD1-BEF4-8CF1AE0745BD}" dt="2022-07-19T14:49:17.456" v="1012" actId="1076"/>
-          <ac:spMkLst>
-            <pc:docMk/>
-            <pc:sldMk cId="3398826638" sldId="261"/>
-            <ac:spMk id="7" creationId="{D0530B41-92CC-1163-E7BB-6981E07A2C52}"/>
-          </ac:spMkLst>
-        </pc:spChg>
-        <pc:spChg chg="add mod">
-          <ac:chgData name="Murthy, Rajeswari K." userId="e10ba283-73eb-4d51-9d76-4c1024dd953b" providerId="ADAL" clId="{9D5F3A72-DC95-4AD1-BEF4-8CF1AE0745BD}" dt="2022-07-19T14:49:17.456" v="1012" actId="1076"/>
-          <ac:spMkLst>
-            <pc:docMk/>
-            <pc:sldMk cId="3398826638" sldId="261"/>
-            <ac:spMk id="8" creationId="{59A429DE-F951-15FD-1283-066FF34273E3}"/>
-          </ac:spMkLst>
-        </pc:spChg>
-        <pc:spChg chg="add mod">
-          <ac:chgData name="Murthy, Rajeswari K." userId="e10ba283-73eb-4d51-9d76-4c1024dd953b" providerId="ADAL" clId="{9D5F3A72-DC95-4AD1-BEF4-8CF1AE0745BD}" dt="2022-07-19T14:49:17.456" v="1012" actId="1076"/>
-          <ac:spMkLst>
-            <pc:docMk/>
-            <pc:sldMk cId="3398826638" sldId="261"/>
-            <ac:spMk id="9" creationId="{B865DE75-09BF-5D6C-2135-FCD7CFFFF588}"/>
-          </ac:spMkLst>
-        </pc:spChg>
-        <pc:spChg chg="add mod">
-          <ac:chgData name="Murthy, Rajeswari K." userId="e10ba283-73eb-4d51-9d76-4c1024dd953b" providerId="ADAL" clId="{9D5F3A72-DC95-4AD1-BEF4-8CF1AE0745BD}" dt="2022-07-19T14:49:17.456" v="1012" actId="1076"/>
-          <ac:spMkLst>
-            <pc:docMk/>
-            <pc:sldMk cId="3398826638" sldId="261"/>
-            <ac:spMk id="10" creationId="{B0D91068-283B-5F31-4CDE-D47F0FCFDB2D}"/>
-          </ac:spMkLst>
-        </pc:spChg>
-        <pc:spChg chg="add mod">
-          <ac:chgData name="Murthy, Rajeswari K." userId="e10ba283-73eb-4d51-9d76-4c1024dd953b" providerId="ADAL" clId="{9D5F3A72-DC95-4AD1-BEF4-8CF1AE0745BD}" dt="2022-07-19T14:49:17.456" v="1012" actId="1076"/>
-          <ac:spMkLst>
-            <pc:docMk/>
-            <pc:sldMk cId="3398826638" sldId="261"/>
-            <ac:spMk id="11" creationId="{BD98851A-D446-C44F-6405-3058CFC92FD0}"/>
-          </ac:spMkLst>
-        </pc:spChg>
-        <pc:spChg chg="add mod">
-          <ac:chgData name="Murthy, Rajeswari K." userId="e10ba283-73eb-4d51-9d76-4c1024dd953b" providerId="ADAL" clId="{9D5F3A72-DC95-4AD1-BEF4-8CF1AE0745BD}" dt="2022-07-19T14:49:17.456" v="1012" actId="1076"/>
-          <ac:spMkLst>
-            <pc:docMk/>
-            <pc:sldMk cId="3398826638" sldId="261"/>
-            <ac:spMk id="12" creationId="{40C169F6-5C1D-573E-518C-AED68FD4D74A}"/>
-          </ac:spMkLst>
-        </pc:spChg>
-        <pc:spChg chg="add del mod">
-          <ac:chgData name="Murthy, Rajeswari K." userId="e10ba283-73eb-4d51-9d76-4c1024dd953b" providerId="ADAL" clId="{9D5F3A72-DC95-4AD1-BEF4-8CF1AE0745BD}" dt="2022-07-20T08:58:46.533" v="1482" actId="478"/>
-          <ac:spMkLst>
-            <pc:docMk/>
-            <pc:sldMk cId="3398826638" sldId="261"/>
-            <ac:spMk id="13" creationId="{39D612DE-E6E3-4D41-E7B5-C0607D0883DE}"/>
-          </ac:spMkLst>
-        </pc:spChg>
-        <pc:spChg chg="add mod">
-          <ac:chgData name="Murthy, Rajeswari K." userId="e10ba283-73eb-4d51-9d76-4c1024dd953b" providerId="ADAL" clId="{9D5F3A72-DC95-4AD1-BEF4-8CF1AE0745BD}" dt="2022-07-19T14:49:17.456" v="1012" actId="1076"/>
-          <ac:spMkLst>
-            <pc:docMk/>
-            <pc:sldMk cId="3398826638" sldId="261"/>
-            <ac:spMk id="28" creationId="{4512173E-65D0-38D4-4795-EE8796426BD4}"/>
-          </ac:spMkLst>
-        </pc:spChg>
-        <pc:spChg chg="add mod">
-          <ac:chgData name="Murthy, Rajeswari K." userId="e10ba283-73eb-4d51-9d76-4c1024dd953b" providerId="ADAL" clId="{9D5F3A72-DC95-4AD1-BEF4-8CF1AE0745BD}" dt="2022-07-19T14:49:17.456" v="1012" actId="1076"/>
-          <ac:spMkLst>
-            <pc:docMk/>
-            <pc:sldMk cId="3398826638" sldId="261"/>
-            <ac:spMk id="29" creationId="{14ADCE15-9278-961F-EE67-B8008A5031B4}"/>
-          </ac:spMkLst>
-        </pc:spChg>
-        <pc:spChg chg="add mod">
-          <ac:chgData name="Murthy, Rajeswari K." userId="e10ba283-73eb-4d51-9d76-4c1024dd953b" providerId="ADAL" clId="{9D5F3A72-DC95-4AD1-BEF4-8CF1AE0745BD}" dt="2022-07-19T14:49:17.456" v="1012" actId="1076"/>
-          <ac:spMkLst>
-            <pc:docMk/>
-            <pc:sldMk cId="3398826638" sldId="261"/>
-            <ac:spMk id="36" creationId="{BCA700ED-A350-F283-4097-260E14587A21}"/>
-          </ac:spMkLst>
-        </pc:spChg>
-        <pc:spChg chg="add mod">
-          <ac:chgData name="Murthy, Rajeswari K." userId="e10ba283-73eb-4d51-9d76-4c1024dd953b" providerId="ADAL" clId="{9D5F3A72-DC95-4AD1-BEF4-8CF1AE0745BD}" dt="2022-07-19T14:49:17.456" v="1012" actId="1076"/>
-          <ac:spMkLst>
-            <pc:docMk/>
-            <pc:sldMk cId="3398826638" sldId="261"/>
-            <ac:spMk id="37" creationId="{048533F5-5D7E-BF67-389D-53ED6B2BA665}"/>
-          </ac:spMkLst>
-        </pc:spChg>
-        <pc:spChg chg="add del mod">
-          <ac:chgData name="Murthy, Rajeswari K." userId="e10ba283-73eb-4d51-9d76-4c1024dd953b" providerId="ADAL" clId="{9D5F3A72-DC95-4AD1-BEF4-8CF1AE0745BD}" dt="2022-07-20T08:58:58.556" v="1503" actId="478"/>
-          <ac:spMkLst>
-            <pc:docMk/>
-            <pc:sldMk cId="3398826638" sldId="261"/>
-            <ac:spMk id="38" creationId="{256D2796-860F-1E61-725E-27709F54A717}"/>
-          </ac:spMkLst>
-        </pc:spChg>
-        <pc:spChg chg="add mod">
-          <ac:chgData name="Murthy, Rajeswari K." userId="e10ba283-73eb-4d51-9d76-4c1024dd953b" providerId="ADAL" clId="{9D5F3A72-DC95-4AD1-BEF4-8CF1AE0745BD}" dt="2022-07-20T08:59:20.832" v="1541" actId="1035"/>
-          <ac:spMkLst>
-            <pc:docMk/>
-            <pc:sldMk cId="3398826638" sldId="261"/>
-            <ac:spMk id="39" creationId="{0A74F30C-2DD4-A98A-FFA3-004F2C694B3A}"/>
-          </ac:spMkLst>
-        </pc:spChg>
-        <pc:spChg chg="add mod">
-          <ac:chgData name="Murthy, Rajeswari K." userId="e10ba283-73eb-4d51-9d76-4c1024dd953b" providerId="ADAL" clId="{9D5F3A72-DC95-4AD1-BEF4-8CF1AE0745BD}" dt="2022-07-20T08:59:26.939" v="1546" actId="1038"/>
-          <ac:spMkLst>
-            <pc:docMk/>
-            <pc:sldMk cId="3398826638" sldId="261"/>
-            <ac:spMk id="42" creationId="{DCB72E77-ED73-5060-04A9-5962FA8BE60E}"/>
-          </ac:spMkLst>
-        </pc:spChg>
-        <pc:spChg chg="add mod">
-          <ac:chgData name="Murthy, Rajeswari K." userId="e10ba283-73eb-4d51-9d76-4c1024dd953b" providerId="ADAL" clId="{9D5F3A72-DC95-4AD1-BEF4-8CF1AE0745BD}" dt="2022-07-19T14:49:17.456" v="1012" actId="1076"/>
-          <ac:spMkLst>
-            <pc:docMk/>
-            <pc:sldMk cId="3398826638" sldId="261"/>
-            <ac:spMk id="43" creationId="{F8FC3974-4F3E-70CD-C2EF-62F2310A71DF}"/>
-          </ac:spMkLst>
-        </pc:spChg>
-        <pc:spChg chg="add del mod">
-          <ac:chgData name="Murthy, Rajeswari K." userId="e10ba283-73eb-4d51-9d76-4c1024dd953b" providerId="ADAL" clId="{9D5F3A72-DC95-4AD1-BEF4-8CF1AE0745BD}" dt="2022-07-20T08:58:58.556" v="1503" actId="478"/>
-          <ac:spMkLst>
-            <pc:docMk/>
-            <pc:sldMk cId="3398826638" sldId="261"/>
-            <ac:spMk id="45" creationId="{4AC6055C-8CBE-A862-2CC9-55C1492FF59B}"/>
-          </ac:spMkLst>
-        </pc:spChg>
-        <pc:spChg chg="add mod">
-          <ac:chgData name="Murthy, Rajeswari K." userId="e10ba283-73eb-4d51-9d76-4c1024dd953b" providerId="ADAL" clId="{9D5F3A72-DC95-4AD1-BEF4-8CF1AE0745BD}" dt="2022-07-19T14:49:17.456" v="1012" actId="1076"/>
-          <ac:spMkLst>
-            <pc:docMk/>
-            <pc:sldMk cId="3398826638" sldId="261"/>
-            <ac:spMk id="46" creationId="{AAAC7C70-A7B0-1336-C365-B8B48BD857ED}"/>
-          </ac:spMkLst>
-        </pc:spChg>
-        <pc:spChg chg="add mod">
-          <ac:chgData name="Murthy, Rajeswari K." userId="e10ba283-73eb-4d51-9d76-4c1024dd953b" providerId="ADAL" clId="{9D5F3A72-DC95-4AD1-BEF4-8CF1AE0745BD}" dt="2022-07-19T14:49:17.456" v="1012" actId="1076"/>
-          <ac:spMkLst>
-            <pc:docMk/>
-            <pc:sldMk cId="3398826638" sldId="261"/>
-            <ac:spMk id="47" creationId="{D919C476-E075-9350-00C5-119DAA9B5217}"/>
-          </ac:spMkLst>
-        </pc:spChg>
-        <pc:spChg chg="add mod">
-          <ac:chgData name="Murthy, Rajeswari K." userId="e10ba283-73eb-4d51-9d76-4c1024dd953b" providerId="ADAL" clId="{9D5F3A72-DC95-4AD1-BEF4-8CF1AE0745BD}" dt="2022-07-19T14:49:05.004" v="1009" actId="1035"/>
-          <ac:spMkLst>
-            <pc:docMk/>
-            <pc:sldMk cId="3398826638" sldId="261"/>
-            <ac:spMk id="56" creationId="{BC733D5D-774C-9472-4CF2-33D8AA86273A}"/>
-          </ac:spMkLst>
-        </pc:spChg>
-        <pc:spChg chg="add mod">
-          <ac:chgData name="Murthy, Rajeswari K." userId="e10ba283-73eb-4d51-9d76-4c1024dd953b" providerId="ADAL" clId="{9D5F3A72-DC95-4AD1-BEF4-8CF1AE0745BD}" dt="2022-07-19T14:47:26.832" v="960" actId="1076"/>
-          <ac:spMkLst>
-            <pc:docMk/>
-            <pc:sldMk cId="3398826638" sldId="261"/>
-            <ac:spMk id="57" creationId="{5F5B9DB9-E1E7-B9F6-4715-2CF0168EFBB4}"/>
-          </ac:spMkLst>
-        </pc:spChg>
-        <pc:spChg chg="add mod">
-          <ac:chgData name="Murthy, Rajeswari K." userId="e10ba283-73eb-4d51-9d76-4c1024dd953b" providerId="ADAL" clId="{9D5F3A72-DC95-4AD1-BEF4-8CF1AE0745BD}" dt="2022-07-19T14:42:02.932" v="950" actId="1076"/>
-          <ac:spMkLst>
-            <pc:docMk/>
-            <pc:sldMk cId="3398826638" sldId="261"/>
-            <ac:spMk id="61" creationId="{2AF7C445-E32A-4676-4E84-EB599200625A}"/>
-          </ac:spMkLst>
-        </pc:spChg>
-        <pc:spChg chg="add mod">
-          <ac:chgData name="Murthy, Rajeswari K." userId="e10ba283-73eb-4d51-9d76-4c1024dd953b" providerId="ADAL" clId="{9D5F3A72-DC95-4AD1-BEF4-8CF1AE0745BD}" dt="2022-07-19T14:42:02.932" v="950" actId="1076"/>
-          <ac:spMkLst>
-            <pc:docMk/>
-            <pc:sldMk cId="3398826638" sldId="261"/>
-            <ac:spMk id="63" creationId="{1AF6E2B1-BBF9-C494-3DCA-766C94555FBC}"/>
-          </ac:spMkLst>
-        </pc:spChg>
-        <pc:spChg chg="add mod">
-          <ac:chgData name="Murthy, Rajeswari K." userId="e10ba283-73eb-4d51-9d76-4c1024dd953b" providerId="ADAL" clId="{9D5F3A72-DC95-4AD1-BEF4-8CF1AE0745BD}" dt="2022-07-19T14:42:02.932" v="950" actId="1076"/>
-          <ac:spMkLst>
-            <pc:docMk/>
-            <pc:sldMk cId="3398826638" sldId="261"/>
-            <ac:spMk id="65" creationId="{012FB729-1CE4-6CB0-B81E-FD5A3E726378}"/>
-          </ac:spMkLst>
-        </pc:spChg>
-        <pc:spChg chg="add mod">
-          <ac:chgData name="Murthy, Rajeswari K." userId="e10ba283-73eb-4d51-9d76-4c1024dd953b" providerId="ADAL" clId="{9D5F3A72-DC95-4AD1-BEF4-8CF1AE0745BD}" dt="2022-07-19T14:42:02.932" v="950" actId="1076"/>
-          <ac:spMkLst>
-            <pc:docMk/>
-            <pc:sldMk cId="3398826638" sldId="261"/>
-            <ac:spMk id="67" creationId="{0DA03AFB-EA35-32E2-B86B-22FDDEC90ACA}"/>
-          </ac:spMkLst>
-        </pc:spChg>
-        <pc:spChg chg="add mod">
-          <ac:chgData name="Murthy, Rajeswari K." userId="e10ba283-73eb-4d51-9d76-4c1024dd953b" providerId="ADAL" clId="{9D5F3A72-DC95-4AD1-BEF4-8CF1AE0745BD}" dt="2022-07-19T14:52:29.040" v="1103" actId="113"/>
-          <ac:spMkLst>
-            <pc:docMk/>
-            <pc:sldMk cId="3398826638" sldId="261"/>
-            <ac:spMk id="68" creationId="{7C2B873E-96DA-3395-4295-F3726FA3F02C}"/>
-          </ac:spMkLst>
-        </pc:spChg>
-        <pc:spChg chg="add mod">
-          <ac:chgData name="Murthy, Rajeswari K." userId="e10ba283-73eb-4d51-9d76-4c1024dd953b" providerId="ADAL" clId="{9D5F3A72-DC95-4AD1-BEF4-8CF1AE0745BD}" dt="2022-07-19T14:51:15.246" v="1098" actId="1035"/>
-          <ac:spMkLst>
-            <pc:docMk/>
-            <pc:sldMk cId="3398826638" sldId="261"/>
-            <ac:spMk id="69" creationId="{D4614774-E29A-C332-04EA-B5139CA9B4C7}"/>
-          </ac:spMkLst>
-        </pc:spChg>
-        <pc:spChg chg="add mod">
-          <ac:chgData name="Murthy, Rajeswari K." userId="e10ba283-73eb-4d51-9d76-4c1024dd953b" providerId="ADAL" clId="{9D5F3A72-DC95-4AD1-BEF4-8CF1AE0745BD}" dt="2022-07-19T14:49:37.234" v="1015" actId="14100"/>
-          <ac:spMkLst>
-            <pc:docMk/>
-            <pc:sldMk cId="3398826638" sldId="261"/>
-            <ac:spMk id="70" creationId="{E18979B9-DE94-1F05-AF2A-62966833569E}"/>
-          </ac:spMkLst>
-        </pc:spChg>
-        <pc:spChg chg="add mod">
-          <ac:chgData name="Murthy, Rajeswari K." userId="e10ba283-73eb-4d51-9d76-4c1024dd953b" providerId="ADAL" clId="{9D5F3A72-DC95-4AD1-BEF4-8CF1AE0745BD}" dt="2022-07-19T14:52:41.459" v="1108" actId="404"/>
-          <ac:spMkLst>
-            <pc:docMk/>
-            <pc:sldMk cId="3398826638" sldId="261"/>
-            <ac:spMk id="72" creationId="{3CDCEAA4-AA91-CCF9-CE5E-69DC17846221}"/>
-          </ac:spMkLst>
-        </pc:spChg>
-        <pc:spChg chg="add mod">
-          <ac:chgData name="Murthy, Rajeswari K." userId="e10ba283-73eb-4d51-9d76-4c1024dd953b" providerId="ADAL" clId="{9D5F3A72-DC95-4AD1-BEF4-8CF1AE0745BD}" dt="2022-07-19T14:52:52.381" v="1110" actId="404"/>
-          <ac:spMkLst>
-            <pc:docMk/>
-            <pc:sldMk cId="3398826638" sldId="261"/>
-            <ac:spMk id="74" creationId="{1D7525D3-5561-51E7-F1AF-5D3CFADC90E4}"/>
-          </ac:spMkLst>
-        </pc:spChg>
-        <pc:grpChg chg="add mod">
-          <ac:chgData name="Murthy, Rajeswari K." userId="e10ba283-73eb-4d51-9d76-4c1024dd953b" providerId="ADAL" clId="{9D5F3A72-DC95-4AD1-BEF4-8CF1AE0745BD}" dt="2022-07-19T14:49:17.456" v="1012" actId="1076"/>
-          <ac:grpSpMkLst>
-            <pc:docMk/>
-            <pc:sldMk cId="3398826638" sldId="261"/>
-            <ac:grpSpMk id="44" creationId="{433C81AC-0284-F8A3-2F36-3F27079E33D5}"/>
-          </ac:grpSpMkLst>
-        </pc:grpChg>
-        <pc:grpChg chg="add mod">
-          <ac:chgData name="Murthy, Rajeswari K." userId="e10ba283-73eb-4d51-9d76-4c1024dd953b" providerId="ADAL" clId="{9D5F3A72-DC95-4AD1-BEF4-8CF1AE0745BD}" dt="2022-07-19T14:42:02.932" v="950" actId="1076"/>
-          <ac:grpSpMkLst>
-            <pc:docMk/>
-            <pc:sldMk cId="3398826638" sldId="261"/>
-            <ac:grpSpMk id="55" creationId="{7E1D53ED-926D-4BE8-EC08-899C22045D78}"/>
-          </ac:grpSpMkLst>
-        </pc:grpChg>
-        <pc:picChg chg="add mod">
-          <ac:chgData name="Murthy, Rajeswari K." userId="e10ba283-73eb-4d51-9d76-4c1024dd953b" providerId="ADAL" clId="{9D5F3A72-DC95-4AD1-BEF4-8CF1AE0745BD}" dt="2022-07-19T14:42:02.932" v="950" actId="1076"/>
-          <ac:picMkLst>
-            <pc:docMk/>
-            <pc:sldMk cId="3398826638" sldId="261"/>
-            <ac:picMk id="58" creationId="{FC4EDAFD-885F-0493-C42F-C1B5C8BDCD09}"/>
-          </ac:picMkLst>
-        </pc:picChg>
-        <pc:picChg chg="add mod">
-          <ac:chgData name="Murthy, Rajeswari K." userId="e10ba283-73eb-4d51-9d76-4c1024dd953b" providerId="ADAL" clId="{9D5F3A72-DC95-4AD1-BEF4-8CF1AE0745BD}" dt="2022-07-19T14:42:02.932" v="950" actId="1076"/>
-          <ac:picMkLst>
-            <pc:docMk/>
-            <pc:sldMk cId="3398826638" sldId="261"/>
-            <ac:picMk id="60" creationId="{FDD57F06-44F1-BCBC-B19A-6837F404BBBB}"/>
-          </ac:picMkLst>
-        </pc:picChg>
-        <pc:picChg chg="add mod">
-          <ac:chgData name="Murthy, Rajeswari K." userId="e10ba283-73eb-4d51-9d76-4c1024dd953b" providerId="ADAL" clId="{9D5F3A72-DC95-4AD1-BEF4-8CF1AE0745BD}" dt="2022-07-19T14:49:17.456" v="1012" actId="1076"/>
-          <ac:picMkLst>
-            <pc:docMk/>
-            <pc:sldMk cId="3398826638" sldId="261"/>
-            <ac:picMk id="1026" creationId="{A343B030-BFB1-C715-5B90-D3733B5FF28C}"/>
-          </ac:picMkLst>
-        </pc:picChg>
-        <pc:picChg chg="add mod">
-          <ac:chgData name="Murthy, Rajeswari K." userId="e10ba283-73eb-4d51-9d76-4c1024dd953b" providerId="ADAL" clId="{9D5F3A72-DC95-4AD1-BEF4-8CF1AE0745BD}" dt="2022-07-19T14:49:17.456" v="1012" actId="1076"/>
-          <ac:picMkLst>
-            <pc:docMk/>
-            <pc:sldMk cId="3398826638" sldId="261"/>
-            <ac:picMk id="1028" creationId="{7A331ACB-A030-1A07-8A10-7A510EDD5880}"/>
-          </ac:picMkLst>
-        </pc:picChg>
-        <pc:cxnChg chg="add mod">
-          <ac:chgData name="Murthy, Rajeswari K." userId="e10ba283-73eb-4d51-9d76-4c1024dd953b" providerId="ADAL" clId="{9D5F3A72-DC95-4AD1-BEF4-8CF1AE0745BD}" dt="2022-07-19T14:49:17.456" v="1012" actId="1076"/>
-          <ac:cxnSpMkLst>
-            <pc:docMk/>
-            <pc:sldMk cId="3398826638" sldId="261"/>
-            <ac:cxnSpMk id="4" creationId="{8CC21BF9-C3AA-D8A6-EC59-A8127314716D}"/>
-          </ac:cxnSpMkLst>
-        </pc:cxnChg>
-        <pc:cxnChg chg="add mod">
-          <ac:chgData name="Murthy, Rajeswari K." userId="e10ba283-73eb-4d51-9d76-4c1024dd953b" providerId="ADAL" clId="{9D5F3A72-DC95-4AD1-BEF4-8CF1AE0745BD}" dt="2022-07-19T14:49:17.456" v="1012" actId="1076"/>
-          <ac:cxnSpMkLst>
-            <pc:docMk/>
-            <pc:sldMk cId="3398826638" sldId="261"/>
-            <ac:cxnSpMk id="15" creationId="{3DEF6BA5-9EE4-3C3B-934E-0EBD9FCD2ADB}"/>
-          </ac:cxnSpMkLst>
-        </pc:cxnChg>
-        <pc:cxnChg chg="add mod">
-          <ac:chgData name="Murthy, Rajeswari K." userId="e10ba283-73eb-4d51-9d76-4c1024dd953b" providerId="ADAL" clId="{9D5F3A72-DC95-4AD1-BEF4-8CF1AE0745BD}" dt="2022-07-19T14:49:17.456" v="1012" actId="1076"/>
-          <ac:cxnSpMkLst>
-            <pc:docMk/>
-            <pc:sldMk cId="3398826638" sldId="261"/>
-            <ac:cxnSpMk id="18" creationId="{8EDBEC30-B280-5E13-CB6B-1189F4FCAD5D}"/>
-          </ac:cxnSpMkLst>
-        </pc:cxnChg>
-        <pc:cxnChg chg="add mod">
-          <ac:chgData name="Murthy, Rajeswari K." userId="e10ba283-73eb-4d51-9d76-4c1024dd953b" providerId="ADAL" clId="{9D5F3A72-DC95-4AD1-BEF4-8CF1AE0745BD}" dt="2022-07-19T14:49:17.456" v="1012" actId="1076"/>
-          <ac:cxnSpMkLst>
-            <pc:docMk/>
-            <pc:sldMk cId="3398826638" sldId="261"/>
-            <ac:cxnSpMk id="21" creationId="{FDE6A9F1-B601-233B-52D0-D6D65E906E3B}"/>
-          </ac:cxnSpMkLst>
-        </pc:cxnChg>
-        <pc:cxnChg chg="add mod">
-          <ac:chgData name="Murthy, Rajeswari K." userId="e10ba283-73eb-4d51-9d76-4c1024dd953b" providerId="ADAL" clId="{9D5F3A72-DC95-4AD1-BEF4-8CF1AE0745BD}" dt="2022-07-19T14:49:17.456" v="1012" actId="1076"/>
-          <ac:cxnSpMkLst>
-            <pc:docMk/>
-            <pc:sldMk cId="3398826638" sldId="261"/>
-            <ac:cxnSpMk id="22" creationId="{42F77A01-8C3E-69F6-8992-7F23C294C3D2}"/>
-          </ac:cxnSpMkLst>
-        </pc:cxnChg>
-        <pc:cxnChg chg="add mod">
-          <ac:chgData name="Murthy, Rajeswari K." userId="e10ba283-73eb-4d51-9d76-4c1024dd953b" providerId="ADAL" clId="{9D5F3A72-DC95-4AD1-BEF4-8CF1AE0745BD}" dt="2022-07-19T14:49:17.456" v="1012" actId="1076"/>
-          <ac:cxnSpMkLst>
-            <pc:docMk/>
-            <pc:sldMk cId="3398826638" sldId="261"/>
-            <ac:cxnSpMk id="23" creationId="{AF83B012-8DEA-92CF-CE61-952A0833D50D}"/>
-          </ac:cxnSpMkLst>
-        </pc:cxnChg>
-        <pc:cxnChg chg="add mod">
-          <ac:chgData name="Murthy, Rajeswari K." userId="e10ba283-73eb-4d51-9d76-4c1024dd953b" providerId="ADAL" clId="{9D5F3A72-DC95-4AD1-BEF4-8CF1AE0745BD}" dt="2022-07-19T14:49:17.456" v="1012" actId="1076"/>
-          <ac:cxnSpMkLst>
-            <pc:docMk/>
-            <pc:sldMk cId="3398826638" sldId="261"/>
-            <ac:cxnSpMk id="24" creationId="{A552E4DE-D227-51B5-7265-CEF21DA6E2B9}"/>
-          </ac:cxnSpMkLst>
-        </pc:cxnChg>
-        <pc:cxnChg chg="add mod">
-          <ac:chgData name="Murthy, Rajeswari K." userId="e10ba283-73eb-4d51-9d76-4c1024dd953b" providerId="ADAL" clId="{9D5F3A72-DC95-4AD1-BEF4-8CF1AE0745BD}" dt="2022-07-19T14:49:17.456" v="1012" actId="1076"/>
-          <ac:cxnSpMkLst>
-            <pc:docMk/>
-            <pc:sldMk cId="3398826638" sldId="261"/>
-            <ac:cxnSpMk id="25" creationId="{DC09D1C3-23DF-FB85-640E-739F0E912667}"/>
-          </ac:cxnSpMkLst>
-        </pc:cxnChg>
-        <pc:cxnChg chg="add del mod">
-          <ac:chgData name="Murthy, Rajeswari K." userId="e10ba283-73eb-4d51-9d76-4c1024dd953b" providerId="ADAL" clId="{9D5F3A72-DC95-4AD1-BEF4-8CF1AE0745BD}" dt="2022-07-19T11:01:35.134" v="302" actId="478"/>
-          <ac:cxnSpMkLst>
-            <pc:docMk/>
-            <pc:sldMk cId="3398826638" sldId="261"/>
-            <ac:cxnSpMk id="26" creationId="{A6349D3C-1F6D-E146-A03A-124EDB5F48B5}"/>
-          </ac:cxnSpMkLst>
-        </pc:cxnChg>
-        <pc:cxnChg chg="add mod">
-          <ac:chgData name="Murthy, Rajeswari K." userId="e10ba283-73eb-4d51-9d76-4c1024dd953b" providerId="ADAL" clId="{9D5F3A72-DC95-4AD1-BEF4-8CF1AE0745BD}" dt="2022-07-19T14:49:17.456" v="1012" actId="1076"/>
-          <ac:cxnSpMkLst>
-            <pc:docMk/>
-            <pc:sldMk cId="3398826638" sldId="261"/>
-            <ac:cxnSpMk id="31" creationId="{CFAF9544-7214-1F65-5D00-582FE18894DD}"/>
-          </ac:cxnSpMkLst>
-        </pc:cxnChg>
-        <pc:cxnChg chg="add mod">
-          <ac:chgData name="Murthy, Rajeswari K." userId="e10ba283-73eb-4d51-9d76-4c1024dd953b" providerId="ADAL" clId="{9D5F3A72-DC95-4AD1-BEF4-8CF1AE0745BD}" dt="2022-07-20T08:59:08.230" v="1537" actId="1037"/>
-          <ac:cxnSpMkLst>
-            <pc:docMk/>
-            <pc:sldMk cId="3398826638" sldId="261"/>
-            <ac:cxnSpMk id="33" creationId="{A6AD977E-126A-F492-38F8-D9978479ED1A}"/>
-          </ac:cxnSpMkLst>
-        </pc:cxnChg>
-        <pc:cxnChg chg="add mod">
-          <ac:chgData name="Murthy, Rajeswari K." userId="e10ba283-73eb-4d51-9d76-4c1024dd953b" providerId="ADAL" clId="{9D5F3A72-DC95-4AD1-BEF4-8CF1AE0745BD}" dt="2022-07-19T14:49:17.456" v="1012" actId="1076"/>
-          <ac:cxnSpMkLst>
-            <pc:docMk/>
-            <pc:sldMk cId="3398826638" sldId="261"/>
-            <ac:cxnSpMk id="34" creationId="{4E8F08E3-0AFD-6F21-1B8B-50D64060AD91}"/>
-          </ac:cxnSpMkLst>
-        </pc:cxnChg>
-        <pc:cxnChg chg="add del mod">
-          <ac:chgData name="Murthy, Rajeswari K." userId="e10ba283-73eb-4d51-9d76-4c1024dd953b" providerId="ADAL" clId="{9D5F3A72-DC95-4AD1-BEF4-8CF1AE0745BD}" dt="2022-07-20T08:58:46.533" v="1482" actId="478"/>
-          <ac:cxnSpMkLst>
-            <pc:docMk/>
-            <pc:sldMk cId="3398826638" sldId="261"/>
-            <ac:cxnSpMk id="35" creationId="{6DC68C8E-C10F-382F-272F-1970D837413B}"/>
-          </ac:cxnSpMkLst>
-        </pc:cxnChg>
-        <pc:cxnChg chg="add del mod">
-          <ac:chgData name="Murthy, Rajeswari K." userId="e10ba283-73eb-4d51-9d76-4c1024dd953b" providerId="ADAL" clId="{9D5F3A72-DC95-4AD1-BEF4-8CF1AE0745BD}" dt="2022-07-19T13:42:15.089" v="513" actId="478"/>
-          <ac:cxnSpMkLst>
-            <pc:docMk/>
-            <pc:sldMk cId="3398826638" sldId="261"/>
-            <ac:cxnSpMk id="40" creationId="{4DA9715C-D209-334A-1FED-6DBD241845B9}"/>
-          </ac:cxnSpMkLst>
-        </pc:cxnChg>
-        <pc:cxnChg chg="add mod">
-          <ac:chgData name="Murthy, Rajeswari K." userId="e10ba283-73eb-4d51-9d76-4c1024dd953b" providerId="ADAL" clId="{9D5F3A72-DC95-4AD1-BEF4-8CF1AE0745BD}" dt="2022-07-19T14:42:02.932" v="950" actId="1076"/>
-          <ac:cxnSpMkLst>
-            <pc:docMk/>
-            <pc:sldMk cId="3398826638" sldId="261"/>
-            <ac:cxnSpMk id="59" creationId="{EBEB975D-3157-8D41-766D-31BD8A256A77}"/>
-          </ac:cxnSpMkLst>
-        </pc:cxnChg>
-        <pc:cxnChg chg="add mod">
-          <ac:chgData name="Murthy, Rajeswari K." userId="e10ba283-73eb-4d51-9d76-4c1024dd953b" providerId="ADAL" clId="{9D5F3A72-DC95-4AD1-BEF4-8CF1AE0745BD}" dt="2022-07-19T14:42:02.932" v="950" actId="1076"/>
-          <ac:cxnSpMkLst>
-            <pc:docMk/>
-            <pc:sldMk cId="3398826638" sldId="261"/>
-            <ac:cxnSpMk id="62" creationId="{361694C3-803B-5682-C8E8-CA20E4186745}"/>
-          </ac:cxnSpMkLst>
-        </pc:cxnChg>
-        <pc:cxnChg chg="add mod">
-          <ac:chgData name="Murthy, Rajeswari K." userId="e10ba283-73eb-4d51-9d76-4c1024dd953b" providerId="ADAL" clId="{9D5F3A72-DC95-4AD1-BEF4-8CF1AE0745BD}" dt="2022-07-19T14:42:02.932" v="950" actId="1076"/>
-          <ac:cxnSpMkLst>
-            <pc:docMk/>
-            <pc:sldMk cId="3398826638" sldId="261"/>
-            <ac:cxnSpMk id="64" creationId="{C97CDAD4-11D4-AADC-4DD5-8AD3F4B1C081}"/>
-          </ac:cxnSpMkLst>
-        </pc:cxnChg>
-        <pc:cxnChg chg="add mod">
-          <ac:chgData name="Murthy, Rajeswari K." userId="e10ba283-73eb-4d51-9d76-4c1024dd953b" providerId="ADAL" clId="{9D5F3A72-DC95-4AD1-BEF4-8CF1AE0745BD}" dt="2022-07-19T14:42:02.932" v="950" actId="1076"/>
-          <ac:cxnSpMkLst>
-            <pc:docMk/>
-            <pc:sldMk cId="3398826638" sldId="261"/>
-            <ac:cxnSpMk id="66" creationId="{737DC637-0DAF-00A3-AC19-FE908D3FD4D7}"/>
-          </ac:cxnSpMkLst>
-        </pc:cxnChg>
-      </pc:sldChg>
-      <pc:sldChg chg="addSp delSp modSp new mod ord">
-        <pc:chgData name="Murthy, Rajeswari K." userId="e10ba283-73eb-4d51-9d76-4c1024dd953b" providerId="ADAL" clId="{9D5F3A72-DC95-4AD1-BEF4-8CF1AE0745BD}" dt="2022-07-19T14:47:42.764" v="1001" actId="20577"/>
-        <pc:sldMkLst>
-          <pc:docMk/>
-          <pc:sldMk cId="4068422202" sldId="262"/>
-        </pc:sldMkLst>
-        <pc:spChg chg="add del mod">
-          <ac:chgData name="Murthy, Rajeswari K." userId="e10ba283-73eb-4d51-9d76-4c1024dd953b" providerId="ADAL" clId="{9D5F3A72-DC95-4AD1-BEF4-8CF1AE0745BD}" dt="2022-07-19T14:46:16.687" v="955"/>
-          <ac:spMkLst>
-            <pc:docMk/>
-            <pc:sldMk cId="4068422202" sldId="262"/>
-            <ac:spMk id="2" creationId="{5AF3F250-FC5C-3A1B-70A3-2A35D687DF9A}"/>
-          </ac:spMkLst>
-        </pc:spChg>
-        <pc:spChg chg="add mod">
-          <ac:chgData name="Murthy, Rajeswari K." userId="e10ba283-73eb-4d51-9d76-4c1024dd953b" providerId="ADAL" clId="{9D5F3A72-DC95-4AD1-BEF4-8CF1AE0745BD}" dt="2022-07-19T14:47:42.764" v="1001" actId="20577"/>
-          <ac:spMkLst>
-            <pc:docMk/>
-            <pc:sldMk cId="4068422202" sldId="262"/>
-            <ac:spMk id="5" creationId="{8360D34D-6E19-7816-BF8B-49FAE633654F}"/>
-          </ac:spMkLst>
-        </pc:spChg>
-        <pc:picChg chg="add del">
-          <ac:chgData name="Murthy, Rajeswari K." userId="e10ba283-73eb-4d51-9d76-4c1024dd953b" providerId="ADAL" clId="{9D5F3A72-DC95-4AD1-BEF4-8CF1AE0745BD}" dt="2022-07-19T14:46:23.212" v="957"/>
-          <ac:picMkLst>
-            <pc:docMk/>
-            <pc:sldMk cId="4068422202" sldId="262"/>
-            <ac:picMk id="3" creationId="{310E64AE-988E-E44D-A3D4-F0FBE33DD1D2}"/>
-          </ac:picMkLst>
-        </pc:picChg>
-        <pc:picChg chg="add mod">
-          <ac:chgData name="Murthy, Rajeswari K." userId="e10ba283-73eb-4d51-9d76-4c1024dd953b" providerId="ADAL" clId="{9D5F3A72-DC95-4AD1-BEF4-8CF1AE0745BD}" dt="2022-07-19T14:47:11.402" v="959" actId="14100"/>
-          <ac:picMkLst>
-            <pc:docMk/>
-            <pc:sldMk cId="4068422202" sldId="262"/>
-            <ac:picMk id="4" creationId="{8B31AFE4-502B-7F07-EB1C-3AC5945DC978}"/>
-          </ac:picMkLst>
-        </pc:picChg>
-      </pc:sldChg>
-      <pc:sldChg chg="addSp modSp new mod ord">
-        <pc:chgData name="Murthy, Rajeswari K." userId="e10ba283-73eb-4d51-9d76-4c1024dd953b" providerId="ADAL" clId="{9D5F3A72-DC95-4AD1-BEF4-8CF1AE0745BD}" dt="2022-07-20T11:06:05.211" v="2180" actId="1076"/>
-        <pc:sldMkLst>
-          <pc:docMk/>
-          <pc:sldMk cId="4217913550" sldId="263"/>
-        </pc:sldMkLst>
-        <pc:spChg chg="add mod">
-          <ac:chgData name="Murthy, Rajeswari K." userId="e10ba283-73eb-4d51-9d76-4c1024dd953b" providerId="ADAL" clId="{9D5F3A72-DC95-4AD1-BEF4-8CF1AE0745BD}" dt="2022-07-20T11:06:05.211" v="2180" actId="1076"/>
-          <ac:spMkLst>
-            <pc:docMk/>
-            <pc:sldMk cId="4217913550" sldId="263"/>
-            <ac:spMk id="3" creationId="{44CB8F40-D6A7-240D-B600-818E26CC1CFF}"/>
-          </ac:spMkLst>
-        </pc:spChg>
-        <pc:picChg chg="add">
-          <ac:chgData name="Murthy, Rajeswari K." userId="e10ba283-73eb-4d51-9d76-4c1024dd953b" providerId="ADAL" clId="{9D5F3A72-DC95-4AD1-BEF4-8CF1AE0745BD}" dt="2022-07-20T07:27:37.044" v="1324"/>
-          <ac:picMkLst>
-            <pc:docMk/>
-            <pc:sldMk cId="4217913550" sldId="263"/>
-            <ac:picMk id="2" creationId="{08F1CE91-C5BD-6B74-3998-645B19CAEF39}"/>
-          </ac:picMkLst>
-        </pc:picChg>
-      </pc:sldChg>
-      <pc:sldChg chg="addSp delSp modSp add mod ord">
-        <pc:chgData name="Murthy, Rajeswari K." userId="e10ba283-73eb-4d51-9d76-4c1024dd953b" providerId="ADAL" clId="{9D5F3A72-DC95-4AD1-BEF4-8CF1AE0745BD}" dt="2022-07-20T11:04:25.021" v="2177"/>
-        <pc:sldMkLst>
-          <pc:docMk/>
-          <pc:sldMk cId="970682747" sldId="264"/>
-        </pc:sldMkLst>
-        <pc:spChg chg="mod">
-          <ac:chgData name="Murthy, Rajeswari K." userId="e10ba283-73eb-4d51-9d76-4c1024dd953b" providerId="ADAL" clId="{9D5F3A72-DC95-4AD1-BEF4-8CF1AE0745BD}" dt="2022-07-20T10:53:14.609" v="2047" actId="1076"/>
-          <ac:spMkLst>
-            <pc:docMk/>
-            <pc:sldMk cId="970682747" sldId="264"/>
-            <ac:spMk id="5" creationId="{8360D34D-6E19-7816-BF8B-49FAE633654F}"/>
-          </ac:spMkLst>
-        </pc:spChg>
-        <pc:spChg chg="add del">
-          <ac:chgData name="Murthy, Rajeswari K." userId="e10ba283-73eb-4d51-9d76-4c1024dd953b" providerId="ADAL" clId="{9D5F3A72-DC95-4AD1-BEF4-8CF1AE0745BD}" dt="2022-07-20T08:33:20.604" v="1382" actId="22"/>
-          <ac:spMkLst>
-            <pc:docMk/>
-            <pc:sldMk cId="970682747" sldId="264"/>
-            <ac:spMk id="6" creationId="{10283EFA-8BD7-F66E-A468-75C266F6F46A}"/>
-          </ac:spMkLst>
-        </pc:spChg>
-        <pc:spChg chg="add del">
-          <ac:chgData name="Murthy, Rajeswari K." userId="e10ba283-73eb-4d51-9d76-4c1024dd953b" providerId="ADAL" clId="{9D5F3A72-DC95-4AD1-BEF4-8CF1AE0745BD}" dt="2022-07-20T08:33:58.172" v="1385" actId="478"/>
-          <ac:spMkLst>
-            <pc:docMk/>
-            <pc:sldMk cId="970682747" sldId="264"/>
-            <ac:spMk id="7" creationId="{693AC76C-7547-8F62-FC9A-197CAF5743BE}"/>
-          </ac:spMkLst>
-        </pc:spChg>
-        <pc:spChg chg="add mod">
-          <ac:chgData name="Murthy, Rajeswari K." userId="e10ba283-73eb-4d51-9d76-4c1024dd953b" providerId="ADAL" clId="{9D5F3A72-DC95-4AD1-BEF4-8CF1AE0745BD}" dt="2022-07-20T10:53:04.942" v="2033" actId="1038"/>
-          <ac:spMkLst>
-            <pc:docMk/>
-            <pc:sldMk cId="970682747" sldId="264"/>
-            <ac:spMk id="10" creationId="{0FFE9543-C011-3F86-F186-F163DBB97F17}"/>
-          </ac:spMkLst>
-        </pc:spChg>
-        <pc:spChg chg="add mod">
-          <ac:chgData name="Murthy, Rajeswari K." userId="e10ba283-73eb-4d51-9d76-4c1024dd953b" providerId="ADAL" clId="{9D5F3A72-DC95-4AD1-BEF4-8CF1AE0745BD}" dt="2022-07-20T10:48:11.935" v="1743" actId="1076"/>
-          <ac:spMkLst>
-            <pc:docMk/>
-            <pc:sldMk cId="970682747" sldId="264"/>
-            <ac:spMk id="12" creationId="{E326DB06-52DA-D775-3A90-0DB031E1765E}"/>
-          </ac:spMkLst>
-        </pc:spChg>
-        <pc:spChg chg="add mod">
-          <ac:chgData name="Murthy, Rajeswari K." userId="e10ba283-73eb-4d51-9d76-4c1024dd953b" providerId="ADAL" clId="{9D5F3A72-DC95-4AD1-BEF4-8CF1AE0745BD}" dt="2022-07-20T10:48:09.627" v="1742" actId="1076"/>
-          <ac:spMkLst>
-            <pc:docMk/>
-            <pc:sldMk cId="970682747" sldId="264"/>
-            <ac:spMk id="13" creationId="{610D38E0-9B66-C678-C37C-3FF01A18467F}"/>
-          </ac:spMkLst>
-        </pc:spChg>
-        <pc:spChg chg="add mod">
-          <ac:chgData name="Murthy, Rajeswari K." userId="e10ba283-73eb-4d51-9d76-4c1024dd953b" providerId="ADAL" clId="{9D5F3A72-DC95-4AD1-BEF4-8CF1AE0745BD}" dt="2022-07-20T10:48:07.163" v="1741" actId="1076"/>
-          <ac:spMkLst>
-            <pc:docMk/>
-            <pc:sldMk cId="970682747" sldId="264"/>
-            <ac:spMk id="14" creationId="{FB76E283-70AB-8FF9-E4BE-A09DA6BC1FE6}"/>
-          </ac:spMkLst>
-        </pc:spChg>
-        <pc:spChg chg="add mod">
-          <ac:chgData name="Murthy, Rajeswari K." userId="e10ba283-73eb-4d51-9d76-4c1024dd953b" providerId="ADAL" clId="{9D5F3A72-DC95-4AD1-BEF4-8CF1AE0745BD}" dt="2022-07-20T10:50:31.179" v="1866" actId="1038"/>
-          <ac:spMkLst>
-            <pc:docMk/>
-            <pc:sldMk cId="970682747" sldId="264"/>
-            <ac:spMk id="15" creationId="{A32E30B2-5CEF-4ABB-F656-2960456CD261}"/>
-          </ac:spMkLst>
-        </pc:spChg>
-        <pc:spChg chg="add mod">
-          <ac:chgData name="Murthy, Rajeswari K." userId="e10ba283-73eb-4d51-9d76-4c1024dd953b" providerId="ADAL" clId="{9D5F3A72-DC95-4AD1-BEF4-8CF1AE0745BD}" dt="2022-07-20T10:50:31.179" v="1866" actId="1038"/>
-          <ac:spMkLst>
-            <pc:docMk/>
-            <pc:sldMk cId="970682747" sldId="264"/>
-            <ac:spMk id="16" creationId="{F5D09F3F-F5C1-E469-83DF-94D5FFE99E27}"/>
-          </ac:spMkLst>
-        </pc:spChg>
-        <pc:spChg chg="add mod">
-          <ac:chgData name="Murthy, Rajeswari K." userId="e10ba283-73eb-4d51-9d76-4c1024dd953b" providerId="ADAL" clId="{9D5F3A72-DC95-4AD1-BEF4-8CF1AE0745BD}" dt="2022-07-20T10:53:24.088" v="2075" actId="1037"/>
-          <ac:spMkLst>
-            <pc:docMk/>
-            <pc:sldMk cId="970682747" sldId="264"/>
-            <ac:spMk id="17" creationId="{DF0D0BBB-8461-8F27-53C4-F7805A113FB1}"/>
-          </ac:spMkLst>
-        </pc:spChg>
-        <pc:spChg chg="add mod">
-          <ac:chgData name="Murthy, Rajeswari K." userId="e10ba283-73eb-4d51-9d76-4c1024dd953b" providerId="ADAL" clId="{9D5F3A72-DC95-4AD1-BEF4-8CF1AE0745BD}" dt="2022-07-20T10:50:31.179" v="1866" actId="1038"/>
-          <ac:spMkLst>
-            <pc:docMk/>
-            <pc:sldMk cId="970682747" sldId="264"/>
-            <ac:spMk id="18" creationId="{8CE0E5F2-D8DF-DFCF-7EF6-81DD0F83D6B6}"/>
-          </ac:spMkLst>
-        </pc:spChg>
-        <pc:spChg chg="add mod">
-          <ac:chgData name="Murthy, Rajeswari K." userId="e10ba283-73eb-4d51-9d76-4c1024dd953b" providerId="ADAL" clId="{9D5F3A72-DC95-4AD1-BEF4-8CF1AE0745BD}" dt="2022-07-20T10:52:36.926" v="1990" actId="1038"/>
-          <ac:spMkLst>
-            <pc:docMk/>
-            <pc:sldMk cId="970682747" sldId="264"/>
-            <ac:spMk id="19" creationId="{86148B60-EDEE-0254-6871-76894956FC74}"/>
-          </ac:spMkLst>
-        </pc:spChg>
-        <pc:spChg chg="add mod">
-          <ac:chgData name="Murthy, Rajeswari K." userId="e10ba283-73eb-4d51-9d76-4c1024dd953b" providerId="ADAL" clId="{9D5F3A72-DC95-4AD1-BEF4-8CF1AE0745BD}" dt="2022-07-20T10:51:19.144" v="1903" actId="1038"/>
-          <ac:spMkLst>
-            <pc:docMk/>
-            <pc:sldMk cId="970682747" sldId="264"/>
-            <ac:spMk id="20" creationId="{E78B3E44-BFA6-6AD2-060B-E2E0EB89AF1B}"/>
-          </ac:spMkLst>
-        </pc:spChg>
-        <pc:spChg chg="add mod">
-          <ac:chgData name="Murthy, Rajeswari K." userId="e10ba283-73eb-4d51-9d76-4c1024dd953b" providerId="ADAL" clId="{9D5F3A72-DC95-4AD1-BEF4-8CF1AE0745BD}" dt="2022-07-20T10:50:31.179" v="1866" actId="1038"/>
-          <ac:spMkLst>
-            <pc:docMk/>
-            <pc:sldMk cId="970682747" sldId="264"/>
-            <ac:spMk id="24" creationId="{9B743E49-CC98-3A34-D7E5-DECF1773FD51}"/>
-          </ac:spMkLst>
-        </pc:spChg>
-        <pc:spChg chg="add mod">
-          <ac:chgData name="Murthy, Rajeswari K." userId="e10ba283-73eb-4d51-9d76-4c1024dd953b" providerId="ADAL" clId="{9D5F3A72-DC95-4AD1-BEF4-8CF1AE0745BD}" dt="2022-07-20T10:51:19.144" v="1903" actId="1038"/>
-          <ac:spMkLst>
-            <pc:docMk/>
-            <pc:sldMk cId="970682747" sldId="264"/>
-            <ac:spMk id="28" creationId="{9E7A2088-2206-71CD-CC95-1477FA63AB0A}"/>
-          </ac:spMkLst>
-        </pc:spChg>
-        <pc:spChg chg="add mod">
-          <ac:chgData name="Murthy, Rajeswari K." userId="e10ba283-73eb-4d51-9d76-4c1024dd953b" providerId="ADAL" clId="{9D5F3A72-DC95-4AD1-BEF4-8CF1AE0745BD}" dt="2022-07-20T10:51:19.144" v="1903" actId="1038"/>
-          <ac:spMkLst>
-            <pc:docMk/>
-            <pc:sldMk cId="970682747" sldId="264"/>
-            <ac:spMk id="29" creationId="{B13EF465-3F92-DC30-6E2A-85E73D1B58ED}"/>
-          </ac:spMkLst>
-        </pc:spChg>
-        <pc:spChg chg="add mod">
-          <ac:chgData name="Murthy, Rajeswari K." userId="e10ba283-73eb-4d51-9d76-4c1024dd953b" providerId="ADAL" clId="{9D5F3A72-DC95-4AD1-BEF4-8CF1AE0745BD}" dt="2022-07-20T10:51:19.144" v="1903" actId="1038"/>
-          <ac:spMkLst>
-            <pc:docMk/>
-            <pc:sldMk cId="970682747" sldId="264"/>
-            <ac:spMk id="30" creationId="{022DDEC3-99F9-D119-52C8-ACA0BD0B5E7B}"/>
-          </ac:spMkLst>
-        </pc:spChg>
-        <pc:spChg chg="add mod">
-          <ac:chgData name="Murthy, Rajeswari K." userId="e10ba283-73eb-4d51-9d76-4c1024dd953b" providerId="ADAL" clId="{9D5F3A72-DC95-4AD1-BEF4-8CF1AE0745BD}" dt="2022-07-20T10:54:32.901" v="2106" actId="1035"/>
-          <ac:spMkLst>
-            <pc:docMk/>
-            <pc:sldMk cId="970682747" sldId="264"/>
-            <ac:spMk id="31" creationId="{E6282C95-EB77-2C3C-2A9B-42EA58186663}"/>
-          </ac:spMkLst>
-        </pc:spChg>
-        <pc:spChg chg="add mod">
-          <ac:chgData name="Murthy, Rajeswari K." userId="e10ba283-73eb-4d51-9d76-4c1024dd953b" providerId="ADAL" clId="{9D5F3A72-DC95-4AD1-BEF4-8CF1AE0745BD}" dt="2022-07-20T10:52:36.926" v="1990" actId="1038"/>
-          <ac:spMkLst>
-            <pc:docMk/>
-            <pc:sldMk cId="970682747" sldId="264"/>
-            <ac:spMk id="41" creationId="{A15C0E77-6388-915F-DE3B-FAC234B083C4}"/>
-          </ac:spMkLst>
-        </pc:spChg>
-        <pc:spChg chg="add mod">
-          <ac:chgData name="Murthy, Rajeswari K." userId="e10ba283-73eb-4d51-9d76-4c1024dd953b" providerId="ADAL" clId="{9D5F3A72-DC95-4AD1-BEF4-8CF1AE0745BD}" dt="2022-07-20T10:55:02.604" v="2120" actId="1036"/>
-          <ac:spMkLst>
-            <pc:docMk/>
-            <pc:sldMk cId="970682747" sldId="264"/>
-            <ac:spMk id="42" creationId="{BB3FF1CE-3F37-3A75-3609-345ADFB25DD5}"/>
-          </ac:spMkLst>
-        </pc:spChg>
-        <pc:picChg chg="add del mod">
-          <ac:chgData name="Murthy, Rajeswari K." userId="e10ba283-73eb-4d51-9d76-4c1024dd953b" providerId="ADAL" clId="{9D5F3A72-DC95-4AD1-BEF4-8CF1AE0745BD}" dt="2022-07-20T08:37:32.985" v="1388" actId="478"/>
-          <ac:picMkLst>
-            <pc:docMk/>
-            <pc:sldMk cId="970682747" sldId="264"/>
-            <ac:picMk id="3" creationId="{18D689D5-5E61-68A2-FD99-2C26CE1D5713}"/>
-          </ac:picMkLst>
-        </pc:picChg>
-        <pc:picChg chg="del mod">
-          <ac:chgData name="Murthy, Rajeswari K." userId="e10ba283-73eb-4d51-9d76-4c1024dd953b" providerId="ADAL" clId="{9D5F3A72-DC95-4AD1-BEF4-8CF1AE0745BD}" dt="2022-07-20T08:31:36.615" v="1380" actId="478"/>
-          <ac:picMkLst>
-            <pc:docMk/>
-            <pc:sldMk cId="970682747" sldId="264"/>
-            <ac:picMk id="4" creationId="{8B31AFE4-502B-7F07-EB1C-3AC5945DC978}"/>
-          </ac:picMkLst>
-        </pc:picChg>
-        <pc:picChg chg="add mod">
-          <ac:chgData name="Murthy, Rajeswari K." userId="e10ba283-73eb-4d51-9d76-4c1024dd953b" providerId="ADAL" clId="{9D5F3A72-DC95-4AD1-BEF4-8CF1AE0745BD}" dt="2022-07-20T10:53:24.088" v="2075" actId="1037"/>
-          <ac:picMkLst>
-            <pc:docMk/>
-            <pc:sldMk cId="970682747" sldId="264"/>
-            <ac:picMk id="8" creationId="{0130E0D2-0B57-6B32-6380-6F9809045268}"/>
-          </ac:picMkLst>
-        </pc:picChg>
-        <pc:picChg chg="add mod">
-          <ac:chgData name="Murthy, Rajeswari K." userId="e10ba283-73eb-4d51-9d76-4c1024dd953b" providerId="ADAL" clId="{9D5F3A72-DC95-4AD1-BEF4-8CF1AE0745BD}" dt="2022-07-20T10:52:57.391" v="2006" actId="1038"/>
-          <ac:picMkLst>
-            <pc:docMk/>
-            <pc:sldMk cId="970682747" sldId="264"/>
-            <ac:picMk id="9" creationId="{2AA744A4-017F-E2BA-CFCE-333EA1DCB9A1}"/>
-          </ac:picMkLst>
-        </pc:picChg>
-        <pc:picChg chg="add mod">
-          <ac:chgData name="Murthy, Rajeswari K." userId="e10ba283-73eb-4d51-9d76-4c1024dd953b" providerId="ADAL" clId="{9D5F3A72-DC95-4AD1-BEF4-8CF1AE0745BD}" dt="2022-07-20T10:56:02.321" v="2124" actId="1076"/>
-          <ac:picMkLst>
-            <pc:docMk/>
-            <pc:sldMk cId="970682747" sldId="264"/>
-            <ac:picMk id="65" creationId="{AC74BD2A-FB8C-2239-2C82-4BDAF3F4125A}"/>
-          </ac:picMkLst>
-        </pc:picChg>
-        <pc:picChg chg="add mod">
-          <ac:chgData name="Murthy, Rajeswari K." userId="e10ba283-73eb-4d51-9d76-4c1024dd953b" providerId="ADAL" clId="{9D5F3A72-DC95-4AD1-BEF4-8CF1AE0745BD}" dt="2022-07-20T10:56:33.245" v="2129" actId="1076"/>
-          <ac:picMkLst>
-            <pc:docMk/>
-            <pc:sldMk cId="970682747" sldId="264"/>
-            <ac:picMk id="66" creationId="{D03D0195-A3FE-203C-0943-4CABCA6C5CBA}"/>
-          </ac:picMkLst>
-        </pc:picChg>
-        <pc:picChg chg="add mod">
-          <ac:chgData name="Murthy, Rajeswari K." userId="e10ba283-73eb-4d51-9d76-4c1024dd953b" providerId="ADAL" clId="{9D5F3A72-DC95-4AD1-BEF4-8CF1AE0745BD}" dt="2022-07-20T10:57:05.289" v="2132" actId="1076"/>
-          <ac:picMkLst>
-            <pc:docMk/>
-            <pc:sldMk cId="970682747" sldId="264"/>
-            <ac:picMk id="67" creationId="{C2DCC7D4-560B-0FE2-3F2D-8C87F0331478}"/>
-          </ac:picMkLst>
-        </pc:picChg>
-        <pc:picChg chg="add del mod">
-          <ac:chgData name="Murthy, Rajeswari K." userId="e10ba283-73eb-4d51-9d76-4c1024dd953b" providerId="ADAL" clId="{9D5F3A72-DC95-4AD1-BEF4-8CF1AE0745BD}" dt="2022-07-20T10:57:30.850" v="2136" actId="478"/>
-          <ac:picMkLst>
-            <pc:docMk/>
-            <pc:sldMk cId="970682747" sldId="264"/>
-            <ac:picMk id="68" creationId="{B7D2137B-87CD-FDB4-7769-5B7E93F8B335}"/>
-          </ac:picMkLst>
-        </pc:picChg>
-        <pc:picChg chg="add mod">
-          <ac:chgData name="Murthy, Rajeswari K." userId="e10ba283-73eb-4d51-9d76-4c1024dd953b" providerId="ADAL" clId="{9D5F3A72-DC95-4AD1-BEF4-8CF1AE0745BD}" dt="2022-07-20T10:57:54.765" v="2139" actId="1076"/>
-          <ac:picMkLst>
-            <pc:docMk/>
-            <pc:sldMk cId="970682747" sldId="264"/>
-            <ac:picMk id="69" creationId="{4DF495C3-DC26-A0E0-DABE-959F1C9E2D09}"/>
-          </ac:picMkLst>
-        </pc:picChg>
-        <pc:picChg chg="add del">
-          <ac:chgData name="Murthy, Rajeswari K." userId="e10ba283-73eb-4d51-9d76-4c1024dd953b" providerId="ADAL" clId="{9D5F3A72-DC95-4AD1-BEF4-8CF1AE0745BD}" dt="2022-07-20T10:58:12.937" v="2141"/>
-          <ac:picMkLst>
-            <pc:docMk/>
-            <pc:sldMk cId="970682747" sldId="264"/>
-            <ac:picMk id="70" creationId="{3DC3DED1-B8F5-2847-FBA3-E4B406C677CE}"/>
-          </ac:picMkLst>
-        </pc:picChg>
-        <pc:picChg chg="add mod">
-          <ac:chgData name="Murthy, Rajeswari K." userId="e10ba283-73eb-4d51-9d76-4c1024dd953b" providerId="ADAL" clId="{9D5F3A72-DC95-4AD1-BEF4-8CF1AE0745BD}" dt="2022-07-20T10:58:28.194" v="2144" actId="1076"/>
-          <ac:picMkLst>
-            <pc:docMk/>
-            <pc:sldMk cId="970682747" sldId="264"/>
-            <ac:picMk id="71" creationId="{AEE980F5-4E6D-3ACC-4C7D-5266E0D3443D}"/>
-          </ac:picMkLst>
-        </pc:picChg>
-        <pc:picChg chg="add mod">
-          <ac:chgData name="Murthy, Rajeswari K." userId="e10ba283-73eb-4d51-9d76-4c1024dd953b" providerId="ADAL" clId="{9D5F3A72-DC95-4AD1-BEF4-8CF1AE0745BD}" dt="2022-07-20T10:58:56.842" v="2148" actId="1076"/>
-          <ac:picMkLst>
-            <pc:docMk/>
-            <pc:sldMk cId="970682747" sldId="264"/>
-            <ac:picMk id="72" creationId="{BAAE6EF8-FB44-E955-B4E2-D65D9B58A90B}"/>
-          </ac:picMkLst>
-        </pc:picChg>
-        <pc:picChg chg="add mod">
-          <ac:chgData name="Murthy, Rajeswari K." userId="e10ba283-73eb-4d51-9d76-4c1024dd953b" providerId="ADAL" clId="{9D5F3A72-DC95-4AD1-BEF4-8CF1AE0745BD}" dt="2022-07-20T10:59:21.728" v="2151" actId="1076"/>
-          <ac:picMkLst>
-            <pc:docMk/>
-            <pc:sldMk cId="970682747" sldId="264"/>
-            <ac:picMk id="73" creationId="{A9EF7B6D-8874-C0FF-FBB5-F09ECA8B6834}"/>
-          </ac:picMkLst>
-        </pc:picChg>
-        <pc:picChg chg="add mod">
-          <ac:chgData name="Murthy, Rajeswari K." userId="e10ba283-73eb-4d51-9d76-4c1024dd953b" providerId="ADAL" clId="{9D5F3A72-DC95-4AD1-BEF4-8CF1AE0745BD}" dt="2022-07-20T10:59:52.276" v="2154" actId="1076"/>
-          <ac:picMkLst>
-            <pc:docMk/>
-            <pc:sldMk cId="970682747" sldId="264"/>
-            <ac:picMk id="74" creationId="{FABA17CA-A0D0-D358-2FE4-784006C262D2}"/>
-          </ac:picMkLst>
-        </pc:picChg>
-        <pc:picChg chg="add mod">
-          <ac:chgData name="Murthy, Rajeswari K." userId="e10ba283-73eb-4d51-9d76-4c1024dd953b" providerId="ADAL" clId="{9D5F3A72-DC95-4AD1-BEF4-8CF1AE0745BD}" dt="2022-07-20T11:00:20.277" v="2157" actId="1076"/>
-          <ac:picMkLst>
-            <pc:docMk/>
-            <pc:sldMk cId="970682747" sldId="264"/>
-            <ac:picMk id="75" creationId="{A17B5A71-BD33-8B8B-E3F8-AC9F4C9AE49B}"/>
-          </ac:picMkLst>
-        </pc:picChg>
-        <pc:picChg chg="add del">
-          <ac:chgData name="Murthy, Rajeswari K." userId="e10ba283-73eb-4d51-9d76-4c1024dd953b" providerId="ADAL" clId="{9D5F3A72-DC95-4AD1-BEF4-8CF1AE0745BD}" dt="2022-07-20T11:01:01.005" v="2159" actId="478"/>
-          <ac:picMkLst>
-            <pc:docMk/>
-            <pc:sldMk cId="970682747" sldId="264"/>
-            <ac:picMk id="76" creationId="{856CF455-8007-3E46-FD93-3D8D4A8AD358}"/>
-          </ac:picMkLst>
-        </pc:picChg>
-        <pc:picChg chg="add mod">
-          <ac:chgData name="Murthy, Rajeswari K." userId="e10ba283-73eb-4d51-9d76-4c1024dd953b" providerId="ADAL" clId="{9D5F3A72-DC95-4AD1-BEF4-8CF1AE0745BD}" dt="2022-07-20T11:01:32.744" v="2162" actId="1076"/>
-          <ac:picMkLst>
-            <pc:docMk/>
-            <pc:sldMk cId="970682747" sldId="264"/>
-            <ac:picMk id="77" creationId="{7E9336FA-7432-E385-B795-103600E50C8E}"/>
-          </ac:picMkLst>
-        </pc:picChg>
-        <pc:picChg chg="add mod">
-          <ac:chgData name="Murthy, Rajeswari K." userId="e10ba283-73eb-4d51-9d76-4c1024dd953b" providerId="ADAL" clId="{9D5F3A72-DC95-4AD1-BEF4-8CF1AE0745BD}" dt="2022-07-20T11:01:41.829" v="2164" actId="1076"/>
-          <ac:picMkLst>
-            <pc:docMk/>
-            <pc:sldMk cId="970682747" sldId="264"/>
-            <ac:picMk id="78" creationId="{387AC6DD-8666-D99B-CA91-DC81070BCFFA}"/>
-          </ac:picMkLst>
-        </pc:picChg>
-        <pc:picChg chg="add mod">
-          <ac:chgData name="Murthy, Rajeswari K." userId="e10ba283-73eb-4d51-9d76-4c1024dd953b" providerId="ADAL" clId="{9D5F3A72-DC95-4AD1-BEF4-8CF1AE0745BD}" dt="2022-07-20T11:02:29.766" v="2167" actId="1076"/>
-          <ac:picMkLst>
-            <pc:docMk/>
-            <pc:sldMk cId="970682747" sldId="264"/>
-            <ac:picMk id="79" creationId="{F418E6E1-12CE-A443-5CC3-86C0170372D9}"/>
-          </ac:picMkLst>
-        </pc:picChg>
-        <pc:picChg chg="add mod">
-          <ac:chgData name="Murthy, Rajeswari K." userId="e10ba283-73eb-4d51-9d76-4c1024dd953b" providerId="ADAL" clId="{9D5F3A72-DC95-4AD1-BEF4-8CF1AE0745BD}" dt="2022-07-20T11:03:15.717" v="2170" actId="1076"/>
-          <ac:picMkLst>
-            <pc:docMk/>
-            <pc:sldMk cId="970682747" sldId="264"/>
-            <ac:picMk id="80" creationId="{2F25B937-88F5-4B08-1361-0BCC9B5DD2E7}"/>
-          </ac:picMkLst>
-        </pc:picChg>
-        <pc:picChg chg="add mod">
-          <ac:chgData name="Murthy, Rajeswari K." userId="e10ba283-73eb-4d51-9d76-4c1024dd953b" providerId="ADAL" clId="{9D5F3A72-DC95-4AD1-BEF4-8CF1AE0745BD}" dt="2022-07-20T11:03:37.885" v="2175" actId="1076"/>
-          <ac:picMkLst>
-            <pc:docMk/>
-            <pc:sldMk cId="970682747" sldId="264"/>
-            <ac:picMk id="81" creationId="{FE5C4247-14B3-5E67-0DD8-44604F682075}"/>
-          </ac:picMkLst>
-        </pc:picChg>
-        <pc:cxnChg chg="add mod">
-          <ac:chgData name="Murthy, Rajeswari K." userId="e10ba283-73eb-4d51-9d76-4c1024dd953b" providerId="ADAL" clId="{9D5F3A72-DC95-4AD1-BEF4-8CF1AE0745BD}" dt="2022-07-20T10:53:10.609" v="2045" actId="1038"/>
-          <ac:cxnSpMkLst>
-            <pc:docMk/>
-            <pc:sldMk cId="970682747" sldId="264"/>
-            <ac:cxnSpMk id="11" creationId="{67512535-E0A7-6944-6091-CDADEDA29B0C}"/>
-          </ac:cxnSpMkLst>
-        </pc:cxnChg>
-        <pc:cxnChg chg="add mod">
-          <ac:chgData name="Murthy, Rajeswari K." userId="e10ba283-73eb-4d51-9d76-4c1024dd953b" providerId="ADAL" clId="{9D5F3A72-DC95-4AD1-BEF4-8CF1AE0745BD}" dt="2022-07-20T10:50:51.119" v="1872" actId="14100"/>
-          <ac:cxnSpMkLst>
-            <pc:docMk/>
-            <pc:sldMk cId="970682747" sldId="264"/>
-            <ac:cxnSpMk id="26" creationId="{2F122B37-D6EB-BEB4-B5D9-C2BA37FF40E7}"/>
-          </ac:cxnSpMkLst>
-        </pc:cxnChg>
-        <pc:cxnChg chg="add mod">
-          <ac:chgData name="Murthy, Rajeswari K." userId="e10ba283-73eb-4d51-9d76-4c1024dd953b" providerId="ADAL" clId="{9D5F3A72-DC95-4AD1-BEF4-8CF1AE0745BD}" dt="2022-07-20T10:51:25.299" v="1905" actId="14100"/>
-          <ac:cxnSpMkLst>
-            <pc:docMk/>
-            <pc:sldMk cId="970682747" sldId="264"/>
-            <ac:cxnSpMk id="39" creationId="{45CD487D-4B4B-A00D-F8BE-9AFBE47C0D0D}"/>
-          </ac:cxnSpMkLst>
-        </pc:cxnChg>
-        <pc:cxnChg chg="add mod">
-          <ac:chgData name="Murthy, Rajeswari K." userId="e10ba283-73eb-4d51-9d76-4c1024dd953b" providerId="ADAL" clId="{9D5F3A72-DC95-4AD1-BEF4-8CF1AE0745BD}" dt="2022-07-20T10:54:32.901" v="2106" actId="1035"/>
-          <ac:cxnSpMkLst>
-            <pc:docMk/>
-            <pc:sldMk cId="970682747" sldId="264"/>
-            <ac:cxnSpMk id="44" creationId="{4ACCC654-7AD8-1E8D-8D2C-B1004BFE310B}"/>
-          </ac:cxnSpMkLst>
-        </pc:cxnChg>
-        <pc:cxnChg chg="add mod">
-          <ac:chgData name="Murthy, Rajeswari K." userId="e10ba283-73eb-4d51-9d76-4c1024dd953b" providerId="ADAL" clId="{9D5F3A72-DC95-4AD1-BEF4-8CF1AE0745BD}" dt="2022-07-20T10:52:57.391" v="2006" actId="1038"/>
-          <ac:cxnSpMkLst>
-            <pc:docMk/>
-            <pc:sldMk cId="970682747" sldId="264"/>
-            <ac:cxnSpMk id="48" creationId="{466E5990-059C-608B-CD9A-7C006DA84490}"/>
-          </ac:cxnSpMkLst>
-        </pc:cxnChg>
-        <pc:cxnChg chg="add mod">
-          <ac:chgData name="Murthy, Rajeswari K." userId="e10ba283-73eb-4d51-9d76-4c1024dd953b" providerId="ADAL" clId="{9D5F3A72-DC95-4AD1-BEF4-8CF1AE0745BD}" dt="2022-07-20T10:53:39.238" v="2079" actId="14100"/>
-          <ac:cxnSpMkLst>
-            <pc:docMk/>
-            <pc:sldMk cId="970682747" sldId="264"/>
-            <ac:cxnSpMk id="50" creationId="{3A0453E5-1FDD-5888-4A2E-117CBFFDF7E9}"/>
-          </ac:cxnSpMkLst>
-        </pc:cxnChg>
-        <pc:cxnChg chg="add mod">
-          <ac:chgData name="Murthy, Rajeswari K." userId="e10ba283-73eb-4d51-9d76-4c1024dd953b" providerId="ADAL" clId="{9D5F3A72-DC95-4AD1-BEF4-8CF1AE0745BD}" dt="2022-07-20T10:53:48.312" v="2081" actId="1076"/>
-          <ac:cxnSpMkLst>
-            <pc:docMk/>
-            <pc:sldMk cId="970682747" sldId="264"/>
-            <ac:cxnSpMk id="53" creationId="{7AD0BACF-6ADD-A1D0-7AF8-F2ACC92A7100}"/>
-          </ac:cxnSpMkLst>
-        </pc:cxnChg>
-        <pc:cxnChg chg="add mod">
-          <ac:chgData name="Murthy, Rajeswari K." userId="e10ba283-73eb-4d51-9d76-4c1024dd953b" providerId="ADAL" clId="{9D5F3A72-DC95-4AD1-BEF4-8CF1AE0745BD}" dt="2022-07-20T10:53:54.142" v="2083" actId="1076"/>
-          <ac:cxnSpMkLst>
-            <pc:docMk/>
-            <pc:sldMk cId="970682747" sldId="264"/>
-            <ac:cxnSpMk id="54" creationId="{84610882-EC0F-200F-C884-3930BF855284}"/>
-          </ac:cxnSpMkLst>
-        </pc:cxnChg>
-        <pc:cxnChg chg="add mod">
-          <ac:chgData name="Murthy, Rajeswari K." userId="e10ba283-73eb-4d51-9d76-4c1024dd953b" providerId="ADAL" clId="{9D5F3A72-DC95-4AD1-BEF4-8CF1AE0745BD}" dt="2022-07-20T10:54:01.580" v="2085" actId="1076"/>
-          <ac:cxnSpMkLst>
-            <pc:docMk/>
-            <pc:sldMk cId="970682747" sldId="264"/>
-            <ac:cxnSpMk id="55" creationId="{61441FE7-5319-558B-F045-E237143811D2}"/>
-          </ac:cxnSpMkLst>
-        </pc:cxnChg>
-        <pc:cxnChg chg="add mod">
-          <ac:chgData name="Murthy, Rajeswari K." userId="e10ba283-73eb-4d51-9d76-4c1024dd953b" providerId="ADAL" clId="{9D5F3A72-DC95-4AD1-BEF4-8CF1AE0745BD}" dt="2022-07-20T10:54:06.588" v="2087" actId="1076"/>
-          <ac:cxnSpMkLst>
-            <pc:docMk/>
-            <pc:sldMk cId="970682747" sldId="264"/>
-            <ac:cxnSpMk id="56" creationId="{B5C88153-8872-4FE0-F17C-95A2897963A6}"/>
-          </ac:cxnSpMkLst>
-        </pc:cxnChg>
-        <pc:cxnChg chg="add mod">
-          <ac:chgData name="Murthy, Rajeswari K." userId="e10ba283-73eb-4d51-9d76-4c1024dd953b" providerId="ADAL" clId="{9D5F3A72-DC95-4AD1-BEF4-8CF1AE0745BD}" dt="2022-07-20T10:54:12.410" v="2089" actId="1076"/>
-          <ac:cxnSpMkLst>
-            <pc:docMk/>
-            <pc:sldMk cId="970682747" sldId="264"/>
-            <ac:cxnSpMk id="57" creationId="{A4B42306-C924-6531-EAF2-769E764204DC}"/>
-          </ac:cxnSpMkLst>
-        </pc:cxnChg>
-        <pc:cxnChg chg="add mod">
-          <ac:chgData name="Murthy, Rajeswari K." userId="e10ba283-73eb-4d51-9d76-4c1024dd953b" providerId="ADAL" clId="{9D5F3A72-DC95-4AD1-BEF4-8CF1AE0745BD}" dt="2022-07-20T10:54:17.823" v="2091" actId="1076"/>
-          <ac:cxnSpMkLst>
-            <pc:docMk/>
-            <pc:sldMk cId="970682747" sldId="264"/>
-            <ac:cxnSpMk id="58" creationId="{896C4BF1-0914-2FF3-CDD5-EEC27F5DCDD5}"/>
-          </ac:cxnSpMkLst>
-        </pc:cxnChg>
-        <pc:cxnChg chg="add mod">
-          <ac:chgData name="Murthy, Rajeswari K." userId="e10ba283-73eb-4d51-9d76-4c1024dd953b" providerId="ADAL" clId="{9D5F3A72-DC95-4AD1-BEF4-8CF1AE0745BD}" dt="2022-07-20T10:54:22.735" v="2093" actId="1076"/>
-          <ac:cxnSpMkLst>
-            <pc:docMk/>
-            <pc:sldMk cId="970682747" sldId="264"/>
-            <ac:cxnSpMk id="59" creationId="{41A4425D-57C5-42FE-48DA-1FB2BFA67313}"/>
-          </ac:cxnSpMkLst>
-        </pc:cxnChg>
-        <pc:cxnChg chg="add mod">
-          <ac:chgData name="Murthy, Rajeswari K." userId="e10ba283-73eb-4d51-9d76-4c1024dd953b" providerId="ADAL" clId="{9D5F3A72-DC95-4AD1-BEF4-8CF1AE0745BD}" dt="2022-07-20T10:54:28.241" v="2095" actId="1076"/>
-          <ac:cxnSpMkLst>
-            <pc:docMk/>
-            <pc:sldMk cId="970682747" sldId="264"/>
-            <ac:cxnSpMk id="60" creationId="{40DF4A4F-3206-CFAA-8505-5663C6DF3685}"/>
-          </ac:cxnSpMkLst>
-        </pc:cxnChg>
-        <pc:cxnChg chg="add mod">
-          <ac:chgData name="Murthy, Rajeswari K." userId="e10ba283-73eb-4d51-9d76-4c1024dd953b" providerId="ADAL" clId="{9D5F3A72-DC95-4AD1-BEF4-8CF1AE0745BD}" dt="2022-07-20T10:54:53.829" v="2114" actId="1038"/>
-          <ac:cxnSpMkLst>
-            <pc:docMk/>
-            <pc:sldMk cId="970682747" sldId="264"/>
-            <ac:cxnSpMk id="62" creationId="{4DDD4193-EE6D-D842-578A-542507492F9F}"/>
-          </ac:cxnSpMkLst>
-        </pc:cxnChg>
-        <pc:cxnChg chg="add mod">
-          <ac:chgData name="Murthy, Rajeswari K." userId="e10ba283-73eb-4d51-9d76-4c1024dd953b" providerId="ADAL" clId="{9D5F3A72-DC95-4AD1-BEF4-8CF1AE0745BD}" dt="2022-07-20T10:55:00.075" v="2116" actId="1076"/>
-          <ac:cxnSpMkLst>
-            <pc:docMk/>
-            <pc:sldMk cId="970682747" sldId="264"/>
-            <ac:cxnSpMk id="64" creationId="{1AF93026-3351-4FBB-9C28-FCCE47B36CB9}"/>
-          </ac:cxnSpMkLst>
-        </pc:cxnChg>
-      </pc:sldChg>
-      <pc:sldChg chg="addSp modSp new mod">
-        <pc:chgData name="Murthy, Rajeswari K." userId="e10ba283-73eb-4d51-9d76-4c1024dd953b" providerId="ADAL" clId="{9D5F3A72-DC95-4AD1-BEF4-8CF1AE0745BD}" dt="2022-07-20T11:06:15.161" v="2192" actId="20577"/>
-        <pc:sldMkLst>
-          <pc:docMk/>
-          <pc:sldMk cId="3971812868" sldId="265"/>
-        </pc:sldMkLst>
-        <pc:spChg chg="add mod">
-          <ac:chgData name="Murthy, Rajeswari K." userId="e10ba283-73eb-4d51-9d76-4c1024dd953b" providerId="ADAL" clId="{9D5F3A72-DC95-4AD1-BEF4-8CF1AE0745BD}" dt="2022-07-20T11:06:15.161" v="2192" actId="20577"/>
-          <ac:spMkLst>
-            <pc:docMk/>
-            <pc:sldMk cId="3971812868" sldId="265"/>
-            <ac:spMk id="3" creationId="{5B28C2A2-FDA8-1154-971A-3C24A0C926BE}"/>
-          </ac:spMkLst>
-        </pc:spChg>
-        <pc:picChg chg="add mod">
-          <ac:chgData name="Murthy, Rajeswari K." userId="e10ba283-73eb-4d51-9d76-4c1024dd953b" providerId="ADAL" clId="{9D5F3A72-DC95-4AD1-BEF4-8CF1AE0745BD}" dt="2022-07-20T08:48:37.460" v="1397" actId="14100"/>
-          <ac:picMkLst>
-            <pc:docMk/>
-            <pc:sldMk cId="3971812868" sldId="265"/>
-            <ac:picMk id="1026" creationId="{3414585D-702B-441B-D854-D5FC40CD37DE}"/>
-          </ac:picMkLst>
-        </pc:picChg>
-      </pc:sldChg>
-    </pc:docChg>
-  </pc:docChgLst>
   <pc:docChgLst>
     <pc:chgData name="Murthy, Rajeswari K." userId="S::rajeswari.k.murthy@accenture.com::e10ba283-73eb-4d51-9d76-4c1024dd953b" providerId="AD" clId="Web-{C70A119B-DA48-A843-074C-0B489585E0F1}"/>
     <pc:docChg chg="addSld modSld sldOrd">
@@ -1430,10 +294,25 @@
   <pc:docChgLst>
     <pc:chgData name="Murthy, Rajeswari K." userId="S::rajeswari.k.murthy@accenture.com::e10ba283-73eb-4d51-9d76-4c1024dd953b" providerId="AD" clId="Web-{E628CB86-5D38-2445-442D-E25402BF8369}"/>
     <pc:docChg chg="delSld modSld">
-      <pc:chgData name="Murthy, Rajeswari K." userId="S::rajeswari.k.murthy@accenture.com::e10ba283-73eb-4d51-9d76-4c1024dd953b" providerId="AD" clId="Web-{E628CB86-5D38-2445-442D-E25402BF8369}" dt="2022-07-21T02:11:31.002" v="60"/>
+      <pc:chgData name="Murthy, Rajeswari K." userId="S::rajeswari.k.murthy@accenture.com::e10ba283-73eb-4d51-9d76-4c1024dd953b" providerId="AD" clId="Web-{E628CB86-5D38-2445-442D-E25402BF8369}" dt="2022-07-21T03:15:07.397" v="61" actId="14100"/>
       <pc:docMkLst>
         <pc:docMk/>
       </pc:docMkLst>
+      <pc:sldChg chg="modSp">
+        <pc:chgData name="Murthy, Rajeswari K." userId="S::rajeswari.k.murthy@accenture.com::e10ba283-73eb-4d51-9d76-4c1024dd953b" providerId="AD" clId="Web-{E628CB86-5D38-2445-442D-E25402BF8369}" dt="2022-07-21T03:15:07.397" v="61" actId="14100"/>
+        <pc:sldMkLst>
+          <pc:docMk/>
+          <pc:sldMk cId="3398826638" sldId="261"/>
+        </pc:sldMkLst>
+        <pc:spChg chg="mod">
+          <ac:chgData name="Murthy, Rajeswari K." userId="S::rajeswari.k.murthy@accenture.com::e10ba283-73eb-4d51-9d76-4c1024dd953b" providerId="AD" clId="Web-{E628CB86-5D38-2445-442D-E25402BF8369}" dt="2022-07-21T03:15:07.397" v="61" actId="14100"/>
+          <ac:spMkLst>
+            <pc:docMk/>
+            <pc:sldMk cId="3398826638" sldId="261"/>
+            <ac:spMk id="56" creationId="{BC733D5D-774C-9472-4CF2-33D8AA86273A}"/>
+          </ac:spMkLst>
+        </pc:spChg>
+      </pc:sldChg>
       <pc:sldChg chg="addSp delSp modSp">
         <pc:chgData name="Murthy, Rajeswari K." userId="S::rajeswari.k.murthy@accenture.com::e10ba283-73eb-4d51-9d76-4c1024dd953b" providerId="AD" clId="Web-{E628CB86-5D38-2445-442D-E25402BF8369}" dt="2022-07-21T02:11:06.237" v="59" actId="1076"/>
         <pc:sldMkLst>
@@ -1583,6 +462,1165 @@
             <ac:cxnSpMk id="20" creationId="{5B7DC8E1-538C-BF5D-5AD1-FF993AC4B1AA}"/>
           </ac:cxnSpMkLst>
         </pc:cxnChg>
+      </pc:sldChg>
+    </pc:docChg>
+  </pc:docChgLst>
+  <pc:docChgLst>
+    <pc:chgData name="Murthy, Rajeswari K." userId="e10ba283-73eb-4d51-9d76-4c1024dd953b" providerId="ADAL" clId="{9D5F3A72-DC95-4AD1-BEF4-8CF1AE0745BD}"/>
+    <pc:docChg chg="undo redo custSel addSld modSld sldOrd">
+      <pc:chgData name="Murthy, Rajeswari K." userId="e10ba283-73eb-4d51-9d76-4c1024dd953b" providerId="ADAL" clId="{9D5F3A72-DC95-4AD1-BEF4-8CF1AE0745BD}" dt="2022-07-21T03:45:14.921" v="2553" actId="14100"/>
+      <pc:docMkLst>
+        <pc:docMk/>
+      </pc:docMkLst>
+      <pc:sldChg chg="modSp mod">
+        <pc:chgData name="Murthy, Rajeswari K." userId="e10ba283-73eb-4d51-9d76-4c1024dd953b" providerId="ADAL" clId="{9D5F3A72-DC95-4AD1-BEF4-8CF1AE0745BD}" dt="2022-07-20T11:14:03.239" v="2447" actId="20577"/>
+        <pc:sldMkLst>
+          <pc:docMk/>
+          <pc:sldMk cId="929142591" sldId="256"/>
+        </pc:sldMkLst>
+        <pc:spChg chg="mod">
+          <ac:chgData name="Murthy, Rajeswari K." userId="e10ba283-73eb-4d51-9d76-4c1024dd953b" providerId="ADAL" clId="{9D5F3A72-DC95-4AD1-BEF4-8CF1AE0745BD}" dt="2022-07-20T11:14:03.239" v="2447" actId="20577"/>
+          <ac:spMkLst>
+            <pc:docMk/>
+            <pc:sldMk cId="929142591" sldId="256"/>
+            <ac:spMk id="2" creationId="{56762DA4-746C-73DD-4F25-0F5B9C84A31E}"/>
+          </ac:spMkLst>
+        </pc:spChg>
+      </pc:sldChg>
+      <pc:sldChg chg="modSp mod ord">
+        <pc:chgData name="Murthy, Rajeswari K." userId="e10ba283-73eb-4d51-9d76-4c1024dd953b" providerId="ADAL" clId="{9D5F3A72-DC95-4AD1-BEF4-8CF1AE0745BD}" dt="2022-07-20T11:05:53.280" v="2179"/>
+        <pc:sldMkLst>
+          <pc:docMk/>
+          <pc:sldMk cId="424861511" sldId="257"/>
+        </pc:sldMkLst>
+        <pc:spChg chg="mod">
+          <ac:chgData name="Murthy, Rajeswari K." userId="e10ba283-73eb-4d51-9d76-4c1024dd953b" providerId="ADAL" clId="{9D5F3A72-DC95-4AD1-BEF4-8CF1AE0745BD}" dt="2022-07-20T08:10:41.892" v="1348" actId="20577"/>
+          <ac:spMkLst>
+            <pc:docMk/>
+            <pc:sldMk cId="424861511" sldId="257"/>
+            <ac:spMk id="5" creationId="{D173FAE1-915F-5A3E-B311-B10D9C2D379E}"/>
+          </ac:spMkLst>
+        </pc:spChg>
+        <pc:picChg chg="mod">
+          <ac:chgData name="Murthy, Rajeswari K." userId="e10ba283-73eb-4d51-9d76-4c1024dd953b" providerId="ADAL" clId="{9D5F3A72-DC95-4AD1-BEF4-8CF1AE0745BD}" dt="2022-07-20T07:30:12.191" v="1325" actId="1076"/>
+          <ac:picMkLst>
+            <pc:docMk/>
+            <pc:sldMk cId="424861511" sldId="257"/>
+            <ac:picMk id="4" creationId="{E2E404F7-E941-3745-94A8-D925CEE63400}"/>
+          </ac:picMkLst>
+        </pc:picChg>
+      </pc:sldChg>
+      <pc:sldChg chg="addSp delSp modSp mod">
+        <pc:chgData name="Murthy, Rajeswari K." userId="e10ba283-73eb-4d51-9d76-4c1024dd953b" providerId="ADAL" clId="{9D5F3A72-DC95-4AD1-BEF4-8CF1AE0745BD}" dt="2022-07-20T11:13:42.121" v="2434" actId="1037"/>
+        <pc:sldMkLst>
+          <pc:docMk/>
+          <pc:sldMk cId="2505263407" sldId="259"/>
+        </pc:sldMkLst>
+        <pc:spChg chg="add mod">
+          <ac:chgData name="Murthy, Rajeswari K." userId="e10ba283-73eb-4d51-9d76-4c1024dd953b" providerId="ADAL" clId="{9D5F3A72-DC95-4AD1-BEF4-8CF1AE0745BD}" dt="2022-07-20T11:13:42.121" v="2434" actId="1037"/>
+          <ac:spMkLst>
+            <pc:docMk/>
+            <pc:sldMk cId="2505263407" sldId="259"/>
+            <ac:spMk id="2" creationId="{55DB9633-3E11-B43F-2C69-4990A131BB04}"/>
+          </ac:spMkLst>
+        </pc:spChg>
+        <pc:spChg chg="mod">
+          <ac:chgData name="Murthy, Rajeswari K." userId="e10ba283-73eb-4d51-9d76-4c1024dd953b" providerId="ADAL" clId="{9D5F3A72-DC95-4AD1-BEF4-8CF1AE0745BD}" dt="2022-07-20T11:08:09.661" v="2218" actId="27636"/>
+          <ac:spMkLst>
+            <pc:docMk/>
+            <pc:sldMk cId="2505263407" sldId="259"/>
+            <ac:spMk id="4" creationId="{CCDC6A90-2728-569D-FF9D-6941AB29F39E}"/>
+          </ac:spMkLst>
+        </pc:spChg>
+        <pc:spChg chg="mod">
+          <ac:chgData name="Murthy, Rajeswari K." userId="e10ba283-73eb-4d51-9d76-4c1024dd953b" providerId="ADAL" clId="{9D5F3A72-DC95-4AD1-BEF4-8CF1AE0745BD}" dt="2022-07-20T11:08:57.609" v="2230" actId="1076"/>
+          <ac:spMkLst>
+            <pc:docMk/>
+            <pc:sldMk cId="2505263407" sldId="259"/>
+            <ac:spMk id="5" creationId="{394958A4-79A1-5E5B-1B13-B9F475A72F94}"/>
+          </ac:spMkLst>
+        </pc:spChg>
+        <pc:spChg chg="mod">
+          <ac:chgData name="Murthy, Rajeswari K." userId="e10ba283-73eb-4d51-9d76-4c1024dd953b" providerId="ADAL" clId="{9D5F3A72-DC95-4AD1-BEF4-8CF1AE0745BD}" dt="2022-07-20T11:08:24.363" v="2225" actId="14100"/>
+          <ac:spMkLst>
+            <pc:docMk/>
+            <pc:sldMk cId="2505263407" sldId="259"/>
+            <ac:spMk id="6" creationId="{8EC62A8A-F325-DF9D-6A7B-569012387918}"/>
+          </ac:spMkLst>
+        </pc:spChg>
+        <pc:spChg chg="add del mod">
+          <ac:chgData name="Murthy, Rajeswari K." userId="e10ba283-73eb-4d51-9d76-4c1024dd953b" providerId="ADAL" clId="{9D5F3A72-DC95-4AD1-BEF4-8CF1AE0745BD}" dt="2022-07-20T11:09:07.157" v="2233"/>
+          <ac:spMkLst>
+            <pc:docMk/>
+            <pc:sldMk cId="2505263407" sldId="259"/>
+            <ac:spMk id="9" creationId="{21A7378F-7DD5-97D1-8515-CCF5A3355BEC}"/>
+          </ac:spMkLst>
+        </pc:spChg>
+        <pc:spChg chg="add del mod">
+          <ac:chgData name="Murthy, Rajeswari K." userId="e10ba283-73eb-4d51-9d76-4c1024dd953b" providerId="ADAL" clId="{9D5F3A72-DC95-4AD1-BEF4-8CF1AE0745BD}" dt="2022-07-20T11:09:17.993" v="2235"/>
+          <ac:spMkLst>
+            <pc:docMk/>
+            <pc:sldMk cId="2505263407" sldId="259"/>
+            <ac:spMk id="10" creationId="{40876C86-54DF-9D37-75C8-740766D4273E}"/>
+          </ac:spMkLst>
+        </pc:spChg>
+        <pc:graphicFrameChg chg="add mod modGraphic">
+          <ac:chgData name="Murthy, Rajeswari K." userId="e10ba283-73eb-4d51-9d76-4c1024dd953b" providerId="ADAL" clId="{9D5F3A72-DC95-4AD1-BEF4-8CF1AE0745BD}" dt="2022-07-20T11:13:32.355" v="2425" actId="1035"/>
+          <ac:graphicFrameMkLst>
+            <pc:docMk/>
+            <pc:sldMk cId="2505263407" sldId="259"/>
+            <ac:graphicFrameMk id="7" creationId="{C6FE2B07-3456-4513-BBF1-1791932ECD03}"/>
+          </ac:graphicFrameMkLst>
+        </pc:graphicFrameChg>
+      </pc:sldChg>
+      <pc:sldChg chg="modSp mod ord">
+        <pc:chgData name="Murthy, Rajeswari K." userId="e10ba283-73eb-4d51-9d76-4c1024dd953b" providerId="ADAL" clId="{9D5F3A72-DC95-4AD1-BEF4-8CF1AE0745BD}" dt="2022-07-21T03:43:46.747" v="2530" actId="20577"/>
+        <pc:sldMkLst>
+          <pc:docMk/>
+          <pc:sldMk cId="255919191" sldId="260"/>
+        </pc:sldMkLst>
+        <pc:spChg chg="mod">
+          <ac:chgData name="Murthy, Rajeswari K." userId="e10ba283-73eb-4d51-9d76-4c1024dd953b" providerId="ADAL" clId="{9D5F3A72-DC95-4AD1-BEF4-8CF1AE0745BD}" dt="2022-07-21T03:43:46.747" v="2530" actId="20577"/>
+          <ac:spMkLst>
+            <pc:docMk/>
+            <pc:sldMk cId="255919191" sldId="260"/>
+            <ac:spMk id="7" creationId="{F239EDE1-5517-540C-D677-C0440CCCA8DA}"/>
+          </ac:spMkLst>
+        </pc:spChg>
+        <pc:spChg chg="mod">
+          <ac:chgData name="Murthy, Rajeswari K." userId="e10ba283-73eb-4d51-9d76-4c1024dd953b" providerId="ADAL" clId="{9D5F3A72-DC95-4AD1-BEF4-8CF1AE0745BD}" dt="2022-07-20T03:56:38.243" v="1318" actId="20577"/>
+          <ac:spMkLst>
+            <pc:docMk/>
+            <pc:sldMk cId="255919191" sldId="260"/>
+            <ac:spMk id="8" creationId="{49E8753F-AB0F-CE5D-8DA3-8F721108F53C}"/>
+          </ac:spMkLst>
+        </pc:spChg>
+      </pc:sldChg>
+      <pc:sldChg chg="addSp delSp modSp new mod">
+        <pc:chgData name="Murthy, Rajeswari K." userId="e10ba283-73eb-4d51-9d76-4c1024dd953b" providerId="ADAL" clId="{9D5F3A72-DC95-4AD1-BEF4-8CF1AE0745BD}" dt="2022-07-21T03:41:00.074" v="2462" actId="1036"/>
+        <pc:sldMkLst>
+          <pc:docMk/>
+          <pc:sldMk cId="3398826638" sldId="261"/>
+        </pc:sldMkLst>
+        <pc:spChg chg="add mod">
+          <ac:chgData name="Murthy, Rajeswari K." userId="e10ba283-73eb-4d51-9d76-4c1024dd953b" providerId="ADAL" clId="{9D5F3A72-DC95-4AD1-BEF4-8CF1AE0745BD}" dt="2022-07-21T03:41:00.074" v="2462" actId="1036"/>
+          <ac:spMkLst>
+            <pc:docMk/>
+            <pc:sldMk cId="3398826638" sldId="261"/>
+            <ac:spMk id="2" creationId="{C01FE4DD-A334-98FC-83E2-BDFC3271F854}"/>
+          </ac:spMkLst>
+        </pc:spChg>
+        <pc:spChg chg="add mod">
+          <ac:chgData name="Murthy, Rajeswari K." userId="e10ba283-73eb-4d51-9d76-4c1024dd953b" providerId="ADAL" clId="{9D5F3A72-DC95-4AD1-BEF4-8CF1AE0745BD}" dt="2022-07-21T03:41:00.074" v="2462" actId="1036"/>
+          <ac:spMkLst>
+            <pc:docMk/>
+            <pc:sldMk cId="3398826638" sldId="261"/>
+            <ac:spMk id="5" creationId="{7E2E239E-F428-77E3-ED12-AD515A6D1A01}"/>
+          </ac:spMkLst>
+        </pc:spChg>
+        <pc:spChg chg="add mod">
+          <ac:chgData name="Murthy, Rajeswari K." userId="e10ba283-73eb-4d51-9d76-4c1024dd953b" providerId="ADAL" clId="{9D5F3A72-DC95-4AD1-BEF4-8CF1AE0745BD}" dt="2022-07-21T03:41:00.074" v="2462" actId="1036"/>
+          <ac:spMkLst>
+            <pc:docMk/>
+            <pc:sldMk cId="3398826638" sldId="261"/>
+            <ac:spMk id="6" creationId="{DB085202-E48D-32ED-81E3-5B8A14CC643D}"/>
+          </ac:spMkLst>
+        </pc:spChg>
+        <pc:spChg chg="add mod">
+          <ac:chgData name="Murthy, Rajeswari K." userId="e10ba283-73eb-4d51-9d76-4c1024dd953b" providerId="ADAL" clId="{9D5F3A72-DC95-4AD1-BEF4-8CF1AE0745BD}" dt="2022-07-21T03:41:00.074" v="2462" actId="1036"/>
+          <ac:spMkLst>
+            <pc:docMk/>
+            <pc:sldMk cId="3398826638" sldId="261"/>
+            <ac:spMk id="7" creationId="{D0530B41-92CC-1163-E7BB-6981E07A2C52}"/>
+          </ac:spMkLst>
+        </pc:spChg>
+        <pc:spChg chg="add mod">
+          <ac:chgData name="Murthy, Rajeswari K." userId="e10ba283-73eb-4d51-9d76-4c1024dd953b" providerId="ADAL" clId="{9D5F3A72-DC95-4AD1-BEF4-8CF1AE0745BD}" dt="2022-07-21T03:41:00.074" v="2462" actId="1036"/>
+          <ac:spMkLst>
+            <pc:docMk/>
+            <pc:sldMk cId="3398826638" sldId="261"/>
+            <ac:spMk id="8" creationId="{59A429DE-F951-15FD-1283-066FF34273E3}"/>
+          </ac:spMkLst>
+        </pc:spChg>
+        <pc:spChg chg="add mod">
+          <ac:chgData name="Murthy, Rajeswari K." userId="e10ba283-73eb-4d51-9d76-4c1024dd953b" providerId="ADAL" clId="{9D5F3A72-DC95-4AD1-BEF4-8CF1AE0745BD}" dt="2022-07-21T03:41:00.074" v="2462" actId="1036"/>
+          <ac:spMkLst>
+            <pc:docMk/>
+            <pc:sldMk cId="3398826638" sldId="261"/>
+            <ac:spMk id="9" creationId="{B865DE75-09BF-5D6C-2135-FCD7CFFFF588}"/>
+          </ac:spMkLst>
+        </pc:spChg>
+        <pc:spChg chg="add mod">
+          <ac:chgData name="Murthy, Rajeswari K." userId="e10ba283-73eb-4d51-9d76-4c1024dd953b" providerId="ADAL" clId="{9D5F3A72-DC95-4AD1-BEF4-8CF1AE0745BD}" dt="2022-07-21T03:41:00.074" v="2462" actId="1036"/>
+          <ac:spMkLst>
+            <pc:docMk/>
+            <pc:sldMk cId="3398826638" sldId="261"/>
+            <ac:spMk id="10" creationId="{B0D91068-283B-5F31-4CDE-D47F0FCFDB2D}"/>
+          </ac:spMkLst>
+        </pc:spChg>
+        <pc:spChg chg="add mod">
+          <ac:chgData name="Murthy, Rajeswari K." userId="e10ba283-73eb-4d51-9d76-4c1024dd953b" providerId="ADAL" clId="{9D5F3A72-DC95-4AD1-BEF4-8CF1AE0745BD}" dt="2022-07-21T03:41:00.074" v="2462" actId="1036"/>
+          <ac:spMkLst>
+            <pc:docMk/>
+            <pc:sldMk cId="3398826638" sldId="261"/>
+            <ac:spMk id="11" creationId="{BD98851A-D446-C44F-6405-3058CFC92FD0}"/>
+          </ac:spMkLst>
+        </pc:spChg>
+        <pc:spChg chg="add mod">
+          <ac:chgData name="Murthy, Rajeswari K." userId="e10ba283-73eb-4d51-9d76-4c1024dd953b" providerId="ADAL" clId="{9D5F3A72-DC95-4AD1-BEF4-8CF1AE0745BD}" dt="2022-07-21T03:41:00.074" v="2462" actId="1036"/>
+          <ac:spMkLst>
+            <pc:docMk/>
+            <pc:sldMk cId="3398826638" sldId="261"/>
+            <ac:spMk id="12" creationId="{40C169F6-5C1D-573E-518C-AED68FD4D74A}"/>
+          </ac:spMkLst>
+        </pc:spChg>
+        <pc:spChg chg="add del mod">
+          <ac:chgData name="Murthy, Rajeswari K." userId="e10ba283-73eb-4d51-9d76-4c1024dd953b" providerId="ADAL" clId="{9D5F3A72-DC95-4AD1-BEF4-8CF1AE0745BD}" dt="2022-07-20T08:58:46.533" v="1482" actId="478"/>
+          <ac:spMkLst>
+            <pc:docMk/>
+            <pc:sldMk cId="3398826638" sldId="261"/>
+            <ac:spMk id="13" creationId="{39D612DE-E6E3-4D41-E7B5-C0607D0883DE}"/>
+          </ac:spMkLst>
+        </pc:spChg>
+        <pc:spChg chg="add mod">
+          <ac:chgData name="Murthy, Rajeswari K." userId="e10ba283-73eb-4d51-9d76-4c1024dd953b" providerId="ADAL" clId="{9D5F3A72-DC95-4AD1-BEF4-8CF1AE0745BD}" dt="2022-07-21T03:41:00.074" v="2462" actId="1036"/>
+          <ac:spMkLst>
+            <pc:docMk/>
+            <pc:sldMk cId="3398826638" sldId="261"/>
+            <ac:spMk id="28" creationId="{4512173E-65D0-38D4-4795-EE8796426BD4}"/>
+          </ac:spMkLst>
+        </pc:spChg>
+        <pc:spChg chg="add mod">
+          <ac:chgData name="Murthy, Rajeswari K." userId="e10ba283-73eb-4d51-9d76-4c1024dd953b" providerId="ADAL" clId="{9D5F3A72-DC95-4AD1-BEF4-8CF1AE0745BD}" dt="2022-07-21T03:41:00.074" v="2462" actId="1036"/>
+          <ac:spMkLst>
+            <pc:docMk/>
+            <pc:sldMk cId="3398826638" sldId="261"/>
+            <ac:spMk id="29" creationId="{14ADCE15-9278-961F-EE67-B8008A5031B4}"/>
+          </ac:spMkLst>
+        </pc:spChg>
+        <pc:spChg chg="add mod">
+          <ac:chgData name="Murthy, Rajeswari K." userId="e10ba283-73eb-4d51-9d76-4c1024dd953b" providerId="ADAL" clId="{9D5F3A72-DC95-4AD1-BEF4-8CF1AE0745BD}" dt="2022-07-21T03:41:00.074" v="2462" actId="1036"/>
+          <ac:spMkLst>
+            <pc:docMk/>
+            <pc:sldMk cId="3398826638" sldId="261"/>
+            <ac:spMk id="36" creationId="{BCA700ED-A350-F283-4097-260E14587A21}"/>
+          </ac:spMkLst>
+        </pc:spChg>
+        <pc:spChg chg="add mod">
+          <ac:chgData name="Murthy, Rajeswari K." userId="e10ba283-73eb-4d51-9d76-4c1024dd953b" providerId="ADAL" clId="{9D5F3A72-DC95-4AD1-BEF4-8CF1AE0745BD}" dt="2022-07-21T03:41:00.074" v="2462" actId="1036"/>
+          <ac:spMkLst>
+            <pc:docMk/>
+            <pc:sldMk cId="3398826638" sldId="261"/>
+            <ac:spMk id="37" creationId="{048533F5-5D7E-BF67-389D-53ED6B2BA665}"/>
+          </ac:spMkLst>
+        </pc:spChg>
+        <pc:spChg chg="add del mod">
+          <ac:chgData name="Murthy, Rajeswari K." userId="e10ba283-73eb-4d51-9d76-4c1024dd953b" providerId="ADAL" clId="{9D5F3A72-DC95-4AD1-BEF4-8CF1AE0745BD}" dt="2022-07-20T08:58:58.556" v="1503" actId="478"/>
+          <ac:spMkLst>
+            <pc:docMk/>
+            <pc:sldMk cId="3398826638" sldId="261"/>
+            <ac:spMk id="38" creationId="{256D2796-860F-1E61-725E-27709F54A717}"/>
+          </ac:spMkLst>
+        </pc:spChg>
+        <pc:spChg chg="add mod">
+          <ac:chgData name="Murthy, Rajeswari K." userId="e10ba283-73eb-4d51-9d76-4c1024dd953b" providerId="ADAL" clId="{9D5F3A72-DC95-4AD1-BEF4-8CF1AE0745BD}" dt="2022-07-21T03:41:00.074" v="2462" actId="1036"/>
+          <ac:spMkLst>
+            <pc:docMk/>
+            <pc:sldMk cId="3398826638" sldId="261"/>
+            <ac:spMk id="39" creationId="{0A74F30C-2DD4-A98A-FFA3-004F2C694B3A}"/>
+          </ac:spMkLst>
+        </pc:spChg>
+        <pc:spChg chg="add mod">
+          <ac:chgData name="Murthy, Rajeswari K." userId="e10ba283-73eb-4d51-9d76-4c1024dd953b" providerId="ADAL" clId="{9D5F3A72-DC95-4AD1-BEF4-8CF1AE0745BD}" dt="2022-07-21T03:41:00.074" v="2462" actId="1036"/>
+          <ac:spMkLst>
+            <pc:docMk/>
+            <pc:sldMk cId="3398826638" sldId="261"/>
+            <ac:spMk id="42" creationId="{DCB72E77-ED73-5060-04A9-5962FA8BE60E}"/>
+          </ac:spMkLst>
+        </pc:spChg>
+        <pc:spChg chg="add mod">
+          <ac:chgData name="Murthy, Rajeswari K." userId="e10ba283-73eb-4d51-9d76-4c1024dd953b" providerId="ADAL" clId="{9D5F3A72-DC95-4AD1-BEF4-8CF1AE0745BD}" dt="2022-07-21T03:41:00.074" v="2462" actId="1036"/>
+          <ac:spMkLst>
+            <pc:docMk/>
+            <pc:sldMk cId="3398826638" sldId="261"/>
+            <ac:spMk id="43" creationId="{F8FC3974-4F3E-70CD-C2EF-62F2310A71DF}"/>
+          </ac:spMkLst>
+        </pc:spChg>
+        <pc:spChg chg="add del mod">
+          <ac:chgData name="Murthy, Rajeswari K." userId="e10ba283-73eb-4d51-9d76-4c1024dd953b" providerId="ADAL" clId="{9D5F3A72-DC95-4AD1-BEF4-8CF1AE0745BD}" dt="2022-07-20T08:58:58.556" v="1503" actId="478"/>
+          <ac:spMkLst>
+            <pc:docMk/>
+            <pc:sldMk cId="3398826638" sldId="261"/>
+            <ac:spMk id="45" creationId="{4AC6055C-8CBE-A862-2CC9-55C1492FF59B}"/>
+          </ac:spMkLst>
+        </pc:spChg>
+        <pc:spChg chg="add mod">
+          <ac:chgData name="Murthy, Rajeswari K." userId="e10ba283-73eb-4d51-9d76-4c1024dd953b" providerId="ADAL" clId="{9D5F3A72-DC95-4AD1-BEF4-8CF1AE0745BD}" dt="2022-07-21T03:41:00.074" v="2462" actId="1036"/>
+          <ac:spMkLst>
+            <pc:docMk/>
+            <pc:sldMk cId="3398826638" sldId="261"/>
+            <ac:spMk id="46" creationId="{AAAC7C70-A7B0-1336-C365-B8B48BD857ED}"/>
+          </ac:spMkLst>
+        </pc:spChg>
+        <pc:spChg chg="add mod">
+          <ac:chgData name="Murthy, Rajeswari K." userId="e10ba283-73eb-4d51-9d76-4c1024dd953b" providerId="ADAL" clId="{9D5F3A72-DC95-4AD1-BEF4-8CF1AE0745BD}" dt="2022-07-21T03:41:00.074" v="2462" actId="1036"/>
+          <ac:spMkLst>
+            <pc:docMk/>
+            <pc:sldMk cId="3398826638" sldId="261"/>
+            <ac:spMk id="47" creationId="{D919C476-E075-9350-00C5-119DAA9B5217}"/>
+          </ac:spMkLst>
+        </pc:spChg>
+        <pc:spChg chg="add mod">
+          <ac:chgData name="Murthy, Rajeswari K." userId="e10ba283-73eb-4d51-9d76-4c1024dd953b" providerId="ADAL" clId="{9D5F3A72-DC95-4AD1-BEF4-8CF1AE0745BD}" dt="2022-07-19T14:49:05.004" v="1009" actId="1035"/>
+          <ac:spMkLst>
+            <pc:docMk/>
+            <pc:sldMk cId="3398826638" sldId="261"/>
+            <ac:spMk id="56" creationId="{BC733D5D-774C-9472-4CF2-33D8AA86273A}"/>
+          </ac:spMkLst>
+        </pc:spChg>
+        <pc:spChg chg="add mod">
+          <ac:chgData name="Murthy, Rajeswari K." userId="e10ba283-73eb-4d51-9d76-4c1024dd953b" providerId="ADAL" clId="{9D5F3A72-DC95-4AD1-BEF4-8CF1AE0745BD}" dt="2022-07-19T14:47:26.832" v="960" actId="1076"/>
+          <ac:spMkLst>
+            <pc:docMk/>
+            <pc:sldMk cId="3398826638" sldId="261"/>
+            <ac:spMk id="57" creationId="{5F5B9DB9-E1E7-B9F6-4715-2CF0168EFBB4}"/>
+          </ac:spMkLst>
+        </pc:spChg>
+        <pc:spChg chg="add mod">
+          <ac:chgData name="Murthy, Rajeswari K." userId="e10ba283-73eb-4d51-9d76-4c1024dd953b" providerId="ADAL" clId="{9D5F3A72-DC95-4AD1-BEF4-8CF1AE0745BD}" dt="2022-07-19T14:42:02.932" v="950" actId="1076"/>
+          <ac:spMkLst>
+            <pc:docMk/>
+            <pc:sldMk cId="3398826638" sldId="261"/>
+            <ac:spMk id="61" creationId="{2AF7C445-E32A-4676-4E84-EB599200625A}"/>
+          </ac:spMkLst>
+        </pc:spChg>
+        <pc:spChg chg="add mod">
+          <ac:chgData name="Murthy, Rajeswari K." userId="e10ba283-73eb-4d51-9d76-4c1024dd953b" providerId="ADAL" clId="{9D5F3A72-DC95-4AD1-BEF4-8CF1AE0745BD}" dt="2022-07-19T14:42:02.932" v="950" actId="1076"/>
+          <ac:spMkLst>
+            <pc:docMk/>
+            <pc:sldMk cId="3398826638" sldId="261"/>
+            <ac:spMk id="63" creationId="{1AF6E2B1-BBF9-C494-3DCA-766C94555FBC}"/>
+          </ac:spMkLst>
+        </pc:spChg>
+        <pc:spChg chg="add mod">
+          <ac:chgData name="Murthy, Rajeswari K." userId="e10ba283-73eb-4d51-9d76-4c1024dd953b" providerId="ADAL" clId="{9D5F3A72-DC95-4AD1-BEF4-8CF1AE0745BD}" dt="2022-07-19T14:42:02.932" v="950" actId="1076"/>
+          <ac:spMkLst>
+            <pc:docMk/>
+            <pc:sldMk cId="3398826638" sldId="261"/>
+            <ac:spMk id="65" creationId="{012FB729-1CE4-6CB0-B81E-FD5A3E726378}"/>
+          </ac:spMkLst>
+        </pc:spChg>
+        <pc:spChg chg="add mod">
+          <ac:chgData name="Murthy, Rajeswari K." userId="e10ba283-73eb-4d51-9d76-4c1024dd953b" providerId="ADAL" clId="{9D5F3A72-DC95-4AD1-BEF4-8CF1AE0745BD}" dt="2022-07-19T14:42:02.932" v="950" actId="1076"/>
+          <ac:spMkLst>
+            <pc:docMk/>
+            <pc:sldMk cId="3398826638" sldId="261"/>
+            <ac:spMk id="67" creationId="{0DA03AFB-EA35-32E2-B86B-22FDDEC90ACA}"/>
+          </ac:spMkLst>
+        </pc:spChg>
+        <pc:spChg chg="add mod">
+          <ac:chgData name="Murthy, Rajeswari K." userId="e10ba283-73eb-4d51-9d76-4c1024dd953b" providerId="ADAL" clId="{9D5F3A72-DC95-4AD1-BEF4-8CF1AE0745BD}" dt="2022-07-19T14:52:29.040" v="1103" actId="113"/>
+          <ac:spMkLst>
+            <pc:docMk/>
+            <pc:sldMk cId="3398826638" sldId="261"/>
+            <ac:spMk id="68" creationId="{7C2B873E-96DA-3395-4295-F3726FA3F02C}"/>
+          </ac:spMkLst>
+        </pc:spChg>
+        <pc:spChg chg="add mod">
+          <ac:chgData name="Murthy, Rajeswari K." userId="e10ba283-73eb-4d51-9d76-4c1024dd953b" providerId="ADAL" clId="{9D5F3A72-DC95-4AD1-BEF4-8CF1AE0745BD}" dt="2022-07-19T14:51:15.246" v="1098" actId="1035"/>
+          <ac:spMkLst>
+            <pc:docMk/>
+            <pc:sldMk cId="3398826638" sldId="261"/>
+            <ac:spMk id="69" creationId="{D4614774-E29A-C332-04EA-B5139CA9B4C7}"/>
+          </ac:spMkLst>
+        </pc:spChg>
+        <pc:spChg chg="add mod">
+          <ac:chgData name="Murthy, Rajeswari K." userId="e10ba283-73eb-4d51-9d76-4c1024dd953b" providerId="ADAL" clId="{9D5F3A72-DC95-4AD1-BEF4-8CF1AE0745BD}" dt="2022-07-19T14:49:37.234" v="1015" actId="14100"/>
+          <ac:spMkLst>
+            <pc:docMk/>
+            <pc:sldMk cId="3398826638" sldId="261"/>
+            <ac:spMk id="70" creationId="{E18979B9-DE94-1F05-AF2A-62966833569E}"/>
+          </ac:spMkLst>
+        </pc:spChg>
+        <pc:spChg chg="add mod">
+          <ac:chgData name="Murthy, Rajeswari K." userId="e10ba283-73eb-4d51-9d76-4c1024dd953b" providerId="ADAL" clId="{9D5F3A72-DC95-4AD1-BEF4-8CF1AE0745BD}" dt="2022-07-19T14:52:41.459" v="1108" actId="404"/>
+          <ac:spMkLst>
+            <pc:docMk/>
+            <pc:sldMk cId="3398826638" sldId="261"/>
+            <ac:spMk id="72" creationId="{3CDCEAA4-AA91-CCF9-CE5E-69DC17846221}"/>
+          </ac:spMkLst>
+        </pc:spChg>
+        <pc:spChg chg="add mod">
+          <ac:chgData name="Murthy, Rajeswari K." userId="e10ba283-73eb-4d51-9d76-4c1024dd953b" providerId="ADAL" clId="{9D5F3A72-DC95-4AD1-BEF4-8CF1AE0745BD}" dt="2022-07-19T14:52:52.381" v="1110" actId="404"/>
+          <ac:spMkLst>
+            <pc:docMk/>
+            <pc:sldMk cId="3398826638" sldId="261"/>
+            <ac:spMk id="74" creationId="{1D7525D3-5561-51E7-F1AF-5D3CFADC90E4}"/>
+          </ac:spMkLst>
+        </pc:spChg>
+        <pc:grpChg chg="add mod">
+          <ac:chgData name="Murthy, Rajeswari K." userId="e10ba283-73eb-4d51-9d76-4c1024dd953b" providerId="ADAL" clId="{9D5F3A72-DC95-4AD1-BEF4-8CF1AE0745BD}" dt="2022-07-21T03:41:00.074" v="2462" actId="1036"/>
+          <ac:grpSpMkLst>
+            <pc:docMk/>
+            <pc:sldMk cId="3398826638" sldId="261"/>
+            <ac:grpSpMk id="44" creationId="{433C81AC-0284-F8A3-2F36-3F27079E33D5}"/>
+          </ac:grpSpMkLst>
+        </pc:grpChg>
+        <pc:grpChg chg="add mod">
+          <ac:chgData name="Murthy, Rajeswari K." userId="e10ba283-73eb-4d51-9d76-4c1024dd953b" providerId="ADAL" clId="{9D5F3A72-DC95-4AD1-BEF4-8CF1AE0745BD}" dt="2022-07-19T14:42:02.932" v="950" actId="1076"/>
+          <ac:grpSpMkLst>
+            <pc:docMk/>
+            <pc:sldMk cId="3398826638" sldId="261"/>
+            <ac:grpSpMk id="55" creationId="{7E1D53ED-926D-4BE8-EC08-899C22045D78}"/>
+          </ac:grpSpMkLst>
+        </pc:grpChg>
+        <pc:picChg chg="add mod">
+          <ac:chgData name="Murthy, Rajeswari K." userId="e10ba283-73eb-4d51-9d76-4c1024dd953b" providerId="ADAL" clId="{9D5F3A72-DC95-4AD1-BEF4-8CF1AE0745BD}" dt="2022-07-19T14:42:02.932" v="950" actId="1076"/>
+          <ac:picMkLst>
+            <pc:docMk/>
+            <pc:sldMk cId="3398826638" sldId="261"/>
+            <ac:picMk id="58" creationId="{FC4EDAFD-885F-0493-C42F-C1B5C8BDCD09}"/>
+          </ac:picMkLst>
+        </pc:picChg>
+        <pc:picChg chg="add mod">
+          <ac:chgData name="Murthy, Rajeswari K." userId="e10ba283-73eb-4d51-9d76-4c1024dd953b" providerId="ADAL" clId="{9D5F3A72-DC95-4AD1-BEF4-8CF1AE0745BD}" dt="2022-07-19T14:42:02.932" v="950" actId="1076"/>
+          <ac:picMkLst>
+            <pc:docMk/>
+            <pc:sldMk cId="3398826638" sldId="261"/>
+            <ac:picMk id="60" creationId="{FDD57F06-44F1-BCBC-B19A-6837F404BBBB}"/>
+          </ac:picMkLst>
+        </pc:picChg>
+        <pc:picChg chg="add mod">
+          <ac:chgData name="Murthy, Rajeswari K." userId="e10ba283-73eb-4d51-9d76-4c1024dd953b" providerId="ADAL" clId="{9D5F3A72-DC95-4AD1-BEF4-8CF1AE0745BD}" dt="2022-07-21T03:41:00.074" v="2462" actId="1036"/>
+          <ac:picMkLst>
+            <pc:docMk/>
+            <pc:sldMk cId="3398826638" sldId="261"/>
+            <ac:picMk id="1026" creationId="{A343B030-BFB1-C715-5B90-D3733B5FF28C}"/>
+          </ac:picMkLst>
+        </pc:picChg>
+        <pc:picChg chg="add mod">
+          <ac:chgData name="Murthy, Rajeswari K." userId="e10ba283-73eb-4d51-9d76-4c1024dd953b" providerId="ADAL" clId="{9D5F3A72-DC95-4AD1-BEF4-8CF1AE0745BD}" dt="2022-07-21T03:41:00.074" v="2462" actId="1036"/>
+          <ac:picMkLst>
+            <pc:docMk/>
+            <pc:sldMk cId="3398826638" sldId="261"/>
+            <ac:picMk id="1028" creationId="{7A331ACB-A030-1A07-8A10-7A510EDD5880}"/>
+          </ac:picMkLst>
+        </pc:picChg>
+        <pc:cxnChg chg="add mod">
+          <ac:chgData name="Murthy, Rajeswari K." userId="e10ba283-73eb-4d51-9d76-4c1024dd953b" providerId="ADAL" clId="{9D5F3A72-DC95-4AD1-BEF4-8CF1AE0745BD}" dt="2022-07-21T03:41:00.074" v="2462" actId="1036"/>
+          <ac:cxnSpMkLst>
+            <pc:docMk/>
+            <pc:sldMk cId="3398826638" sldId="261"/>
+            <ac:cxnSpMk id="4" creationId="{8CC21BF9-C3AA-D8A6-EC59-A8127314716D}"/>
+          </ac:cxnSpMkLst>
+        </pc:cxnChg>
+        <pc:cxnChg chg="add mod">
+          <ac:chgData name="Murthy, Rajeswari K." userId="e10ba283-73eb-4d51-9d76-4c1024dd953b" providerId="ADAL" clId="{9D5F3A72-DC95-4AD1-BEF4-8CF1AE0745BD}" dt="2022-07-21T03:41:00.074" v="2462" actId="1036"/>
+          <ac:cxnSpMkLst>
+            <pc:docMk/>
+            <pc:sldMk cId="3398826638" sldId="261"/>
+            <ac:cxnSpMk id="15" creationId="{3DEF6BA5-9EE4-3C3B-934E-0EBD9FCD2ADB}"/>
+          </ac:cxnSpMkLst>
+        </pc:cxnChg>
+        <pc:cxnChg chg="add mod">
+          <ac:chgData name="Murthy, Rajeswari K." userId="e10ba283-73eb-4d51-9d76-4c1024dd953b" providerId="ADAL" clId="{9D5F3A72-DC95-4AD1-BEF4-8CF1AE0745BD}" dt="2022-07-21T03:41:00.074" v="2462" actId="1036"/>
+          <ac:cxnSpMkLst>
+            <pc:docMk/>
+            <pc:sldMk cId="3398826638" sldId="261"/>
+            <ac:cxnSpMk id="18" creationId="{8EDBEC30-B280-5E13-CB6B-1189F4FCAD5D}"/>
+          </ac:cxnSpMkLst>
+        </pc:cxnChg>
+        <pc:cxnChg chg="add mod">
+          <ac:chgData name="Murthy, Rajeswari K." userId="e10ba283-73eb-4d51-9d76-4c1024dd953b" providerId="ADAL" clId="{9D5F3A72-DC95-4AD1-BEF4-8CF1AE0745BD}" dt="2022-07-21T03:41:00.074" v="2462" actId="1036"/>
+          <ac:cxnSpMkLst>
+            <pc:docMk/>
+            <pc:sldMk cId="3398826638" sldId="261"/>
+            <ac:cxnSpMk id="21" creationId="{FDE6A9F1-B601-233B-52D0-D6D65E906E3B}"/>
+          </ac:cxnSpMkLst>
+        </pc:cxnChg>
+        <pc:cxnChg chg="add mod">
+          <ac:chgData name="Murthy, Rajeswari K." userId="e10ba283-73eb-4d51-9d76-4c1024dd953b" providerId="ADAL" clId="{9D5F3A72-DC95-4AD1-BEF4-8CF1AE0745BD}" dt="2022-07-21T03:41:00.074" v="2462" actId="1036"/>
+          <ac:cxnSpMkLst>
+            <pc:docMk/>
+            <pc:sldMk cId="3398826638" sldId="261"/>
+            <ac:cxnSpMk id="22" creationId="{42F77A01-8C3E-69F6-8992-7F23C294C3D2}"/>
+          </ac:cxnSpMkLst>
+        </pc:cxnChg>
+        <pc:cxnChg chg="add mod">
+          <ac:chgData name="Murthy, Rajeswari K." userId="e10ba283-73eb-4d51-9d76-4c1024dd953b" providerId="ADAL" clId="{9D5F3A72-DC95-4AD1-BEF4-8CF1AE0745BD}" dt="2022-07-21T03:41:00.074" v="2462" actId="1036"/>
+          <ac:cxnSpMkLst>
+            <pc:docMk/>
+            <pc:sldMk cId="3398826638" sldId="261"/>
+            <ac:cxnSpMk id="23" creationId="{AF83B012-8DEA-92CF-CE61-952A0833D50D}"/>
+          </ac:cxnSpMkLst>
+        </pc:cxnChg>
+        <pc:cxnChg chg="add mod">
+          <ac:chgData name="Murthy, Rajeswari K." userId="e10ba283-73eb-4d51-9d76-4c1024dd953b" providerId="ADAL" clId="{9D5F3A72-DC95-4AD1-BEF4-8CF1AE0745BD}" dt="2022-07-21T03:41:00.074" v="2462" actId="1036"/>
+          <ac:cxnSpMkLst>
+            <pc:docMk/>
+            <pc:sldMk cId="3398826638" sldId="261"/>
+            <ac:cxnSpMk id="24" creationId="{A552E4DE-D227-51B5-7265-CEF21DA6E2B9}"/>
+          </ac:cxnSpMkLst>
+        </pc:cxnChg>
+        <pc:cxnChg chg="add mod">
+          <ac:chgData name="Murthy, Rajeswari K." userId="e10ba283-73eb-4d51-9d76-4c1024dd953b" providerId="ADAL" clId="{9D5F3A72-DC95-4AD1-BEF4-8CF1AE0745BD}" dt="2022-07-21T03:41:00.074" v="2462" actId="1036"/>
+          <ac:cxnSpMkLst>
+            <pc:docMk/>
+            <pc:sldMk cId="3398826638" sldId="261"/>
+            <ac:cxnSpMk id="25" creationId="{DC09D1C3-23DF-FB85-640E-739F0E912667}"/>
+          </ac:cxnSpMkLst>
+        </pc:cxnChg>
+        <pc:cxnChg chg="add del mod">
+          <ac:chgData name="Murthy, Rajeswari K." userId="e10ba283-73eb-4d51-9d76-4c1024dd953b" providerId="ADAL" clId="{9D5F3A72-DC95-4AD1-BEF4-8CF1AE0745BD}" dt="2022-07-19T11:01:35.134" v="302" actId="478"/>
+          <ac:cxnSpMkLst>
+            <pc:docMk/>
+            <pc:sldMk cId="3398826638" sldId="261"/>
+            <ac:cxnSpMk id="26" creationId="{A6349D3C-1F6D-E146-A03A-124EDB5F48B5}"/>
+          </ac:cxnSpMkLst>
+        </pc:cxnChg>
+        <pc:cxnChg chg="add mod">
+          <ac:chgData name="Murthy, Rajeswari K." userId="e10ba283-73eb-4d51-9d76-4c1024dd953b" providerId="ADAL" clId="{9D5F3A72-DC95-4AD1-BEF4-8CF1AE0745BD}" dt="2022-07-21T03:41:00.074" v="2462" actId="1036"/>
+          <ac:cxnSpMkLst>
+            <pc:docMk/>
+            <pc:sldMk cId="3398826638" sldId="261"/>
+            <ac:cxnSpMk id="31" creationId="{CFAF9544-7214-1F65-5D00-582FE18894DD}"/>
+          </ac:cxnSpMkLst>
+        </pc:cxnChg>
+        <pc:cxnChg chg="add mod">
+          <ac:chgData name="Murthy, Rajeswari K." userId="e10ba283-73eb-4d51-9d76-4c1024dd953b" providerId="ADAL" clId="{9D5F3A72-DC95-4AD1-BEF4-8CF1AE0745BD}" dt="2022-07-21T03:41:00.074" v="2462" actId="1036"/>
+          <ac:cxnSpMkLst>
+            <pc:docMk/>
+            <pc:sldMk cId="3398826638" sldId="261"/>
+            <ac:cxnSpMk id="33" creationId="{A6AD977E-126A-F492-38F8-D9978479ED1A}"/>
+          </ac:cxnSpMkLst>
+        </pc:cxnChg>
+        <pc:cxnChg chg="add mod">
+          <ac:chgData name="Murthy, Rajeswari K." userId="e10ba283-73eb-4d51-9d76-4c1024dd953b" providerId="ADAL" clId="{9D5F3A72-DC95-4AD1-BEF4-8CF1AE0745BD}" dt="2022-07-21T03:41:00.074" v="2462" actId="1036"/>
+          <ac:cxnSpMkLst>
+            <pc:docMk/>
+            <pc:sldMk cId="3398826638" sldId="261"/>
+            <ac:cxnSpMk id="34" creationId="{4E8F08E3-0AFD-6F21-1B8B-50D64060AD91}"/>
+          </ac:cxnSpMkLst>
+        </pc:cxnChg>
+        <pc:cxnChg chg="add del mod">
+          <ac:chgData name="Murthy, Rajeswari K." userId="e10ba283-73eb-4d51-9d76-4c1024dd953b" providerId="ADAL" clId="{9D5F3A72-DC95-4AD1-BEF4-8CF1AE0745BD}" dt="2022-07-20T08:58:46.533" v="1482" actId="478"/>
+          <ac:cxnSpMkLst>
+            <pc:docMk/>
+            <pc:sldMk cId="3398826638" sldId="261"/>
+            <ac:cxnSpMk id="35" creationId="{6DC68C8E-C10F-382F-272F-1970D837413B}"/>
+          </ac:cxnSpMkLst>
+        </pc:cxnChg>
+        <pc:cxnChg chg="add del mod">
+          <ac:chgData name="Murthy, Rajeswari K." userId="e10ba283-73eb-4d51-9d76-4c1024dd953b" providerId="ADAL" clId="{9D5F3A72-DC95-4AD1-BEF4-8CF1AE0745BD}" dt="2022-07-19T13:42:15.089" v="513" actId="478"/>
+          <ac:cxnSpMkLst>
+            <pc:docMk/>
+            <pc:sldMk cId="3398826638" sldId="261"/>
+            <ac:cxnSpMk id="40" creationId="{4DA9715C-D209-334A-1FED-6DBD241845B9}"/>
+          </ac:cxnSpMkLst>
+        </pc:cxnChg>
+        <pc:cxnChg chg="add mod">
+          <ac:chgData name="Murthy, Rajeswari K." userId="e10ba283-73eb-4d51-9d76-4c1024dd953b" providerId="ADAL" clId="{9D5F3A72-DC95-4AD1-BEF4-8CF1AE0745BD}" dt="2022-07-19T14:42:02.932" v="950" actId="1076"/>
+          <ac:cxnSpMkLst>
+            <pc:docMk/>
+            <pc:sldMk cId="3398826638" sldId="261"/>
+            <ac:cxnSpMk id="59" creationId="{EBEB975D-3157-8D41-766D-31BD8A256A77}"/>
+          </ac:cxnSpMkLst>
+        </pc:cxnChg>
+        <pc:cxnChg chg="add mod">
+          <ac:chgData name="Murthy, Rajeswari K." userId="e10ba283-73eb-4d51-9d76-4c1024dd953b" providerId="ADAL" clId="{9D5F3A72-DC95-4AD1-BEF4-8CF1AE0745BD}" dt="2022-07-19T14:42:02.932" v="950" actId="1076"/>
+          <ac:cxnSpMkLst>
+            <pc:docMk/>
+            <pc:sldMk cId="3398826638" sldId="261"/>
+            <ac:cxnSpMk id="62" creationId="{361694C3-803B-5682-C8E8-CA20E4186745}"/>
+          </ac:cxnSpMkLst>
+        </pc:cxnChg>
+        <pc:cxnChg chg="add mod">
+          <ac:chgData name="Murthy, Rajeswari K." userId="e10ba283-73eb-4d51-9d76-4c1024dd953b" providerId="ADAL" clId="{9D5F3A72-DC95-4AD1-BEF4-8CF1AE0745BD}" dt="2022-07-19T14:42:02.932" v="950" actId="1076"/>
+          <ac:cxnSpMkLst>
+            <pc:docMk/>
+            <pc:sldMk cId="3398826638" sldId="261"/>
+            <ac:cxnSpMk id="64" creationId="{C97CDAD4-11D4-AADC-4DD5-8AD3F4B1C081}"/>
+          </ac:cxnSpMkLst>
+        </pc:cxnChg>
+        <pc:cxnChg chg="add mod">
+          <ac:chgData name="Murthy, Rajeswari K." userId="e10ba283-73eb-4d51-9d76-4c1024dd953b" providerId="ADAL" clId="{9D5F3A72-DC95-4AD1-BEF4-8CF1AE0745BD}" dt="2022-07-19T14:42:02.932" v="950" actId="1076"/>
+          <ac:cxnSpMkLst>
+            <pc:docMk/>
+            <pc:sldMk cId="3398826638" sldId="261"/>
+            <ac:cxnSpMk id="66" creationId="{737DC637-0DAF-00A3-AC19-FE908D3FD4D7}"/>
+          </ac:cxnSpMkLst>
+        </pc:cxnChg>
+      </pc:sldChg>
+      <pc:sldChg chg="addSp delSp modSp new mod ord">
+        <pc:chgData name="Murthy, Rajeswari K." userId="e10ba283-73eb-4d51-9d76-4c1024dd953b" providerId="ADAL" clId="{9D5F3A72-DC95-4AD1-BEF4-8CF1AE0745BD}" dt="2022-07-19T14:47:42.764" v="1001" actId="20577"/>
+        <pc:sldMkLst>
+          <pc:docMk/>
+          <pc:sldMk cId="4068422202" sldId="262"/>
+        </pc:sldMkLst>
+        <pc:spChg chg="add del mod">
+          <ac:chgData name="Murthy, Rajeswari K." userId="e10ba283-73eb-4d51-9d76-4c1024dd953b" providerId="ADAL" clId="{9D5F3A72-DC95-4AD1-BEF4-8CF1AE0745BD}" dt="2022-07-19T14:46:16.687" v="955"/>
+          <ac:spMkLst>
+            <pc:docMk/>
+            <pc:sldMk cId="4068422202" sldId="262"/>
+            <ac:spMk id="2" creationId="{5AF3F250-FC5C-3A1B-70A3-2A35D687DF9A}"/>
+          </ac:spMkLst>
+        </pc:spChg>
+        <pc:spChg chg="add mod">
+          <ac:chgData name="Murthy, Rajeswari K." userId="e10ba283-73eb-4d51-9d76-4c1024dd953b" providerId="ADAL" clId="{9D5F3A72-DC95-4AD1-BEF4-8CF1AE0745BD}" dt="2022-07-19T14:47:42.764" v="1001" actId="20577"/>
+          <ac:spMkLst>
+            <pc:docMk/>
+            <pc:sldMk cId="4068422202" sldId="262"/>
+            <ac:spMk id="5" creationId="{8360D34D-6E19-7816-BF8B-49FAE633654F}"/>
+          </ac:spMkLst>
+        </pc:spChg>
+        <pc:picChg chg="add del">
+          <ac:chgData name="Murthy, Rajeswari K." userId="e10ba283-73eb-4d51-9d76-4c1024dd953b" providerId="ADAL" clId="{9D5F3A72-DC95-4AD1-BEF4-8CF1AE0745BD}" dt="2022-07-19T14:46:23.212" v="957"/>
+          <ac:picMkLst>
+            <pc:docMk/>
+            <pc:sldMk cId="4068422202" sldId="262"/>
+            <ac:picMk id="3" creationId="{310E64AE-988E-E44D-A3D4-F0FBE33DD1D2}"/>
+          </ac:picMkLst>
+        </pc:picChg>
+        <pc:picChg chg="add mod">
+          <ac:chgData name="Murthy, Rajeswari K." userId="e10ba283-73eb-4d51-9d76-4c1024dd953b" providerId="ADAL" clId="{9D5F3A72-DC95-4AD1-BEF4-8CF1AE0745BD}" dt="2022-07-19T14:47:11.402" v="959" actId="14100"/>
+          <ac:picMkLst>
+            <pc:docMk/>
+            <pc:sldMk cId="4068422202" sldId="262"/>
+            <ac:picMk id="4" creationId="{8B31AFE4-502B-7F07-EB1C-3AC5945DC978}"/>
+          </ac:picMkLst>
+        </pc:picChg>
+      </pc:sldChg>
+      <pc:sldChg chg="addSp modSp new mod ord">
+        <pc:chgData name="Murthy, Rajeswari K." userId="e10ba283-73eb-4d51-9d76-4c1024dd953b" providerId="ADAL" clId="{9D5F3A72-DC95-4AD1-BEF4-8CF1AE0745BD}" dt="2022-07-20T11:06:05.211" v="2180" actId="1076"/>
+        <pc:sldMkLst>
+          <pc:docMk/>
+          <pc:sldMk cId="4217913550" sldId="263"/>
+        </pc:sldMkLst>
+        <pc:spChg chg="add mod">
+          <ac:chgData name="Murthy, Rajeswari K." userId="e10ba283-73eb-4d51-9d76-4c1024dd953b" providerId="ADAL" clId="{9D5F3A72-DC95-4AD1-BEF4-8CF1AE0745BD}" dt="2022-07-20T11:06:05.211" v="2180" actId="1076"/>
+          <ac:spMkLst>
+            <pc:docMk/>
+            <pc:sldMk cId="4217913550" sldId="263"/>
+            <ac:spMk id="3" creationId="{44CB8F40-D6A7-240D-B600-818E26CC1CFF}"/>
+          </ac:spMkLst>
+        </pc:spChg>
+        <pc:picChg chg="add">
+          <ac:chgData name="Murthy, Rajeswari K." userId="e10ba283-73eb-4d51-9d76-4c1024dd953b" providerId="ADAL" clId="{9D5F3A72-DC95-4AD1-BEF4-8CF1AE0745BD}" dt="2022-07-20T07:27:37.044" v="1324"/>
+          <ac:picMkLst>
+            <pc:docMk/>
+            <pc:sldMk cId="4217913550" sldId="263"/>
+            <ac:picMk id="2" creationId="{08F1CE91-C5BD-6B74-3998-645B19CAEF39}"/>
+          </ac:picMkLst>
+        </pc:picChg>
+      </pc:sldChg>
+      <pc:sldChg chg="addSp delSp modSp add mod ord">
+        <pc:chgData name="Murthy, Rajeswari K." userId="e10ba283-73eb-4d51-9d76-4c1024dd953b" providerId="ADAL" clId="{9D5F3A72-DC95-4AD1-BEF4-8CF1AE0745BD}" dt="2022-07-21T03:42:53.477" v="2467" actId="1076"/>
+        <pc:sldMkLst>
+          <pc:docMk/>
+          <pc:sldMk cId="970682747" sldId="264"/>
+        </pc:sldMkLst>
+        <pc:spChg chg="mod">
+          <ac:chgData name="Murthy, Rajeswari K." userId="e10ba283-73eb-4d51-9d76-4c1024dd953b" providerId="ADAL" clId="{9D5F3A72-DC95-4AD1-BEF4-8CF1AE0745BD}" dt="2022-07-20T10:53:14.609" v="2047" actId="1076"/>
+          <ac:spMkLst>
+            <pc:docMk/>
+            <pc:sldMk cId="970682747" sldId="264"/>
+            <ac:spMk id="5" creationId="{8360D34D-6E19-7816-BF8B-49FAE633654F}"/>
+          </ac:spMkLst>
+        </pc:spChg>
+        <pc:spChg chg="add del">
+          <ac:chgData name="Murthy, Rajeswari K." userId="e10ba283-73eb-4d51-9d76-4c1024dd953b" providerId="ADAL" clId="{9D5F3A72-DC95-4AD1-BEF4-8CF1AE0745BD}" dt="2022-07-20T08:33:20.604" v="1382" actId="22"/>
+          <ac:spMkLst>
+            <pc:docMk/>
+            <pc:sldMk cId="970682747" sldId="264"/>
+            <ac:spMk id="6" creationId="{10283EFA-8BD7-F66E-A468-75C266F6F46A}"/>
+          </ac:spMkLst>
+        </pc:spChg>
+        <pc:spChg chg="add del">
+          <ac:chgData name="Murthy, Rajeswari K." userId="e10ba283-73eb-4d51-9d76-4c1024dd953b" providerId="ADAL" clId="{9D5F3A72-DC95-4AD1-BEF4-8CF1AE0745BD}" dt="2022-07-20T08:33:58.172" v="1385" actId="478"/>
+          <ac:spMkLst>
+            <pc:docMk/>
+            <pc:sldMk cId="970682747" sldId="264"/>
+            <ac:spMk id="7" creationId="{693AC76C-7547-8F62-FC9A-197CAF5743BE}"/>
+          </ac:spMkLst>
+        </pc:spChg>
+        <pc:spChg chg="add mod">
+          <ac:chgData name="Murthy, Rajeswari K." userId="e10ba283-73eb-4d51-9d76-4c1024dd953b" providerId="ADAL" clId="{9D5F3A72-DC95-4AD1-BEF4-8CF1AE0745BD}" dt="2022-07-20T10:53:04.942" v="2033" actId="1038"/>
+          <ac:spMkLst>
+            <pc:docMk/>
+            <pc:sldMk cId="970682747" sldId="264"/>
+            <ac:spMk id="10" creationId="{0FFE9543-C011-3F86-F186-F163DBB97F17}"/>
+          </ac:spMkLst>
+        </pc:spChg>
+        <pc:spChg chg="add mod">
+          <ac:chgData name="Murthy, Rajeswari K." userId="e10ba283-73eb-4d51-9d76-4c1024dd953b" providerId="ADAL" clId="{9D5F3A72-DC95-4AD1-BEF4-8CF1AE0745BD}" dt="2022-07-20T10:48:11.935" v="1743" actId="1076"/>
+          <ac:spMkLst>
+            <pc:docMk/>
+            <pc:sldMk cId="970682747" sldId="264"/>
+            <ac:spMk id="12" creationId="{E326DB06-52DA-D775-3A90-0DB031E1765E}"/>
+          </ac:spMkLst>
+        </pc:spChg>
+        <pc:spChg chg="add mod">
+          <ac:chgData name="Murthy, Rajeswari K." userId="e10ba283-73eb-4d51-9d76-4c1024dd953b" providerId="ADAL" clId="{9D5F3A72-DC95-4AD1-BEF4-8CF1AE0745BD}" dt="2022-07-20T10:48:09.627" v="1742" actId="1076"/>
+          <ac:spMkLst>
+            <pc:docMk/>
+            <pc:sldMk cId="970682747" sldId="264"/>
+            <ac:spMk id="13" creationId="{610D38E0-9B66-C678-C37C-3FF01A18467F}"/>
+          </ac:spMkLst>
+        </pc:spChg>
+        <pc:spChg chg="add mod">
+          <ac:chgData name="Murthy, Rajeswari K." userId="e10ba283-73eb-4d51-9d76-4c1024dd953b" providerId="ADAL" clId="{9D5F3A72-DC95-4AD1-BEF4-8CF1AE0745BD}" dt="2022-07-20T10:48:07.163" v="1741" actId="1076"/>
+          <ac:spMkLst>
+            <pc:docMk/>
+            <pc:sldMk cId="970682747" sldId="264"/>
+            <ac:spMk id="14" creationId="{FB76E283-70AB-8FF9-E4BE-A09DA6BC1FE6}"/>
+          </ac:spMkLst>
+        </pc:spChg>
+        <pc:spChg chg="add mod">
+          <ac:chgData name="Murthy, Rajeswari K." userId="e10ba283-73eb-4d51-9d76-4c1024dd953b" providerId="ADAL" clId="{9D5F3A72-DC95-4AD1-BEF4-8CF1AE0745BD}" dt="2022-07-20T10:50:31.179" v="1866" actId="1038"/>
+          <ac:spMkLst>
+            <pc:docMk/>
+            <pc:sldMk cId="970682747" sldId="264"/>
+            <ac:spMk id="15" creationId="{A32E30B2-5CEF-4ABB-F656-2960456CD261}"/>
+          </ac:spMkLst>
+        </pc:spChg>
+        <pc:spChg chg="add mod">
+          <ac:chgData name="Murthy, Rajeswari K." userId="e10ba283-73eb-4d51-9d76-4c1024dd953b" providerId="ADAL" clId="{9D5F3A72-DC95-4AD1-BEF4-8CF1AE0745BD}" dt="2022-07-20T10:50:31.179" v="1866" actId="1038"/>
+          <ac:spMkLst>
+            <pc:docMk/>
+            <pc:sldMk cId="970682747" sldId="264"/>
+            <ac:spMk id="16" creationId="{F5D09F3F-F5C1-E469-83DF-94D5FFE99E27}"/>
+          </ac:spMkLst>
+        </pc:spChg>
+        <pc:spChg chg="add mod">
+          <ac:chgData name="Murthy, Rajeswari K." userId="e10ba283-73eb-4d51-9d76-4c1024dd953b" providerId="ADAL" clId="{9D5F3A72-DC95-4AD1-BEF4-8CF1AE0745BD}" dt="2022-07-20T10:53:24.088" v="2075" actId="1037"/>
+          <ac:spMkLst>
+            <pc:docMk/>
+            <pc:sldMk cId="970682747" sldId="264"/>
+            <ac:spMk id="17" creationId="{DF0D0BBB-8461-8F27-53C4-F7805A113FB1}"/>
+          </ac:spMkLst>
+        </pc:spChg>
+        <pc:spChg chg="add mod">
+          <ac:chgData name="Murthy, Rajeswari K." userId="e10ba283-73eb-4d51-9d76-4c1024dd953b" providerId="ADAL" clId="{9D5F3A72-DC95-4AD1-BEF4-8CF1AE0745BD}" dt="2022-07-20T10:50:31.179" v="1866" actId="1038"/>
+          <ac:spMkLst>
+            <pc:docMk/>
+            <pc:sldMk cId="970682747" sldId="264"/>
+            <ac:spMk id="18" creationId="{8CE0E5F2-D8DF-DFCF-7EF6-81DD0F83D6B6}"/>
+          </ac:spMkLst>
+        </pc:spChg>
+        <pc:spChg chg="add mod">
+          <ac:chgData name="Murthy, Rajeswari K." userId="e10ba283-73eb-4d51-9d76-4c1024dd953b" providerId="ADAL" clId="{9D5F3A72-DC95-4AD1-BEF4-8CF1AE0745BD}" dt="2022-07-20T10:52:36.926" v="1990" actId="1038"/>
+          <ac:spMkLst>
+            <pc:docMk/>
+            <pc:sldMk cId="970682747" sldId="264"/>
+            <ac:spMk id="19" creationId="{86148B60-EDEE-0254-6871-76894956FC74}"/>
+          </ac:spMkLst>
+        </pc:spChg>
+        <pc:spChg chg="add mod">
+          <ac:chgData name="Murthy, Rajeswari K." userId="e10ba283-73eb-4d51-9d76-4c1024dd953b" providerId="ADAL" clId="{9D5F3A72-DC95-4AD1-BEF4-8CF1AE0745BD}" dt="2022-07-20T10:51:19.144" v="1903" actId="1038"/>
+          <ac:spMkLst>
+            <pc:docMk/>
+            <pc:sldMk cId="970682747" sldId="264"/>
+            <ac:spMk id="20" creationId="{E78B3E44-BFA6-6AD2-060B-E2E0EB89AF1B}"/>
+          </ac:spMkLst>
+        </pc:spChg>
+        <pc:spChg chg="add mod">
+          <ac:chgData name="Murthy, Rajeswari K." userId="e10ba283-73eb-4d51-9d76-4c1024dd953b" providerId="ADAL" clId="{9D5F3A72-DC95-4AD1-BEF4-8CF1AE0745BD}" dt="2022-07-20T10:50:31.179" v="1866" actId="1038"/>
+          <ac:spMkLst>
+            <pc:docMk/>
+            <pc:sldMk cId="970682747" sldId="264"/>
+            <ac:spMk id="24" creationId="{9B743E49-CC98-3A34-D7E5-DECF1773FD51}"/>
+          </ac:spMkLst>
+        </pc:spChg>
+        <pc:spChg chg="add mod">
+          <ac:chgData name="Murthy, Rajeswari K." userId="e10ba283-73eb-4d51-9d76-4c1024dd953b" providerId="ADAL" clId="{9D5F3A72-DC95-4AD1-BEF4-8CF1AE0745BD}" dt="2022-07-20T10:51:19.144" v="1903" actId="1038"/>
+          <ac:spMkLst>
+            <pc:docMk/>
+            <pc:sldMk cId="970682747" sldId="264"/>
+            <ac:spMk id="28" creationId="{9E7A2088-2206-71CD-CC95-1477FA63AB0A}"/>
+          </ac:spMkLst>
+        </pc:spChg>
+        <pc:spChg chg="add mod">
+          <ac:chgData name="Murthy, Rajeswari K." userId="e10ba283-73eb-4d51-9d76-4c1024dd953b" providerId="ADAL" clId="{9D5F3A72-DC95-4AD1-BEF4-8CF1AE0745BD}" dt="2022-07-20T10:51:19.144" v="1903" actId="1038"/>
+          <ac:spMkLst>
+            <pc:docMk/>
+            <pc:sldMk cId="970682747" sldId="264"/>
+            <ac:spMk id="29" creationId="{B13EF465-3F92-DC30-6E2A-85E73D1B58ED}"/>
+          </ac:spMkLst>
+        </pc:spChg>
+        <pc:spChg chg="add mod">
+          <ac:chgData name="Murthy, Rajeswari K." userId="e10ba283-73eb-4d51-9d76-4c1024dd953b" providerId="ADAL" clId="{9D5F3A72-DC95-4AD1-BEF4-8CF1AE0745BD}" dt="2022-07-20T10:51:19.144" v="1903" actId="1038"/>
+          <ac:spMkLst>
+            <pc:docMk/>
+            <pc:sldMk cId="970682747" sldId="264"/>
+            <ac:spMk id="30" creationId="{022DDEC3-99F9-D119-52C8-ACA0BD0B5E7B}"/>
+          </ac:spMkLst>
+        </pc:spChg>
+        <pc:spChg chg="add mod">
+          <ac:chgData name="Murthy, Rajeswari K." userId="e10ba283-73eb-4d51-9d76-4c1024dd953b" providerId="ADAL" clId="{9D5F3A72-DC95-4AD1-BEF4-8CF1AE0745BD}" dt="2022-07-20T10:54:32.901" v="2106" actId="1035"/>
+          <ac:spMkLst>
+            <pc:docMk/>
+            <pc:sldMk cId="970682747" sldId="264"/>
+            <ac:spMk id="31" creationId="{E6282C95-EB77-2C3C-2A9B-42EA58186663}"/>
+          </ac:spMkLst>
+        </pc:spChg>
+        <pc:spChg chg="add mod">
+          <ac:chgData name="Murthy, Rajeswari K." userId="e10ba283-73eb-4d51-9d76-4c1024dd953b" providerId="ADAL" clId="{9D5F3A72-DC95-4AD1-BEF4-8CF1AE0745BD}" dt="2022-07-20T10:52:36.926" v="1990" actId="1038"/>
+          <ac:spMkLst>
+            <pc:docMk/>
+            <pc:sldMk cId="970682747" sldId="264"/>
+            <ac:spMk id="41" creationId="{A15C0E77-6388-915F-DE3B-FAC234B083C4}"/>
+          </ac:spMkLst>
+        </pc:spChg>
+        <pc:spChg chg="add mod">
+          <ac:chgData name="Murthy, Rajeswari K." userId="e10ba283-73eb-4d51-9d76-4c1024dd953b" providerId="ADAL" clId="{9D5F3A72-DC95-4AD1-BEF4-8CF1AE0745BD}" dt="2022-07-20T10:55:02.604" v="2120" actId="1036"/>
+          <ac:spMkLst>
+            <pc:docMk/>
+            <pc:sldMk cId="970682747" sldId="264"/>
+            <ac:spMk id="42" creationId="{BB3FF1CE-3F37-3A75-3609-345ADFB25DD5}"/>
+          </ac:spMkLst>
+        </pc:spChg>
+        <pc:picChg chg="add mod">
+          <ac:chgData name="Murthy, Rajeswari K." userId="e10ba283-73eb-4d51-9d76-4c1024dd953b" providerId="ADAL" clId="{9D5F3A72-DC95-4AD1-BEF4-8CF1AE0745BD}" dt="2022-07-21T03:42:53.477" v="2467" actId="1076"/>
+          <ac:picMkLst>
+            <pc:docMk/>
+            <pc:sldMk cId="970682747" sldId="264"/>
+            <ac:picMk id="2" creationId="{B88ABBEF-E7D2-DE20-D408-EF2840BE8EF4}"/>
+          </ac:picMkLst>
+        </pc:picChg>
+        <pc:picChg chg="add del mod">
+          <ac:chgData name="Murthy, Rajeswari K." userId="e10ba283-73eb-4d51-9d76-4c1024dd953b" providerId="ADAL" clId="{9D5F3A72-DC95-4AD1-BEF4-8CF1AE0745BD}" dt="2022-07-20T08:37:32.985" v="1388" actId="478"/>
+          <ac:picMkLst>
+            <pc:docMk/>
+            <pc:sldMk cId="970682747" sldId="264"/>
+            <ac:picMk id="3" creationId="{18D689D5-5E61-68A2-FD99-2C26CE1D5713}"/>
+          </ac:picMkLst>
+        </pc:picChg>
+        <pc:picChg chg="del mod">
+          <ac:chgData name="Murthy, Rajeswari K." userId="e10ba283-73eb-4d51-9d76-4c1024dd953b" providerId="ADAL" clId="{9D5F3A72-DC95-4AD1-BEF4-8CF1AE0745BD}" dt="2022-07-20T08:31:36.615" v="1380" actId="478"/>
+          <ac:picMkLst>
+            <pc:docMk/>
+            <pc:sldMk cId="970682747" sldId="264"/>
+            <ac:picMk id="4" creationId="{8B31AFE4-502B-7F07-EB1C-3AC5945DC978}"/>
+          </ac:picMkLst>
+        </pc:picChg>
+        <pc:picChg chg="add mod">
+          <ac:chgData name="Murthy, Rajeswari K." userId="e10ba283-73eb-4d51-9d76-4c1024dd953b" providerId="ADAL" clId="{9D5F3A72-DC95-4AD1-BEF4-8CF1AE0745BD}" dt="2022-07-20T10:53:24.088" v="2075" actId="1037"/>
+          <ac:picMkLst>
+            <pc:docMk/>
+            <pc:sldMk cId="970682747" sldId="264"/>
+            <ac:picMk id="8" creationId="{0130E0D2-0B57-6B32-6380-6F9809045268}"/>
+          </ac:picMkLst>
+        </pc:picChg>
+        <pc:picChg chg="add mod">
+          <ac:chgData name="Murthy, Rajeswari K." userId="e10ba283-73eb-4d51-9d76-4c1024dd953b" providerId="ADAL" clId="{9D5F3A72-DC95-4AD1-BEF4-8CF1AE0745BD}" dt="2022-07-20T10:52:57.391" v="2006" actId="1038"/>
+          <ac:picMkLst>
+            <pc:docMk/>
+            <pc:sldMk cId="970682747" sldId="264"/>
+            <ac:picMk id="9" creationId="{2AA744A4-017F-E2BA-CFCE-333EA1DCB9A1}"/>
+          </ac:picMkLst>
+        </pc:picChg>
+        <pc:picChg chg="add mod">
+          <ac:chgData name="Murthy, Rajeswari K." userId="e10ba283-73eb-4d51-9d76-4c1024dd953b" providerId="ADAL" clId="{9D5F3A72-DC95-4AD1-BEF4-8CF1AE0745BD}" dt="2022-07-20T10:56:02.321" v="2124" actId="1076"/>
+          <ac:picMkLst>
+            <pc:docMk/>
+            <pc:sldMk cId="970682747" sldId="264"/>
+            <ac:picMk id="65" creationId="{AC74BD2A-FB8C-2239-2C82-4BDAF3F4125A}"/>
+          </ac:picMkLst>
+        </pc:picChg>
+        <pc:picChg chg="add mod">
+          <ac:chgData name="Murthy, Rajeswari K." userId="e10ba283-73eb-4d51-9d76-4c1024dd953b" providerId="ADAL" clId="{9D5F3A72-DC95-4AD1-BEF4-8CF1AE0745BD}" dt="2022-07-20T10:56:33.245" v="2129" actId="1076"/>
+          <ac:picMkLst>
+            <pc:docMk/>
+            <pc:sldMk cId="970682747" sldId="264"/>
+            <ac:picMk id="66" creationId="{D03D0195-A3FE-203C-0943-4CABCA6C5CBA}"/>
+          </ac:picMkLst>
+        </pc:picChg>
+        <pc:picChg chg="add mod">
+          <ac:chgData name="Murthy, Rajeswari K." userId="e10ba283-73eb-4d51-9d76-4c1024dd953b" providerId="ADAL" clId="{9D5F3A72-DC95-4AD1-BEF4-8CF1AE0745BD}" dt="2022-07-20T10:57:05.289" v="2132" actId="1076"/>
+          <ac:picMkLst>
+            <pc:docMk/>
+            <pc:sldMk cId="970682747" sldId="264"/>
+            <ac:picMk id="67" creationId="{C2DCC7D4-560B-0FE2-3F2D-8C87F0331478}"/>
+          </ac:picMkLst>
+        </pc:picChg>
+        <pc:picChg chg="add del mod">
+          <ac:chgData name="Murthy, Rajeswari K." userId="e10ba283-73eb-4d51-9d76-4c1024dd953b" providerId="ADAL" clId="{9D5F3A72-DC95-4AD1-BEF4-8CF1AE0745BD}" dt="2022-07-20T10:57:30.850" v="2136" actId="478"/>
+          <ac:picMkLst>
+            <pc:docMk/>
+            <pc:sldMk cId="970682747" sldId="264"/>
+            <ac:picMk id="68" creationId="{B7D2137B-87CD-FDB4-7769-5B7E93F8B335}"/>
+          </ac:picMkLst>
+        </pc:picChg>
+        <pc:picChg chg="add mod">
+          <ac:chgData name="Murthy, Rajeswari K." userId="e10ba283-73eb-4d51-9d76-4c1024dd953b" providerId="ADAL" clId="{9D5F3A72-DC95-4AD1-BEF4-8CF1AE0745BD}" dt="2022-07-20T10:57:54.765" v="2139" actId="1076"/>
+          <ac:picMkLst>
+            <pc:docMk/>
+            <pc:sldMk cId="970682747" sldId="264"/>
+            <ac:picMk id="69" creationId="{4DF495C3-DC26-A0E0-DABE-959F1C9E2D09}"/>
+          </ac:picMkLst>
+        </pc:picChg>
+        <pc:picChg chg="add del">
+          <ac:chgData name="Murthy, Rajeswari K." userId="e10ba283-73eb-4d51-9d76-4c1024dd953b" providerId="ADAL" clId="{9D5F3A72-DC95-4AD1-BEF4-8CF1AE0745BD}" dt="2022-07-20T10:58:12.937" v="2141"/>
+          <ac:picMkLst>
+            <pc:docMk/>
+            <pc:sldMk cId="970682747" sldId="264"/>
+            <ac:picMk id="70" creationId="{3DC3DED1-B8F5-2847-FBA3-E4B406C677CE}"/>
+          </ac:picMkLst>
+        </pc:picChg>
+        <pc:picChg chg="add mod">
+          <ac:chgData name="Murthy, Rajeswari K." userId="e10ba283-73eb-4d51-9d76-4c1024dd953b" providerId="ADAL" clId="{9D5F3A72-DC95-4AD1-BEF4-8CF1AE0745BD}" dt="2022-07-20T10:58:28.194" v="2144" actId="1076"/>
+          <ac:picMkLst>
+            <pc:docMk/>
+            <pc:sldMk cId="970682747" sldId="264"/>
+            <ac:picMk id="71" creationId="{AEE980F5-4E6D-3ACC-4C7D-5266E0D3443D}"/>
+          </ac:picMkLst>
+        </pc:picChg>
+        <pc:picChg chg="add mod">
+          <ac:chgData name="Murthy, Rajeswari K." userId="e10ba283-73eb-4d51-9d76-4c1024dd953b" providerId="ADAL" clId="{9D5F3A72-DC95-4AD1-BEF4-8CF1AE0745BD}" dt="2022-07-20T10:58:56.842" v="2148" actId="1076"/>
+          <ac:picMkLst>
+            <pc:docMk/>
+            <pc:sldMk cId="970682747" sldId="264"/>
+            <ac:picMk id="72" creationId="{BAAE6EF8-FB44-E955-B4E2-D65D9B58A90B}"/>
+          </ac:picMkLst>
+        </pc:picChg>
+        <pc:picChg chg="add mod">
+          <ac:chgData name="Murthy, Rajeswari K." userId="e10ba283-73eb-4d51-9d76-4c1024dd953b" providerId="ADAL" clId="{9D5F3A72-DC95-4AD1-BEF4-8CF1AE0745BD}" dt="2022-07-20T10:59:21.728" v="2151" actId="1076"/>
+          <ac:picMkLst>
+            <pc:docMk/>
+            <pc:sldMk cId="970682747" sldId="264"/>
+            <ac:picMk id="73" creationId="{A9EF7B6D-8874-C0FF-FBB5-F09ECA8B6834}"/>
+          </ac:picMkLst>
+        </pc:picChg>
+        <pc:picChg chg="add mod">
+          <ac:chgData name="Murthy, Rajeswari K." userId="e10ba283-73eb-4d51-9d76-4c1024dd953b" providerId="ADAL" clId="{9D5F3A72-DC95-4AD1-BEF4-8CF1AE0745BD}" dt="2022-07-20T10:59:52.276" v="2154" actId="1076"/>
+          <ac:picMkLst>
+            <pc:docMk/>
+            <pc:sldMk cId="970682747" sldId="264"/>
+            <ac:picMk id="74" creationId="{FABA17CA-A0D0-D358-2FE4-784006C262D2}"/>
+          </ac:picMkLst>
+        </pc:picChg>
+        <pc:picChg chg="add mod">
+          <ac:chgData name="Murthy, Rajeswari K." userId="e10ba283-73eb-4d51-9d76-4c1024dd953b" providerId="ADAL" clId="{9D5F3A72-DC95-4AD1-BEF4-8CF1AE0745BD}" dt="2022-07-20T11:00:20.277" v="2157" actId="1076"/>
+          <ac:picMkLst>
+            <pc:docMk/>
+            <pc:sldMk cId="970682747" sldId="264"/>
+            <ac:picMk id="75" creationId="{A17B5A71-BD33-8B8B-E3F8-AC9F4C9AE49B}"/>
+          </ac:picMkLst>
+        </pc:picChg>
+        <pc:picChg chg="add del">
+          <ac:chgData name="Murthy, Rajeswari K." userId="e10ba283-73eb-4d51-9d76-4c1024dd953b" providerId="ADAL" clId="{9D5F3A72-DC95-4AD1-BEF4-8CF1AE0745BD}" dt="2022-07-20T11:01:01.005" v="2159" actId="478"/>
+          <ac:picMkLst>
+            <pc:docMk/>
+            <pc:sldMk cId="970682747" sldId="264"/>
+            <ac:picMk id="76" creationId="{856CF455-8007-3E46-FD93-3D8D4A8AD358}"/>
+          </ac:picMkLst>
+        </pc:picChg>
+        <pc:picChg chg="add mod">
+          <ac:chgData name="Murthy, Rajeswari K." userId="e10ba283-73eb-4d51-9d76-4c1024dd953b" providerId="ADAL" clId="{9D5F3A72-DC95-4AD1-BEF4-8CF1AE0745BD}" dt="2022-07-20T11:01:32.744" v="2162" actId="1076"/>
+          <ac:picMkLst>
+            <pc:docMk/>
+            <pc:sldMk cId="970682747" sldId="264"/>
+            <ac:picMk id="77" creationId="{7E9336FA-7432-E385-B795-103600E50C8E}"/>
+          </ac:picMkLst>
+        </pc:picChg>
+        <pc:picChg chg="add mod">
+          <ac:chgData name="Murthy, Rajeswari K." userId="e10ba283-73eb-4d51-9d76-4c1024dd953b" providerId="ADAL" clId="{9D5F3A72-DC95-4AD1-BEF4-8CF1AE0745BD}" dt="2022-07-20T11:01:41.829" v="2164" actId="1076"/>
+          <ac:picMkLst>
+            <pc:docMk/>
+            <pc:sldMk cId="970682747" sldId="264"/>
+            <ac:picMk id="78" creationId="{387AC6DD-8666-D99B-CA91-DC81070BCFFA}"/>
+          </ac:picMkLst>
+        </pc:picChg>
+        <pc:picChg chg="add mod">
+          <ac:chgData name="Murthy, Rajeswari K." userId="e10ba283-73eb-4d51-9d76-4c1024dd953b" providerId="ADAL" clId="{9D5F3A72-DC95-4AD1-BEF4-8CF1AE0745BD}" dt="2022-07-20T11:02:29.766" v="2167" actId="1076"/>
+          <ac:picMkLst>
+            <pc:docMk/>
+            <pc:sldMk cId="970682747" sldId="264"/>
+            <ac:picMk id="79" creationId="{F418E6E1-12CE-A443-5CC3-86C0170372D9}"/>
+          </ac:picMkLst>
+        </pc:picChg>
+        <pc:picChg chg="add mod">
+          <ac:chgData name="Murthy, Rajeswari K." userId="e10ba283-73eb-4d51-9d76-4c1024dd953b" providerId="ADAL" clId="{9D5F3A72-DC95-4AD1-BEF4-8CF1AE0745BD}" dt="2022-07-20T11:03:15.717" v="2170" actId="1076"/>
+          <ac:picMkLst>
+            <pc:docMk/>
+            <pc:sldMk cId="970682747" sldId="264"/>
+            <ac:picMk id="80" creationId="{2F25B937-88F5-4B08-1361-0BCC9B5DD2E7}"/>
+          </ac:picMkLst>
+        </pc:picChg>
+        <pc:picChg chg="add mod">
+          <ac:chgData name="Murthy, Rajeswari K." userId="e10ba283-73eb-4d51-9d76-4c1024dd953b" providerId="ADAL" clId="{9D5F3A72-DC95-4AD1-BEF4-8CF1AE0745BD}" dt="2022-07-20T11:03:37.885" v="2175" actId="1076"/>
+          <ac:picMkLst>
+            <pc:docMk/>
+            <pc:sldMk cId="970682747" sldId="264"/>
+            <ac:picMk id="81" creationId="{FE5C4247-14B3-5E67-0DD8-44604F682075}"/>
+          </ac:picMkLst>
+        </pc:picChg>
+        <pc:cxnChg chg="add mod">
+          <ac:chgData name="Murthy, Rajeswari K." userId="e10ba283-73eb-4d51-9d76-4c1024dd953b" providerId="ADAL" clId="{9D5F3A72-DC95-4AD1-BEF4-8CF1AE0745BD}" dt="2022-07-20T10:53:10.609" v="2045" actId="1038"/>
+          <ac:cxnSpMkLst>
+            <pc:docMk/>
+            <pc:sldMk cId="970682747" sldId="264"/>
+            <ac:cxnSpMk id="11" creationId="{67512535-E0A7-6944-6091-CDADEDA29B0C}"/>
+          </ac:cxnSpMkLst>
+        </pc:cxnChg>
+        <pc:cxnChg chg="add mod">
+          <ac:chgData name="Murthy, Rajeswari K." userId="e10ba283-73eb-4d51-9d76-4c1024dd953b" providerId="ADAL" clId="{9D5F3A72-DC95-4AD1-BEF4-8CF1AE0745BD}" dt="2022-07-20T10:50:51.119" v="1872" actId="14100"/>
+          <ac:cxnSpMkLst>
+            <pc:docMk/>
+            <pc:sldMk cId="970682747" sldId="264"/>
+            <ac:cxnSpMk id="26" creationId="{2F122B37-D6EB-BEB4-B5D9-C2BA37FF40E7}"/>
+          </ac:cxnSpMkLst>
+        </pc:cxnChg>
+        <pc:cxnChg chg="add mod">
+          <ac:chgData name="Murthy, Rajeswari K." userId="e10ba283-73eb-4d51-9d76-4c1024dd953b" providerId="ADAL" clId="{9D5F3A72-DC95-4AD1-BEF4-8CF1AE0745BD}" dt="2022-07-20T10:51:25.299" v="1905" actId="14100"/>
+          <ac:cxnSpMkLst>
+            <pc:docMk/>
+            <pc:sldMk cId="970682747" sldId="264"/>
+            <ac:cxnSpMk id="39" creationId="{45CD487D-4B4B-A00D-F8BE-9AFBE47C0D0D}"/>
+          </ac:cxnSpMkLst>
+        </pc:cxnChg>
+        <pc:cxnChg chg="add mod">
+          <ac:chgData name="Murthy, Rajeswari K." userId="e10ba283-73eb-4d51-9d76-4c1024dd953b" providerId="ADAL" clId="{9D5F3A72-DC95-4AD1-BEF4-8CF1AE0745BD}" dt="2022-07-20T10:54:32.901" v="2106" actId="1035"/>
+          <ac:cxnSpMkLst>
+            <pc:docMk/>
+            <pc:sldMk cId="970682747" sldId="264"/>
+            <ac:cxnSpMk id="44" creationId="{4ACCC654-7AD8-1E8D-8D2C-B1004BFE310B}"/>
+          </ac:cxnSpMkLst>
+        </pc:cxnChg>
+        <pc:cxnChg chg="add mod">
+          <ac:chgData name="Murthy, Rajeswari K." userId="e10ba283-73eb-4d51-9d76-4c1024dd953b" providerId="ADAL" clId="{9D5F3A72-DC95-4AD1-BEF4-8CF1AE0745BD}" dt="2022-07-20T10:52:57.391" v="2006" actId="1038"/>
+          <ac:cxnSpMkLst>
+            <pc:docMk/>
+            <pc:sldMk cId="970682747" sldId="264"/>
+            <ac:cxnSpMk id="48" creationId="{466E5990-059C-608B-CD9A-7C006DA84490}"/>
+          </ac:cxnSpMkLst>
+        </pc:cxnChg>
+        <pc:cxnChg chg="add mod">
+          <ac:chgData name="Murthy, Rajeswari K." userId="e10ba283-73eb-4d51-9d76-4c1024dd953b" providerId="ADAL" clId="{9D5F3A72-DC95-4AD1-BEF4-8CF1AE0745BD}" dt="2022-07-20T10:53:39.238" v="2079" actId="14100"/>
+          <ac:cxnSpMkLst>
+            <pc:docMk/>
+            <pc:sldMk cId="970682747" sldId="264"/>
+            <ac:cxnSpMk id="50" creationId="{3A0453E5-1FDD-5888-4A2E-117CBFFDF7E9}"/>
+          </ac:cxnSpMkLst>
+        </pc:cxnChg>
+        <pc:cxnChg chg="add mod">
+          <ac:chgData name="Murthy, Rajeswari K." userId="e10ba283-73eb-4d51-9d76-4c1024dd953b" providerId="ADAL" clId="{9D5F3A72-DC95-4AD1-BEF4-8CF1AE0745BD}" dt="2022-07-20T10:53:48.312" v="2081" actId="1076"/>
+          <ac:cxnSpMkLst>
+            <pc:docMk/>
+            <pc:sldMk cId="970682747" sldId="264"/>
+            <ac:cxnSpMk id="53" creationId="{7AD0BACF-6ADD-A1D0-7AF8-F2ACC92A7100}"/>
+          </ac:cxnSpMkLst>
+        </pc:cxnChg>
+        <pc:cxnChg chg="add mod">
+          <ac:chgData name="Murthy, Rajeswari K." userId="e10ba283-73eb-4d51-9d76-4c1024dd953b" providerId="ADAL" clId="{9D5F3A72-DC95-4AD1-BEF4-8CF1AE0745BD}" dt="2022-07-20T10:53:54.142" v="2083" actId="1076"/>
+          <ac:cxnSpMkLst>
+            <pc:docMk/>
+            <pc:sldMk cId="970682747" sldId="264"/>
+            <ac:cxnSpMk id="54" creationId="{84610882-EC0F-200F-C884-3930BF855284}"/>
+          </ac:cxnSpMkLst>
+        </pc:cxnChg>
+        <pc:cxnChg chg="add mod">
+          <ac:chgData name="Murthy, Rajeswari K." userId="e10ba283-73eb-4d51-9d76-4c1024dd953b" providerId="ADAL" clId="{9D5F3A72-DC95-4AD1-BEF4-8CF1AE0745BD}" dt="2022-07-20T10:54:01.580" v="2085" actId="1076"/>
+          <ac:cxnSpMkLst>
+            <pc:docMk/>
+            <pc:sldMk cId="970682747" sldId="264"/>
+            <ac:cxnSpMk id="55" creationId="{61441FE7-5319-558B-F045-E237143811D2}"/>
+          </ac:cxnSpMkLst>
+        </pc:cxnChg>
+        <pc:cxnChg chg="add mod">
+          <ac:chgData name="Murthy, Rajeswari K." userId="e10ba283-73eb-4d51-9d76-4c1024dd953b" providerId="ADAL" clId="{9D5F3A72-DC95-4AD1-BEF4-8CF1AE0745BD}" dt="2022-07-20T10:54:06.588" v="2087" actId="1076"/>
+          <ac:cxnSpMkLst>
+            <pc:docMk/>
+            <pc:sldMk cId="970682747" sldId="264"/>
+            <ac:cxnSpMk id="56" creationId="{B5C88153-8872-4FE0-F17C-95A2897963A6}"/>
+          </ac:cxnSpMkLst>
+        </pc:cxnChg>
+        <pc:cxnChg chg="add mod">
+          <ac:chgData name="Murthy, Rajeswari K." userId="e10ba283-73eb-4d51-9d76-4c1024dd953b" providerId="ADAL" clId="{9D5F3A72-DC95-4AD1-BEF4-8CF1AE0745BD}" dt="2022-07-20T10:54:12.410" v="2089" actId="1076"/>
+          <ac:cxnSpMkLst>
+            <pc:docMk/>
+            <pc:sldMk cId="970682747" sldId="264"/>
+            <ac:cxnSpMk id="57" creationId="{A4B42306-C924-6531-EAF2-769E764204DC}"/>
+          </ac:cxnSpMkLst>
+        </pc:cxnChg>
+        <pc:cxnChg chg="add mod">
+          <ac:chgData name="Murthy, Rajeswari K." userId="e10ba283-73eb-4d51-9d76-4c1024dd953b" providerId="ADAL" clId="{9D5F3A72-DC95-4AD1-BEF4-8CF1AE0745BD}" dt="2022-07-20T10:54:17.823" v="2091" actId="1076"/>
+          <ac:cxnSpMkLst>
+            <pc:docMk/>
+            <pc:sldMk cId="970682747" sldId="264"/>
+            <ac:cxnSpMk id="58" creationId="{896C4BF1-0914-2FF3-CDD5-EEC27F5DCDD5}"/>
+          </ac:cxnSpMkLst>
+        </pc:cxnChg>
+        <pc:cxnChg chg="add mod">
+          <ac:chgData name="Murthy, Rajeswari K." userId="e10ba283-73eb-4d51-9d76-4c1024dd953b" providerId="ADAL" clId="{9D5F3A72-DC95-4AD1-BEF4-8CF1AE0745BD}" dt="2022-07-20T10:54:22.735" v="2093" actId="1076"/>
+          <ac:cxnSpMkLst>
+            <pc:docMk/>
+            <pc:sldMk cId="970682747" sldId="264"/>
+            <ac:cxnSpMk id="59" creationId="{41A4425D-57C5-42FE-48DA-1FB2BFA67313}"/>
+          </ac:cxnSpMkLst>
+        </pc:cxnChg>
+        <pc:cxnChg chg="add mod">
+          <ac:chgData name="Murthy, Rajeswari K." userId="e10ba283-73eb-4d51-9d76-4c1024dd953b" providerId="ADAL" clId="{9D5F3A72-DC95-4AD1-BEF4-8CF1AE0745BD}" dt="2022-07-20T10:54:28.241" v="2095" actId="1076"/>
+          <ac:cxnSpMkLst>
+            <pc:docMk/>
+            <pc:sldMk cId="970682747" sldId="264"/>
+            <ac:cxnSpMk id="60" creationId="{40DF4A4F-3206-CFAA-8505-5663C6DF3685}"/>
+          </ac:cxnSpMkLst>
+        </pc:cxnChg>
+        <pc:cxnChg chg="add mod">
+          <ac:chgData name="Murthy, Rajeswari K." userId="e10ba283-73eb-4d51-9d76-4c1024dd953b" providerId="ADAL" clId="{9D5F3A72-DC95-4AD1-BEF4-8CF1AE0745BD}" dt="2022-07-20T10:54:53.829" v="2114" actId="1038"/>
+          <ac:cxnSpMkLst>
+            <pc:docMk/>
+            <pc:sldMk cId="970682747" sldId="264"/>
+            <ac:cxnSpMk id="62" creationId="{4DDD4193-EE6D-D842-578A-542507492F9F}"/>
+          </ac:cxnSpMkLst>
+        </pc:cxnChg>
+        <pc:cxnChg chg="add mod">
+          <ac:chgData name="Murthy, Rajeswari K." userId="e10ba283-73eb-4d51-9d76-4c1024dd953b" providerId="ADAL" clId="{9D5F3A72-DC95-4AD1-BEF4-8CF1AE0745BD}" dt="2022-07-20T10:55:00.075" v="2116" actId="1076"/>
+          <ac:cxnSpMkLst>
+            <pc:docMk/>
+            <pc:sldMk cId="970682747" sldId="264"/>
+            <ac:cxnSpMk id="64" creationId="{1AF93026-3351-4FBB-9C28-FCCE47B36CB9}"/>
+          </ac:cxnSpMkLst>
+        </pc:cxnChg>
+      </pc:sldChg>
+      <pc:sldChg chg="addSp modSp new mod">
+        <pc:chgData name="Murthy, Rajeswari K." userId="e10ba283-73eb-4d51-9d76-4c1024dd953b" providerId="ADAL" clId="{9D5F3A72-DC95-4AD1-BEF4-8CF1AE0745BD}" dt="2022-07-20T11:06:15.161" v="2192" actId="20577"/>
+        <pc:sldMkLst>
+          <pc:docMk/>
+          <pc:sldMk cId="3971812868" sldId="265"/>
+        </pc:sldMkLst>
+        <pc:spChg chg="add mod">
+          <ac:chgData name="Murthy, Rajeswari K." userId="e10ba283-73eb-4d51-9d76-4c1024dd953b" providerId="ADAL" clId="{9D5F3A72-DC95-4AD1-BEF4-8CF1AE0745BD}" dt="2022-07-20T11:06:15.161" v="2192" actId="20577"/>
+          <ac:spMkLst>
+            <pc:docMk/>
+            <pc:sldMk cId="3971812868" sldId="265"/>
+            <ac:spMk id="3" creationId="{5B28C2A2-FDA8-1154-971A-3C24A0C926BE}"/>
+          </ac:spMkLst>
+        </pc:spChg>
+        <pc:picChg chg="add mod">
+          <ac:chgData name="Murthy, Rajeswari K." userId="e10ba283-73eb-4d51-9d76-4c1024dd953b" providerId="ADAL" clId="{9D5F3A72-DC95-4AD1-BEF4-8CF1AE0745BD}" dt="2022-07-20T08:48:37.460" v="1397" actId="14100"/>
+          <ac:picMkLst>
+            <pc:docMk/>
+            <pc:sldMk cId="3971812868" sldId="265"/>
+            <ac:picMk id="1026" creationId="{3414585D-702B-441B-D854-D5FC40CD37DE}"/>
+          </ac:picMkLst>
+        </pc:picChg>
+      </pc:sldChg>
+      <pc:sldChg chg="addSp modSp mod">
+        <pc:chgData name="Murthy, Rajeswari K." userId="e10ba283-73eb-4d51-9d76-4c1024dd953b" providerId="ADAL" clId="{9D5F3A72-DC95-4AD1-BEF4-8CF1AE0745BD}" dt="2022-07-21T03:45:14.921" v="2553" actId="14100"/>
+        <pc:sldMkLst>
+          <pc:docMk/>
+          <pc:sldMk cId="2410099100" sldId="266"/>
+        </pc:sldMkLst>
+        <pc:spChg chg="add mod">
+          <ac:chgData name="Murthy, Rajeswari K." userId="e10ba283-73eb-4d51-9d76-4c1024dd953b" providerId="ADAL" clId="{9D5F3A72-DC95-4AD1-BEF4-8CF1AE0745BD}" dt="2022-07-21T03:45:14.921" v="2553" actId="14100"/>
+          <ac:spMkLst>
+            <pc:docMk/>
+            <pc:sldMk cId="2410099100" sldId="266"/>
+            <ac:spMk id="2" creationId="{FE34B2A9-B823-95C3-71B2-2AA3BDB86712}"/>
+          </ac:spMkLst>
+        </pc:spChg>
       </pc:sldChg>
     </pc:docChg>
   </pc:docChgLst>
@@ -1736,7 +1774,7 @@
           <a:p>
             <a:fld id="{8FBE40A8-97D5-47C4-8C19-DB01D31C654C}" type="datetimeFigureOut">
               <a:rPr lang="en-US" smtClean="0"/>
-              <a:t>7/20/2022</a:t>
+              <a:t>7/21/2022</a:t>
             </a:fld>
             <a:endParaRPr lang="en-US"/>
           </a:p>
@@ -1934,7 +1972,7 @@
           <a:p>
             <a:fld id="{8FBE40A8-97D5-47C4-8C19-DB01D31C654C}" type="datetimeFigureOut">
               <a:rPr lang="en-US" smtClean="0"/>
-              <a:t>7/20/2022</a:t>
+              <a:t>7/21/2022</a:t>
             </a:fld>
             <a:endParaRPr lang="en-US"/>
           </a:p>
@@ -2142,7 +2180,7 @@
           <a:p>
             <a:fld id="{8FBE40A8-97D5-47C4-8C19-DB01D31C654C}" type="datetimeFigureOut">
               <a:rPr lang="en-US" smtClean="0"/>
-              <a:t>7/20/2022</a:t>
+              <a:t>7/21/2022</a:t>
             </a:fld>
             <a:endParaRPr lang="en-US"/>
           </a:p>
@@ -2340,7 +2378,7 @@
           <a:p>
             <a:fld id="{8FBE40A8-97D5-47C4-8C19-DB01D31C654C}" type="datetimeFigureOut">
               <a:rPr lang="en-US" smtClean="0"/>
-              <a:t>7/20/2022</a:t>
+              <a:t>7/21/2022</a:t>
             </a:fld>
             <a:endParaRPr lang="en-US"/>
           </a:p>
@@ -2615,7 +2653,7 @@
           <a:p>
             <a:fld id="{8FBE40A8-97D5-47C4-8C19-DB01D31C654C}" type="datetimeFigureOut">
               <a:rPr lang="en-US" smtClean="0"/>
-              <a:t>7/20/2022</a:t>
+              <a:t>7/21/2022</a:t>
             </a:fld>
             <a:endParaRPr lang="en-US"/>
           </a:p>
@@ -2880,7 +2918,7 @@
           <a:p>
             <a:fld id="{8FBE40A8-97D5-47C4-8C19-DB01D31C654C}" type="datetimeFigureOut">
               <a:rPr lang="en-US" smtClean="0"/>
-              <a:t>7/20/2022</a:t>
+              <a:t>7/21/2022</a:t>
             </a:fld>
             <a:endParaRPr lang="en-US"/>
           </a:p>
@@ -3292,7 +3330,7 @@
           <a:p>
             <a:fld id="{8FBE40A8-97D5-47C4-8C19-DB01D31C654C}" type="datetimeFigureOut">
               <a:rPr lang="en-US" smtClean="0"/>
-              <a:t>7/20/2022</a:t>
+              <a:t>7/21/2022</a:t>
             </a:fld>
             <a:endParaRPr lang="en-US"/>
           </a:p>
@@ -3433,7 +3471,7 @@
           <a:p>
             <a:fld id="{8FBE40A8-97D5-47C4-8C19-DB01D31C654C}" type="datetimeFigureOut">
               <a:rPr lang="en-US" smtClean="0"/>
-              <a:t>7/20/2022</a:t>
+              <a:t>7/21/2022</a:t>
             </a:fld>
             <a:endParaRPr lang="en-US"/>
           </a:p>
@@ -3546,7 +3584,7 @@
           <a:p>
             <a:fld id="{8FBE40A8-97D5-47C4-8C19-DB01D31C654C}" type="datetimeFigureOut">
               <a:rPr lang="en-US" smtClean="0"/>
-              <a:t>7/20/2022</a:t>
+              <a:t>7/21/2022</a:t>
             </a:fld>
             <a:endParaRPr lang="en-US"/>
           </a:p>
@@ -3857,7 +3895,7 @@
           <a:p>
             <a:fld id="{8FBE40A8-97D5-47C4-8C19-DB01D31C654C}" type="datetimeFigureOut">
               <a:rPr lang="en-US" smtClean="0"/>
-              <a:t>7/20/2022</a:t>
+              <a:t>7/21/2022</a:t>
             </a:fld>
             <a:endParaRPr lang="en-US"/>
           </a:p>
@@ -4145,7 +4183,7 @@
           <a:p>
             <a:fld id="{8FBE40A8-97D5-47C4-8C19-DB01D31C654C}" type="datetimeFigureOut">
               <a:rPr lang="en-US" smtClean="0"/>
-              <a:t>7/20/2022</a:t>
+              <a:t>7/21/2022</a:t>
             </a:fld>
             <a:endParaRPr lang="en-US"/>
           </a:p>
@@ -4386,7 +4424,7 @@
           <a:p>
             <a:fld id="{8FBE40A8-97D5-47C4-8C19-DB01D31C654C}" type="datetimeFigureOut">
               <a:rPr lang="en-US" smtClean="0"/>
-              <a:t>7/20/2022</a:t>
+              <a:t>7/21/2022</a:t>
             </a:fld>
             <a:endParaRPr lang="en-US"/>
           </a:p>
@@ -6633,6 +6671,41 @@
           </p:cxnSp>
         </p:grpSp>
       </p:grpSp>
+      <p:sp>
+        <p:nvSpPr>
+          <p:cNvPr id="2" name="TextBox 1">
+            <a:extLst>
+              <a:ext uri="{FF2B5EF4-FFF2-40B4-BE49-F238E27FC236}">
+                <a16:creationId xmlns:a16="http://schemas.microsoft.com/office/drawing/2014/main" id="{FE34B2A9-B823-95C3-71B2-2AA3BDB86712}"/>
+              </a:ext>
+            </a:extLst>
+          </p:cNvPr>
+          <p:cNvSpPr txBox="1"/>
+          <p:nvPr/>
+        </p:nvSpPr>
+        <p:spPr>
+          <a:xfrm>
+            <a:off x="3794633" y="6049764"/>
+            <a:ext cx="2725907" cy="369332"/>
+          </a:xfrm>
+          <a:prstGeom prst="rect">
+            <a:avLst/>
+          </a:prstGeom>
+          <a:noFill/>
+        </p:spPr>
+        <p:txBody>
+          <a:bodyPr wrap="square" rtlCol="0">
+            <a:spAutoFit/>
+          </a:bodyPr>
+          <a:lstStyle/>
+          <a:p>
+            <a:r>
+              <a:rPr lang="en-US" dirty="0"/>
+              <a:t>Continuous Feedback</a:t>
+            </a:r>
+          </a:p>
+        </p:txBody>
+      </p:sp>
     </p:spTree>
     <p:extLst>
       <p:ext uri="{BB962C8B-B14F-4D97-AF65-F5344CB8AC3E}">
@@ -8813,6 +8886,36 @@
           </a:prstGeom>
         </p:spPr>
       </p:pic>
+      <p:pic>
+        <p:nvPicPr>
+          <p:cNvPr id="2" name="Picture 1">
+            <a:extLst>
+              <a:ext uri="{FF2B5EF4-FFF2-40B4-BE49-F238E27FC236}">
+                <a16:creationId xmlns:a16="http://schemas.microsoft.com/office/drawing/2014/main" id="{B88ABBEF-E7D2-DE20-D408-EF2840BE8EF4}"/>
+              </a:ext>
+            </a:extLst>
+          </p:cNvPr>
+          <p:cNvPicPr>
+            <a:picLocks noChangeAspect="1"/>
+          </p:cNvPicPr>
+          <p:nvPr/>
+        </p:nvPicPr>
+        <p:blipFill>
+          <a:blip r:embed="rId17"/>
+          <a:stretch>
+            <a:fillRect/>
+          </a:stretch>
+        </p:blipFill>
+        <p:spPr>
+          <a:xfrm>
+            <a:off x="4733511" y="4482740"/>
+            <a:ext cx="407238" cy="417680"/>
+          </a:xfrm>
+          <a:prstGeom prst="rect">
+            <a:avLst/>
+          </a:prstGeom>
+        </p:spPr>
+      </p:pic>
     </p:spTree>
     <p:extLst>
       <p:ext uri="{BB962C8B-B14F-4D97-AF65-F5344CB8AC3E}">
@@ -8857,7 +8960,7 @@
         </p:nvGrpSpPr>
         <p:grpSpPr>
           <a:xfrm>
-            <a:off x="478214" y="1109656"/>
+            <a:off x="378372" y="1112276"/>
             <a:ext cx="11230312" cy="2269226"/>
             <a:chOff x="-215470" y="2087116"/>
             <a:chExt cx="11230312" cy="2269226"/>
@@ -10825,8 +10928,8 @@
         </p:nvSpPr>
         <p:spPr>
           <a:xfrm>
-            <a:off x="2322741" y="935422"/>
-            <a:ext cx="8744652" cy="829314"/>
+            <a:off x="2322741" y="940984"/>
+            <a:ext cx="8711280" cy="823752"/>
           </a:xfrm>
           <a:prstGeom prst="roundRect">
             <a:avLst/>
@@ -11625,7 +11728,7 @@
                 </a:solidFill>
                 <a:latin typeface="Helvetica" panose="020B0604020202020204" pitchFamily="34" charset="0"/>
               </a:rPr>
-              <a:t>Versioning of images based on standards</a:t>
+              <a:t>Helm charts is used for versioning the deployments </a:t>
             </a:r>
           </a:p>
           <a:p>

</xml_diff>